<commit_message>
Incluindo slides 4 e 5
</commit_message>
<xml_diff>
--- a/apresentacao/apresentacao.pptx
+++ b/apresentacao/apresentacao.pptx
@@ -9,6 +9,7 @@
     <p:sldId id="257" r:id="rId3"/>
     <p:sldId id="258" r:id="rId4"/>
     <p:sldId id="259" r:id="rId5"/>
+    <p:sldId id="260" r:id="rId6"/>
   </p:sldIdLst>
   <p:sldSz cx="12192000" cy="6858000"/>
   <p:notesSz cx="6858000" cy="9144000"/>
@@ -3529,10 +3530,10 @@
       </p:grpSpPr>
       <p:pic>
         <p:nvPicPr>
-          <p:cNvPr id="9" name="Imagem 8" descr="Uma imagem contendo texto&#10;&#10;Descrição gerada automaticamente">
-            <a:extLst>
-              <a:ext uri="{FF2B5EF4-FFF2-40B4-BE49-F238E27FC236}">
-                <a16:creationId xmlns:a16="http://schemas.microsoft.com/office/drawing/2014/main" id="{6D79B008-D041-4EC0-B2EF-1E608AC18620}"/>
+          <p:cNvPr id="4" name="Imagem 3" descr="Texto preto sobre fundo branco&#10;&#10;Descrição gerada automaticamente">
+            <a:extLst>
+              <a:ext uri="{FF2B5EF4-FFF2-40B4-BE49-F238E27FC236}">
+                <a16:creationId xmlns:a16="http://schemas.microsoft.com/office/drawing/2014/main" id="{37FAD47E-4268-45A4-A9E6-AE291DFC32B5}"/>
               </a:ext>
             </a:extLst>
           </p:cNvPr>
@@ -3567,6 +3568,72 @@
     <p:extLst>
       <p:ext uri="{BB962C8B-B14F-4D97-AF65-F5344CB8AC3E}">
         <p14:creationId xmlns:p14="http://schemas.microsoft.com/office/powerpoint/2010/main" val="4087358166"/>
+      </p:ext>
+    </p:extLst>
+  </p:cSld>
+  <p:clrMapOvr>
+    <a:masterClrMapping/>
+  </p:clrMapOvr>
+</p:sld>
+</file>
+
+<file path=ppt/slides/slide5.xml><?xml version="1.0" encoding="utf-8"?>
+<p:sld xmlns:a="http://schemas.openxmlformats.org/drawingml/2006/main" xmlns:r="http://schemas.openxmlformats.org/officeDocument/2006/relationships" xmlns:p="http://schemas.openxmlformats.org/presentationml/2006/main">
+  <p:cSld>
+    <p:spTree>
+      <p:nvGrpSpPr>
+        <p:cNvPr id="1" name=""/>
+        <p:cNvGrpSpPr/>
+        <p:nvPr/>
+      </p:nvGrpSpPr>
+      <p:grpSpPr>
+        <a:xfrm>
+          <a:off x="0" y="0"/>
+          <a:ext cx="0" cy="0"/>
+          <a:chOff x="0" y="0"/>
+          <a:chExt cx="0" cy="0"/>
+        </a:xfrm>
+      </p:grpSpPr>
+      <p:pic>
+        <p:nvPicPr>
+          <p:cNvPr id="7" name="Imagem 6">
+            <a:extLst>
+              <a:ext uri="{FF2B5EF4-FFF2-40B4-BE49-F238E27FC236}">
+                <a16:creationId xmlns:a16="http://schemas.microsoft.com/office/drawing/2014/main" id="{2D583E17-4902-42C2-808B-746278C5E691}"/>
+              </a:ext>
+            </a:extLst>
+          </p:cNvPr>
+          <p:cNvPicPr>
+            <a:picLocks noChangeAspect="1"/>
+          </p:cNvPicPr>
+          <p:nvPr/>
+        </p:nvPicPr>
+        <p:blipFill>
+          <a:blip r:embed="rId2">
+            <a:extLst>
+              <a:ext uri="{28A0092B-C50C-407E-A947-70E740481C1C}">
+                <a14:useLocalDpi xmlns:a14="http://schemas.microsoft.com/office/drawing/2010/main" val="0"/>
+              </a:ext>
+            </a:extLst>
+          </a:blip>
+          <a:stretch>
+            <a:fillRect/>
+          </a:stretch>
+        </p:blipFill>
+        <p:spPr>
+          <a:xfrm>
+            <a:off x="0" y="0"/>
+            <a:ext cx="12192000" cy="6858000"/>
+          </a:xfrm>
+          <a:prstGeom prst="rect">
+            <a:avLst/>
+          </a:prstGeom>
+        </p:spPr>
+      </p:pic>
+    </p:spTree>
+    <p:extLst>
+      <p:ext uri="{BB962C8B-B14F-4D97-AF65-F5344CB8AC3E}">
+        <p14:creationId xmlns:p14="http://schemas.microsoft.com/office/powerpoint/2010/main" val="3961196042"/>
       </p:ext>
     </p:extLst>
   </p:cSld>

</xml_diff>

<commit_message>
Incluindo visao geral do knn
</commit_message>
<xml_diff>
--- a/apresentacao/apresentacao.pptx
+++ b/apresentacao/apresentacao.pptx
@@ -13,8 +13,9 @@
     <p:sldId id="262" r:id="rId7"/>
     <p:sldId id="259" r:id="rId8"/>
     <p:sldId id="260" r:id="rId9"/>
-    <p:sldId id="261" r:id="rId10"/>
-    <p:sldId id="265" r:id="rId11"/>
+    <p:sldId id="266" r:id="rId10"/>
+    <p:sldId id="261" r:id="rId11"/>
+    <p:sldId id="265" r:id="rId12"/>
   </p:sldIdLst>
   <p:sldSz cx="12192000" cy="6858000"/>
   <p:notesSz cx="6858000" cy="9144000"/>
@@ -3403,6 +3404,72 @@
       </p:grpSpPr>
       <p:pic>
         <p:nvPicPr>
+          <p:cNvPr id="4" name="Imagem 3" descr="Uma imagem contendo screenshot&#10;&#10;Descrição gerada automaticamente">
+            <a:extLst>
+              <a:ext uri="{FF2B5EF4-FFF2-40B4-BE49-F238E27FC236}">
+                <a16:creationId xmlns:a16="http://schemas.microsoft.com/office/drawing/2014/main" id="{FB69DDDD-7101-466B-82AC-B33AF60A9014}"/>
+              </a:ext>
+            </a:extLst>
+          </p:cNvPr>
+          <p:cNvPicPr>
+            <a:picLocks noChangeAspect="1"/>
+          </p:cNvPicPr>
+          <p:nvPr/>
+        </p:nvPicPr>
+        <p:blipFill>
+          <a:blip r:embed="rId2">
+            <a:extLst>
+              <a:ext uri="{28A0092B-C50C-407E-A947-70E740481C1C}">
+                <a14:useLocalDpi xmlns:a14="http://schemas.microsoft.com/office/drawing/2010/main" val="0"/>
+              </a:ext>
+            </a:extLst>
+          </a:blip>
+          <a:stretch>
+            <a:fillRect/>
+          </a:stretch>
+        </p:blipFill>
+        <p:spPr>
+          <a:xfrm>
+            <a:off x="0" y="0"/>
+            <a:ext cx="12192000" cy="6858000"/>
+          </a:xfrm>
+          <a:prstGeom prst="rect">
+            <a:avLst/>
+          </a:prstGeom>
+        </p:spPr>
+      </p:pic>
+    </p:spTree>
+    <p:extLst>
+      <p:ext uri="{BB962C8B-B14F-4D97-AF65-F5344CB8AC3E}">
+        <p14:creationId xmlns:p14="http://schemas.microsoft.com/office/powerpoint/2010/main" val="3660585902"/>
+      </p:ext>
+    </p:extLst>
+  </p:cSld>
+  <p:clrMapOvr>
+    <a:masterClrMapping/>
+  </p:clrMapOvr>
+</p:sld>
+</file>
+
+<file path=ppt/slides/slide11.xml><?xml version="1.0" encoding="utf-8"?>
+<p:sld xmlns:a="http://schemas.openxmlformats.org/drawingml/2006/main" xmlns:r="http://schemas.openxmlformats.org/officeDocument/2006/relationships" xmlns:p="http://schemas.openxmlformats.org/presentationml/2006/main">
+  <p:cSld>
+    <p:spTree>
+      <p:nvGrpSpPr>
+        <p:cNvPr id="1" name=""/>
+        <p:cNvGrpSpPr/>
+        <p:nvPr/>
+      </p:nvGrpSpPr>
+      <p:grpSpPr>
+        <a:xfrm>
+          <a:off x="0" y="0"/>
+          <a:ext cx="0" cy="0"/>
+          <a:chOff x="0" y="0"/>
+          <a:chExt cx="0" cy="0"/>
+        </a:xfrm>
+      </p:grpSpPr>
+      <p:pic>
+        <p:nvPicPr>
           <p:cNvPr id="6" name="Imagem 5" descr="Tela de celular com texto preto sobre fundo branco&#10;&#10;Descrição gerada automaticamente">
             <a:extLst>
               <a:ext uri="{FF2B5EF4-FFF2-40B4-BE49-F238E27FC236}">
@@ -3931,10 +3998,10 @@
       </p:grpSpPr>
       <p:pic>
         <p:nvPicPr>
-          <p:cNvPr id="4" name="Imagem 3" descr="Uma imagem contendo screenshot&#10;&#10;Descrição gerada automaticamente">
-            <a:extLst>
-              <a:ext uri="{FF2B5EF4-FFF2-40B4-BE49-F238E27FC236}">
-                <a16:creationId xmlns:a16="http://schemas.microsoft.com/office/drawing/2014/main" id="{FB69DDDD-7101-466B-82AC-B33AF60A9014}"/>
+          <p:cNvPr id="5" name="Imagem 4" descr="Tela de celular com texto preto sobre fundo branco&#10;&#10;Descrição gerada automaticamente">
+            <a:extLst>
+              <a:ext uri="{FF2B5EF4-FFF2-40B4-BE49-F238E27FC236}">
+                <a16:creationId xmlns:a16="http://schemas.microsoft.com/office/drawing/2014/main" id="{D505D429-AF18-4C26-B58D-E69A4673C243}"/>
               </a:ext>
             </a:extLst>
           </p:cNvPr>
@@ -3968,7 +4035,7 @@
     </p:spTree>
     <p:extLst>
       <p:ext uri="{BB962C8B-B14F-4D97-AF65-F5344CB8AC3E}">
-        <p14:creationId xmlns:p14="http://schemas.microsoft.com/office/powerpoint/2010/main" val="3660585902"/>
+        <p14:creationId xmlns:p14="http://schemas.microsoft.com/office/powerpoint/2010/main" val="14479773"/>
       </p:ext>
     </p:extLst>
   </p:cSld>

</xml_diff>

<commit_message>
Incluindo detalhes do KNN
</commit_message>
<xml_diff>
--- a/apresentacao/apresentacao.pptx
+++ b/apresentacao/apresentacao.pptx
@@ -14,8 +14,9 @@
     <p:sldId id="259" r:id="rId8"/>
     <p:sldId id="260" r:id="rId9"/>
     <p:sldId id="266" r:id="rId10"/>
-    <p:sldId id="261" r:id="rId11"/>
-    <p:sldId id="265" r:id="rId12"/>
+    <p:sldId id="267" r:id="rId11"/>
+    <p:sldId id="261" r:id="rId12"/>
+    <p:sldId id="265" r:id="rId13"/>
   </p:sldIdLst>
   <p:sldSz cx="12192000" cy="6858000"/>
   <p:notesSz cx="6858000" cy="9144000"/>
@@ -3404,6 +3405,72 @@
       </p:grpSpPr>
       <p:pic>
         <p:nvPicPr>
+          <p:cNvPr id="5" name="Imagem 4">
+            <a:extLst>
+              <a:ext uri="{FF2B5EF4-FFF2-40B4-BE49-F238E27FC236}">
+                <a16:creationId xmlns:a16="http://schemas.microsoft.com/office/drawing/2014/main" id="{C66E6AEE-62B3-465B-AB39-95CF1D80472C}"/>
+              </a:ext>
+            </a:extLst>
+          </p:cNvPr>
+          <p:cNvPicPr>
+            <a:picLocks noChangeAspect="1"/>
+          </p:cNvPicPr>
+          <p:nvPr/>
+        </p:nvPicPr>
+        <p:blipFill>
+          <a:blip r:embed="rId2">
+            <a:extLst>
+              <a:ext uri="{28A0092B-C50C-407E-A947-70E740481C1C}">
+                <a14:useLocalDpi xmlns:a14="http://schemas.microsoft.com/office/drawing/2010/main" val="0"/>
+              </a:ext>
+            </a:extLst>
+          </a:blip>
+          <a:stretch>
+            <a:fillRect/>
+          </a:stretch>
+        </p:blipFill>
+        <p:spPr>
+          <a:xfrm>
+            <a:off x="0" y="0"/>
+            <a:ext cx="12192000" cy="6858000"/>
+          </a:xfrm>
+          <a:prstGeom prst="rect">
+            <a:avLst/>
+          </a:prstGeom>
+        </p:spPr>
+      </p:pic>
+    </p:spTree>
+    <p:extLst>
+      <p:ext uri="{BB962C8B-B14F-4D97-AF65-F5344CB8AC3E}">
+        <p14:creationId xmlns:p14="http://schemas.microsoft.com/office/powerpoint/2010/main" val="4073546692"/>
+      </p:ext>
+    </p:extLst>
+  </p:cSld>
+  <p:clrMapOvr>
+    <a:masterClrMapping/>
+  </p:clrMapOvr>
+</p:sld>
+</file>
+
+<file path=ppt/slides/slide11.xml><?xml version="1.0" encoding="utf-8"?>
+<p:sld xmlns:a="http://schemas.openxmlformats.org/drawingml/2006/main" xmlns:r="http://schemas.openxmlformats.org/officeDocument/2006/relationships" xmlns:p="http://schemas.openxmlformats.org/presentationml/2006/main">
+  <p:cSld>
+    <p:spTree>
+      <p:nvGrpSpPr>
+        <p:cNvPr id="1" name=""/>
+        <p:cNvGrpSpPr/>
+        <p:nvPr/>
+      </p:nvGrpSpPr>
+      <p:grpSpPr>
+        <a:xfrm>
+          <a:off x="0" y="0"/>
+          <a:ext cx="0" cy="0"/>
+          <a:chOff x="0" y="0"/>
+          <a:chExt cx="0" cy="0"/>
+        </a:xfrm>
+      </p:grpSpPr>
+      <p:pic>
+        <p:nvPicPr>
           <p:cNvPr id="4" name="Imagem 3" descr="Uma imagem contendo screenshot&#10;&#10;Descrição gerada automaticamente">
             <a:extLst>
               <a:ext uri="{FF2B5EF4-FFF2-40B4-BE49-F238E27FC236}">
@@ -3451,7 +3518,7 @@
 </p:sld>
 </file>
 
-<file path=ppt/slides/slide11.xml><?xml version="1.0" encoding="utf-8"?>
+<file path=ppt/slides/slide12.xml><?xml version="1.0" encoding="utf-8"?>
 <p:sld xmlns:a="http://schemas.openxmlformats.org/drawingml/2006/main" xmlns:r="http://schemas.openxmlformats.org/officeDocument/2006/relationships" xmlns:p="http://schemas.openxmlformats.org/presentationml/2006/main">
   <p:cSld>
     <p:spTree>

</xml_diff>

<commit_message>
Incluindo as observações do professor
</commit_message>
<xml_diff>
--- a/apresentacao/apresentacao.pptx
+++ b/apresentacao/apresentacao.pptx
@@ -7,17 +7,15 @@
   <p:sldIdLst>
     <p:sldId id="256" r:id="rId2"/>
     <p:sldId id="263" r:id="rId3"/>
-    <p:sldId id="264" r:id="rId4"/>
-    <p:sldId id="257" r:id="rId5"/>
-    <p:sldId id="258" r:id="rId6"/>
-    <p:sldId id="262" r:id="rId7"/>
-    <p:sldId id="259" r:id="rId8"/>
+    <p:sldId id="257" r:id="rId4"/>
+    <p:sldId id="258" r:id="rId5"/>
+    <p:sldId id="262" r:id="rId6"/>
+    <p:sldId id="259" r:id="rId7"/>
+    <p:sldId id="266" r:id="rId8"/>
     <p:sldId id="260" r:id="rId9"/>
-    <p:sldId id="266" r:id="rId10"/>
-    <p:sldId id="267" r:id="rId11"/>
-    <p:sldId id="268" r:id="rId12"/>
-    <p:sldId id="261" r:id="rId13"/>
-    <p:sldId id="265" r:id="rId14"/>
+    <p:sldId id="268" r:id="rId10"/>
+    <p:sldId id="261" r:id="rId11"/>
+    <p:sldId id="265" r:id="rId12"/>
   </p:sldIdLst>
   <p:sldSz cx="12192000" cy="6858000"/>
   <p:notesSz cx="6858000" cy="9144000"/>
@@ -271,7 +269,7 @@
           <a:p>
             <a:fld id="{1F1FAA24-82E9-47BA-A53E-AEAD71F0EE56}" type="datetimeFigureOut">
               <a:rPr lang="pt-BR" smtClean="0"/>
-              <a:t>09/02/2020</a:t>
+              <a:t>16/02/2020</a:t>
             </a:fld>
             <a:endParaRPr lang="pt-BR"/>
           </a:p>
@@ -469,7 +467,7 @@
           <a:p>
             <a:fld id="{1F1FAA24-82E9-47BA-A53E-AEAD71F0EE56}" type="datetimeFigureOut">
               <a:rPr lang="pt-BR" smtClean="0"/>
-              <a:t>09/02/2020</a:t>
+              <a:t>16/02/2020</a:t>
             </a:fld>
             <a:endParaRPr lang="pt-BR"/>
           </a:p>
@@ -677,7 +675,7 @@
           <a:p>
             <a:fld id="{1F1FAA24-82E9-47BA-A53E-AEAD71F0EE56}" type="datetimeFigureOut">
               <a:rPr lang="pt-BR" smtClean="0"/>
-              <a:t>09/02/2020</a:t>
+              <a:t>16/02/2020</a:t>
             </a:fld>
             <a:endParaRPr lang="pt-BR"/>
           </a:p>
@@ -875,7 +873,7 @@
           <a:p>
             <a:fld id="{1F1FAA24-82E9-47BA-A53E-AEAD71F0EE56}" type="datetimeFigureOut">
               <a:rPr lang="pt-BR" smtClean="0"/>
-              <a:t>09/02/2020</a:t>
+              <a:t>16/02/2020</a:t>
             </a:fld>
             <a:endParaRPr lang="pt-BR"/>
           </a:p>
@@ -1150,7 +1148,7 @@
           <a:p>
             <a:fld id="{1F1FAA24-82E9-47BA-A53E-AEAD71F0EE56}" type="datetimeFigureOut">
               <a:rPr lang="pt-BR" smtClean="0"/>
-              <a:t>09/02/2020</a:t>
+              <a:t>16/02/2020</a:t>
             </a:fld>
             <a:endParaRPr lang="pt-BR"/>
           </a:p>
@@ -1415,7 +1413,7 @@
           <a:p>
             <a:fld id="{1F1FAA24-82E9-47BA-A53E-AEAD71F0EE56}" type="datetimeFigureOut">
               <a:rPr lang="pt-BR" smtClean="0"/>
-              <a:t>09/02/2020</a:t>
+              <a:t>16/02/2020</a:t>
             </a:fld>
             <a:endParaRPr lang="pt-BR"/>
           </a:p>
@@ -1827,7 +1825,7 @@
           <a:p>
             <a:fld id="{1F1FAA24-82E9-47BA-A53E-AEAD71F0EE56}" type="datetimeFigureOut">
               <a:rPr lang="pt-BR" smtClean="0"/>
-              <a:t>09/02/2020</a:t>
+              <a:t>16/02/2020</a:t>
             </a:fld>
             <a:endParaRPr lang="pt-BR"/>
           </a:p>
@@ -1968,7 +1966,7 @@
           <a:p>
             <a:fld id="{1F1FAA24-82E9-47BA-A53E-AEAD71F0EE56}" type="datetimeFigureOut">
               <a:rPr lang="pt-BR" smtClean="0"/>
-              <a:t>09/02/2020</a:t>
+              <a:t>16/02/2020</a:t>
             </a:fld>
             <a:endParaRPr lang="pt-BR"/>
           </a:p>
@@ -2081,7 +2079,7 @@
           <a:p>
             <a:fld id="{1F1FAA24-82E9-47BA-A53E-AEAD71F0EE56}" type="datetimeFigureOut">
               <a:rPr lang="pt-BR" smtClean="0"/>
-              <a:t>09/02/2020</a:t>
+              <a:t>16/02/2020</a:t>
             </a:fld>
             <a:endParaRPr lang="pt-BR"/>
           </a:p>
@@ -2392,7 +2390,7 @@
           <a:p>
             <a:fld id="{1F1FAA24-82E9-47BA-A53E-AEAD71F0EE56}" type="datetimeFigureOut">
               <a:rPr lang="pt-BR" smtClean="0"/>
-              <a:t>09/02/2020</a:t>
+              <a:t>16/02/2020</a:t>
             </a:fld>
             <a:endParaRPr lang="pt-BR"/>
           </a:p>
@@ -2680,7 +2678,7 @@
           <a:p>
             <a:fld id="{1F1FAA24-82E9-47BA-A53E-AEAD71F0EE56}" type="datetimeFigureOut">
               <a:rPr lang="pt-BR" smtClean="0"/>
-              <a:t>09/02/2020</a:t>
+              <a:t>16/02/2020</a:t>
             </a:fld>
             <a:endParaRPr lang="pt-BR"/>
           </a:p>
@@ -2921,7 +2919,7 @@
           <a:p>
             <a:fld id="{1F1FAA24-82E9-47BA-A53E-AEAD71F0EE56}" type="datetimeFigureOut">
               <a:rPr lang="pt-BR" smtClean="0"/>
-              <a:t>09/02/2020</a:t>
+              <a:t>16/02/2020</a:t>
             </a:fld>
             <a:endParaRPr lang="pt-BR"/>
           </a:p>
@@ -3406,10 +3404,10 @@
       </p:grpSpPr>
       <p:pic>
         <p:nvPicPr>
-          <p:cNvPr id="3" name="Imagem 2">
-            <a:extLst>
-              <a:ext uri="{FF2B5EF4-FFF2-40B4-BE49-F238E27FC236}">
-                <a16:creationId xmlns:a16="http://schemas.microsoft.com/office/drawing/2014/main" id="{25908532-1C15-4CBC-8709-FB6ECACAB434}"/>
+          <p:cNvPr id="4" name="Imagem 3" descr="Uma imagem contendo screenshot&#10;&#10;Descrição gerada automaticamente">
+            <a:extLst>
+              <a:ext uri="{FF2B5EF4-FFF2-40B4-BE49-F238E27FC236}">
+                <a16:creationId xmlns:a16="http://schemas.microsoft.com/office/drawing/2014/main" id="{FB69DDDD-7101-466B-82AC-B33AF60A9014}"/>
               </a:ext>
             </a:extLst>
           </p:cNvPr>
@@ -3440,138 +3438,55 @@
           </a:prstGeom>
         </p:spPr>
       </p:pic>
-    </p:spTree>
-    <p:extLst>
-      <p:ext uri="{BB962C8B-B14F-4D97-AF65-F5344CB8AC3E}">
-        <p14:creationId xmlns:p14="http://schemas.microsoft.com/office/powerpoint/2010/main" val="4073546692"/>
-      </p:ext>
-    </p:extLst>
-  </p:cSld>
-  <p:clrMapOvr>
-    <a:masterClrMapping/>
-  </p:clrMapOvr>
-</p:sld>
-</file>
-
-<file path=ppt/slides/slide11.xml><?xml version="1.0" encoding="utf-8"?>
-<p:sld xmlns:a="http://schemas.openxmlformats.org/drawingml/2006/main" xmlns:r="http://schemas.openxmlformats.org/officeDocument/2006/relationships" xmlns:p="http://schemas.openxmlformats.org/presentationml/2006/main">
-  <p:cSld>
-    <p:spTree>
-      <p:nvGrpSpPr>
-        <p:cNvPr id="1" name=""/>
-        <p:cNvGrpSpPr/>
-        <p:nvPr/>
-      </p:nvGrpSpPr>
-      <p:grpSpPr>
-        <a:xfrm>
-          <a:off x="0" y="0"/>
-          <a:ext cx="0" cy="0"/>
-          <a:chOff x="0" y="0"/>
-          <a:chExt cx="0" cy="0"/>
-        </a:xfrm>
-      </p:grpSpPr>
-      <p:pic>
-        <p:nvPicPr>
-          <p:cNvPr id="5" name="Imagem 4" descr="Uma imagem contendo screenshot, texto, desenho&#10;&#10;Descrição gerada automaticamente">
-            <a:extLst>
-              <a:ext uri="{FF2B5EF4-FFF2-40B4-BE49-F238E27FC236}">
-                <a16:creationId xmlns:a16="http://schemas.microsoft.com/office/drawing/2014/main" id="{C90ADE1E-B4F6-474D-97C1-F7B2F287795F}"/>
-              </a:ext>
-            </a:extLst>
-          </p:cNvPr>
-          <p:cNvPicPr>
-            <a:picLocks noChangeAspect="1"/>
-          </p:cNvPicPr>
+      <p:sp>
+        <p:nvSpPr>
+          <p:cNvPr id="2" name="Retângulo 1">
+            <a:extLst>
+              <a:ext uri="{FF2B5EF4-FFF2-40B4-BE49-F238E27FC236}">
+                <a16:creationId xmlns:a16="http://schemas.microsoft.com/office/drawing/2014/main" id="{BE83EBD0-0137-4666-99F8-CBAB2CB86E4D}"/>
+              </a:ext>
+            </a:extLst>
+          </p:cNvPr>
+          <p:cNvSpPr/>
           <p:nvPr/>
-        </p:nvPicPr>
-        <p:blipFill>
-          <a:blip r:embed="rId2">
-            <a:extLst>
-              <a:ext uri="{28A0092B-C50C-407E-A947-70E740481C1C}">
-                <a14:useLocalDpi xmlns:a14="http://schemas.microsoft.com/office/drawing/2010/main" val="0"/>
-              </a:ext>
-            </a:extLst>
-          </a:blip>
-          <a:stretch>
-            <a:fillRect/>
-          </a:stretch>
-        </p:blipFill>
+        </p:nvSpPr>
         <p:spPr>
           <a:xfrm>
-            <a:off x="0" y="0"/>
-            <a:ext cx="12192000" cy="6858000"/>
+            <a:off x="7315200" y="4471988"/>
+            <a:ext cx="4057650" cy="1585912"/>
           </a:xfrm>
           <a:prstGeom prst="rect">
             <a:avLst/>
           </a:prstGeom>
         </p:spPr>
-      </p:pic>
-    </p:spTree>
-    <p:extLst>
-      <p:ext uri="{BB962C8B-B14F-4D97-AF65-F5344CB8AC3E}">
-        <p14:creationId xmlns:p14="http://schemas.microsoft.com/office/powerpoint/2010/main" val="3211799982"/>
-      </p:ext>
-    </p:extLst>
-  </p:cSld>
-  <p:clrMapOvr>
-    <a:masterClrMapping/>
-  </p:clrMapOvr>
-</p:sld>
-</file>
-
-<file path=ppt/slides/slide12.xml><?xml version="1.0" encoding="utf-8"?>
-<p:sld xmlns:a="http://schemas.openxmlformats.org/drawingml/2006/main" xmlns:r="http://schemas.openxmlformats.org/officeDocument/2006/relationships" xmlns:p="http://schemas.openxmlformats.org/presentationml/2006/main">
-  <p:cSld>
-    <p:spTree>
-      <p:nvGrpSpPr>
-        <p:cNvPr id="1" name=""/>
-        <p:cNvGrpSpPr/>
-        <p:nvPr/>
-      </p:nvGrpSpPr>
-      <p:grpSpPr>
-        <a:xfrm>
-          <a:off x="0" y="0"/>
-          <a:ext cx="0" cy="0"/>
-          <a:chOff x="0" y="0"/>
-          <a:chExt cx="0" cy="0"/>
-        </a:xfrm>
-      </p:grpSpPr>
-      <p:pic>
-        <p:nvPicPr>
-          <p:cNvPr id="4" name="Imagem 3" descr="Uma imagem contendo screenshot&#10;&#10;Descrição gerada automaticamente">
-            <a:extLst>
-              <a:ext uri="{FF2B5EF4-FFF2-40B4-BE49-F238E27FC236}">
-                <a16:creationId xmlns:a16="http://schemas.microsoft.com/office/drawing/2014/main" id="{FB69DDDD-7101-466B-82AC-B33AF60A9014}"/>
-              </a:ext>
-            </a:extLst>
-          </p:cNvPr>
-          <p:cNvPicPr>
-            <a:picLocks noChangeAspect="1"/>
-          </p:cNvPicPr>
-          <p:nvPr/>
-        </p:nvPicPr>
-        <p:blipFill>
-          <a:blip r:embed="rId2">
-            <a:extLst>
-              <a:ext uri="{28A0092B-C50C-407E-A947-70E740481C1C}">
-                <a14:useLocalDpi xmlns:a14="http://schemas.microsoft.com/office/drawing/2010/main" val="0"/>
-              </a:ext>
-            </a:extLst>
-          </a:blip>
-          <a:stretch>
-            <a:fillRect/>
-          </a:stretch>
-        </p:blipFill>
-        <p:spPr>
-          <a:xfrm>
-            <a:off x="0" y="0"/>
-            <a:ext cx="12192000" cy="6858000"/>
-          </a:xfrm>
-          <a:prstGeom prst="rect">
-            <a:avLst/>
-          </a:prstGeom>
-        </p:spPr>
-      </p:pic>
+        <p:style>
+          <a:lnRef idx="2">
+            <a:schemeClr val="accent1">
+              <a:shade val="50000"/>
+            </a:schemeClr>
+          </a:lnRef>
+          <a:fillRef idx="1">
+            <a:schemeClr val="accent1"/>
+          </a:fillRef>
+          <a:effectRef idx="0">
+            <a:schemeClr val="accent1"/>
+          </a:effectRef>
+          <a:fontRef idx="minor">
+            <a:schemeClr val="lt1"/>
+          </a:fontRef>
+        </p:style>
+        <p:txBody>
+          <a:bodyPr rtlCol="0" anchor="ctr"/>
+          <a:lstStyle/>
+          <a:p>
+            <a:pPr algn="ctr"/>
+            <a:r>
+              <a:rPr lang="pt-BR" dirty="0"/>
+              <a:t>Deixar claro que os próximos passos são sugestões para que a comunidade cientifica realize pesquisas futuras. Não assumir a responsabilidade!</a:t>
+            </a:r>
+          </a:p>
+        </p:txBody>
+      </p:sp>
     </p:spTree>
     <p:extLst>
       <p:ext uri="{BB962C8B-B14F-4D97-AF65-F5344CB8AC3E}">
@@ -3585,7 +3500,7 @@
 </p:sld>
 </file>
 
-<file path=ppt/slides/slide13.xml><?xml version="1.0" encoding="utf-8"?>
+<file path=ppt/slides/slide11.xml><?xml version="1.0" encoding="utf-8"?>
 <p:sld xmlns:a="http://schemas.openxmlformats.org/drawingml/2006/main" xmlns:r="http://schemas.openxmlformats.org/officeDocument/2006/relationships" xmlns:p="http://schemas.openxmlformats.org/presentationml/2006/main">
   <p:cSld>
     <p:spTree>
@@ -3736,10 +3651,10 @@
       </p:grpSpPr>
       <p:pic>
         <p:nvPicPr>
-          <p:cNvPr id="3" name="Imagem 2" descr="Uma imagem contendo cd&#10;&#10;Descrição gerada automaticamente">
-            <a:extLst>
-              <a:ext uri="{FF2B5EF4-FFF2-40B4-BE49-F238E27FC236}">
-                <a16:creationId xmlns:a16="http://schemas.microsoft.com/office/drawing/2014/main" id="{E4DD5DB2-2592-4958-B8C3-2AAE8366CA79}"/>
+          <p:cNvPr id="5" name="Imagem 4" descr="Tela de celular com publicação numa rede social&#10;&#10;Descrição gerada automaticamente">
+            <a:extLst>
+              <a:ext uri="{FF2B5EF4-FFF2-40B4-BE49-F238E27FC236}">
+                <a16:creationId xmlns:a16="http://schemas.microsoft.com/office/drawing/2014/main" id="{23EF186C-2491-4194-A1FA-654153C165EF}"/>
               </a:ext>
             </a:extLst>
           </p:cNvPr>
@@ -3773,7 +3688,7 @@
     </p:spTree>
     <p:extLst>
       <p:ext uri="{BB962C8B-B14F-4D97-AF65-F5344CB8AC3E}">
-        <p14:creationId xmlns:p14="http://schemas.microsoft.com/office/powerpoint/2010/main" val="2983169794"/>
+        <p14:creationId xmlns:p14="http://schemas.microsoft.com/office/powerpoint/2010/main" val="262619012"/>
       </p:ext>
     </p:extLst>
   </p:cSld>
@@ -3802,10 +3717,10 @@
       </p:grpSpPr>
       <p:pic>
         <p:nvPicPr>
-          <p:cNvPr id="5" name="Imagem 4" descr="Tela de celular com publicação numa rede social&#10;&#10;Descrição gerada automaticamente">
-            <a:extLst>
-              <a:ext uri="{FF2B5EF4-FFF2-40B4-BE49-F238E27FC236}">
-                <a16:creationId xmlns:a16="http://schemas.microsoft.com/office/drawing/2014/main" id="{23EF186C-2491-4194-A1FA-654153C165EF}"/>
+          <p:cNvPr id="6" name="Imagem 5" descr="Tela de celular com texto preto sobre fundo branco&#10;&#10;Descrição gerada automaticamente">
+            <a:extLst>
+              <a:ext uri="{FF2B5EF4-FFF2-40B4-BE49-F238E27FC236}">
+                <a16:creationId xmlns:a16="http://schemas.microsoft.com/office/drawing/2014/main" id="{57B337ED-1B4D-4F41-9693-906D7CC1C126}"/>
               </a:ext>
             </a:extLst>
           </p:cNvPr>
@@ -3836,10 +3751,59 @@
           </a:prstGeom>
         </p:spPr>
       </p:pic>
+      <p:sp>
+        <p:nvSpPr>
+          <p:cNvPr id="2" name="Retângulo 1">
+            <a:extLst>
+              <a:ext uri="{FF2B5EF4-FFF2-40B4-BE49-F238E27FC236}">
+                <a16:creationId xmlns:a16="http://schemas.microsoft.com/office/drawing/2014/main" id="{F37C2FCE-3E7C-4831-838F-A79D3051EF3D}"/>
+              </a:ext>
+            </a:extLst>
+          </p:cNvPr>
+          <p:cNvSpPr/>
+          <p:nvPr/>
+        </p:nvSpPr>
+        <p:spPr>
+          <a:xfrm>
+            <a:off x="7715251" y="2021681"/>
+            <a:ext cx="2157412" cy="2814637"/>
+          </a:xfrm>
+          <a:prstGeom prst="rect">
+            <a:avLst/>
+          </a:prstGeom>
+        </p:spPr>
+        <p:style>
+          <a:lnRef idx="2">
+            <a:schemeClr val="accent1">
+              <a:shade val="50000"/>
+            </a:schemeClr>
+          </a:lnRef>
+          <a:fillRef idx="1">
+            <a:schemeClr val="accent1"/>
+          </a:fillRef>
+          <a:effectRef idx="0">
+            <a:schemeClr val="accent1"/>
+          </a:effectRef>
+          <a:fontRef idx="minor">
+            <a:schemeClr val="lt1"/>
+          </a:fontRef>
+        </p:style>
+        <p:txBody>
+          <a:bodyPr rtlCol="0" anchor="ctr"/>
+          <a:lstStyle/>
+          <a:p>
+            <a:pPr algn="ctr"/>
+            <a:r>
+              <a:rPr lang="pt-BR" sz="2800" dirty="0"/>
+              <a:t>Colocar dados sobre ensino superior</a:t>
+            </a:r>
+          </a:p>
+        </p:txBody>
+      </p:sp>
     </p:spTree>
     <p:extLst>
       <p:ext uri="{BB962C8B-B14F-4D97-AF65-F5344CB8AC3E}">
-        <p14:creationId xmlns:p14="http://schemas.microsoft.com/office/powerpoint/2010/main" val="262619012"/>
+        <p14:creationId xmlns:p14="http://schemas.microsoft.com/office/powerpoint/2010/main" val="2943105770"/>
       </p:ext>
     </p:extLst>
   </p:cSld>
@@ -3868,10 +3832,10 @@
       </p:grpSpPr>
       <p:pic>
         <p:nvPicPr>
-          <p:cNvPr id="6" name="Imagem 5" descr="Tela de celular com texto preto sobre fundo branco&#10;&#10;Descrição gerada automaticamente">
-            <a:extLst>
-              <a:ext uri="{FF2B5EF4-FFF2-40B4-BE49-F238E27FC236}">
-                <a16:creationId xmlns:a16="http://schemas.microsoft.com/office/drawing/2014/main" id="{57B337ED-1B4D-4F41-9693-906D7CC1C126}"/>
+          <p:cNvPr id="4" name="Imagem 3" descr="Tela de celular com texto preto sobre fundo branco&#10;&#10;Descrição gerada automaticamente">
+            <a:extLst>
+              <a:ext uri="{FF2B5EF4-FFF2-40B4-BE49-F238E27FC236}">
+                <a16:creationId xmlns:a16="http://schemas.microsoft.com/office/drawing/2014/main" id="{706BF2F2-3D10-4583-8C56-DD7015E2380F}"/>
               </a:ext>
             </a:extLst>
           </p:cNvPr>
@@ -3902,10 +3866,59 @@
           </a:prstGeom>
         </p:spPr>
       </p:pic>
+      <p:sp>
+        <p:nvSpPr>
+          <p:cNvPr id="2" name="Retângulo 1">
+            <a:extLst>
+              <a:ext uri="{FF2B5EF4-FFF2-40B4-BE49-F238E27FC236}">
+                <a16:creationId xmlns:a16="http://schemas.microsoft.com/office/drawing/2014/main" id="{5DC163BA-156C-4DE0-913D-76E0A6E87244}"/>
+              </a:ext>
+            </a:extLst>
+          </p:cNvPr>
+          <p:cNvSpPr/>
+          <p:nvPr/>
+        </p:nvSpPr>
+        <p:spPr>
+          <a:xfrm>
+            <a:off x="657225" y="1371600"/>
+            <a:ext cx="4743450" cy="1800225"/>
+          </a:xfrm>
+          <a:prstGeom prst="rect">
+            <a:avLst/>
+          </a:prstGeom>
+        </p:spPr>
+        <p:style>
+          <a:lnRef idx="2">
+            <a:schemeClr val="accent1">
+              <a:shade val="50000"/>
+            </a:schemeClr>
+          </a:lnRef>
+          <a:fillRef idx="1">
+            <a:schemeClr val="accent1"/>
+          </a:fillRef>
+          <a:effectRef idx="0">
+            <a:schemeClr val="accent1"/>
+          </a:effectRef>
+          <a:fontRef idx="minor">
+            <a:schemeClr val="lt1"/>
+          </a:fontRef>
+        </p:style>
+        <p:txBody>
+          <a:bodyPr rtlCol="0" anchor="ctr"/>
+          <a:lstStyle/>
+          <a:p>
+            <a:pPr algn="ctr"/>
+            <a:r>
+              <a:rPr lang="pt-BR" sz="2800" dirty="0"/>
+              <a:t>Escrever por extenso o que é OER</a:t>
+            </a:r>
+          </a:p>
+        </p:txBody>
+      </p:sp>
     </p:spTree>
     <p:extLst>
       <p:ext uri="{BB962C8B-B14F-4D97-AF65-F5344CB8AC3E}">
-        <p14:creationId xmlns:p14="http://schemas.microsoft.com/office/powerpoint/2010/main" val="2943105770"/>
+        <p14:creationId xmlns:p14="http://schemas.microsoft.com/office/powerpoint/2010/main" val="4030107903"/>
       </p:ext>
     </p:extLst>
   </p:cSld>
@@ -3934,10 +3947,10 @@
       </p:grpSpPr>
       <p:pic>
         <p:nvPicPr>
-          <p:cNvPr id="4" name="Imagem 3" descr="Tela de celular com texto preto sobre fundo branco&#10;&#10;Descrição gerada automaticamente">
-            <a:extLst>
-              <a:ext uri="{FF2B5EF4-FFF2-40B4-BE49-F238E27FC236}">
-                <a16:creationId xmlns:a16="http://schemas.microsoft.com/office/drawing/2014/main" id="{706BF2F2-3D10-4583-8C56-DD7015E2380F}"/>
+          <p:cNvPr id="3" name="Imagem 2" descr="Texto preto sobre fundo branco&#10;&#10;Descrição gerada automaticamente">
+            <a:extLst>
+              <a:ext uri="{FF2B5EF4-FFF2-40B4-BE49-F238E27FC236}">
+                <a16:creationId xmlns:a16="http://schemas.microsoft.com/office/drawing/2014/main" id="{6A3C6D80-8A02-497C-9EDA-EFF520597365}"/>
               </a:ext>
             </a:extLst>
           </p:cNvPr>
@@ -3968,10 +3981,66 @@
           </a:prstGeom>
         </p:spPr>
       </p:pic>
+      <p:sp>
+        <p:nvSpPr>
+          <p:cNvPr id="2" name="Retângulo 1">
+            <a:extLst>
+              <a:ext uri="{FF2B5EF4-FFF2-40B4-BE49-F238E27FC236}">
+                <a16:creationId xmlns:a16="http://schemas.microsoft.com/office/drawing/2014/main" id="{85C0FE83-FBDF-4BFC-B3BD-79CB89F99C12}"/>
+              </a:ext>
+            </a:extLst>
+          </p:cNvPr>
+          <p:cNvSpPr/>
+          <p:nvPr/>
+        </p:nvSpPr>
+        <p:spPr>
+          <a:xfrm>
+            <a:off x="1300162" y="1828800"/>
+            <a:ext cx="4067175" cy="1828800"/>
+          </a:xfrm>
+          <a:prstGeom prst="rect">
+            <a:avLst/>
+          </a:prstGeom>
+        </p:spPr>
+        <p:style>
+          <a:lnRef idx="2">
+            <a:schemeClr val="accent1">
+              <a:shade val="50000"/>
+            </a:schemeClr>
+          </a:lnRef>
+          <a:fillRef idx="1">
+            <a:schemeClr val="accent1"/>
+          </a:fillRef>
+          <a:effectRef idx="0">
+            <a:schemeClr val="accent1"/>
+          </a:effectRef>
+          <a:fontRef idx="minor">
+            <a:schemeClr val="lt1"/>
+          </a:fontRef>
+        </p:style>
+        <p:txBody>
+          <a:bodyPr rtlCol="0" anchor="ctr"/>
+          <a:lstStyle/>
+          <a:p>
+            <a:pPr algn="ctr"/>
+            <a:r>
+              <a:rPr lang="pt-BR" sz="2400" dirty="0"/>
+              <a:t>Na apresentação, focar no QUIS de múltipla escolha. </a:t>
+            </a:r>
+          </a:p>
+          <a:p>
+            <a:pPr algn="ctr"/>
+            <a:r>
+              <a:rPr lang="pt-BR" sz="2400" dirty="0"/>
+              <a:t>Alterar o texto para perguntas objetivas.</a:t>
+            </a:r>
+          </a:p>
+        </p:txBody>
+      </p:sp>
     </p:spTree>
     <p:extLst>
       <p:ext uri="{BB962C8B-B14F-4D97-AF65-F5344CB8AC3E}">
-        <p14:creationId xmlns:p14="http://schemas.microsoft.com/office/powerpoint/2010/main" val="4030107903"/>
+        <p14:creationId xmlns:p14="http://schemas.microsoft.com/office/powerpoint/2010/main" val="4087358166"/>
       </p:ext>
     </p:extLst>
   </p:cSld>
@@ -4000,10 +4069,10 @@
       </p:grpSpPr>
       <p:pic>
         <p:nvPicPr>
-          <p:cNvPr id="3" name="Imagem 2" descr="Texto preto sobre fundo branco&#10;&#10;Descrição gerada automaticamente">
-            <a:extLst>
-              <a:ext uri="{FF2B5EF4-FFF2-40B4-BE49-F238E27FC236}">
-                <a16:creationId xmlns:a16="http://schemas.microsoft.com/office/drawing/2014/main" id="{6A3C6D80-8A02-497C-9EDA-EFF520597365}"/>
+          <p:cNvPr id="5" name="Imagem 4" descr="Tela de celular com texto preto sobre fundo branco&#10;&#10;Descrição gerada automaticamente">
+            <a:extLst>
+              <a:ext uri="{FF2B5EF4-FFF2-40B4-BE49-F238E27FC236}">
+                <a16:creationId xmlns:a16="http://schemas.microsoft.com/office/drawing/2014/main" id="{D505D429-AF18-4C26-B58D-E69A4673C243}"/>
               </a:ext>
             </a:extLst>
           </p:cNvPr>
@@ -4034,10 +4103,59 @@
           </a:prstGeom>
         </p:spPr>
       </p:pic>
+      <p:sp>
+        <p:nvSpPr>
+          <p:cNvPr id="2" name="Retângulo 1">
+            <a:extLst>
+              <a:ext uri="{FF2B5EF4-FFF2-40B4-BE49-F238E27FC236}">
+                <a16:creationId xmlns:a16="http://schemas.microsoft.com/office/drawing/2014/main" id="{B259B3B9-6849-45BD-B572-2BCF8056A73D}"/>
+              </a:ext>
+            </a:extLst>
+          </p:cNvPr>
+          <p:cNvSpPr/>
+          <p:nvPr/>
+        </p:nvSpPr>
+        <p:spPr>
+          <a:xfrm>
+            <a:off x="7205664" y="3886200"/>
+            <a:ext cx="4400550" cy="1771650"/>
+          </a:xfrm>
+          <a:prstGeom prst="rect">
+            <a:avLst/>
+          </a:prstGeom>
+        </p:spPr>
+        <p:style>
+          <a:lnRef idx="2">
+            <a:schemeClr val="accent1">
+              <a:shade val="50000"/>
+            </a:schemeClr>
+          </a:lnRef>
+          <a:fillRef idx="1">
+            <a:schemeClr val="accent1"/>
+          </a:fillRef>
+          <a:effectRef idx="0">
+            <a:schemeClr val="accent1"/>
+          </a:effectRef>
+          <a:fontRef idx="minor">
+            <a:schemeClr val="lt1"/>
+          </a:fontRef>
+        </p:style>
+        <p:txBody>
+          <a:bodyPr rtlCol="0" anchor="ctr"/>
+          <a:lstStyle/>
+          <a:p>
+            <a:pPr algn="ctr"/>
+            <a:r>
+              <a:rPr lang="pt-BR" sz="2800" dirty="0"/>
+              <a:t>Incluir referência bibliográficas.</a:t>
+            </a:r>
+          </a:p>
+        </p:txBody>
+      </p:sp>
     </p:spTree>
     <p:extLst>
       <p:ext uri="{BB962C8B-B14F-4D97-AF65-F5344CB8AC3E}">
-        <p14:creationId xmlns:p14="http://schemas.microsoft.com/office/powerpoint/2010/main" val="4087358166"/>
+        <p14:creationId xmlns:p14="http://schemas.microsoft.com/office/powerpoint/2010/main" val="14479773"/>
       </p:ext>
     </p:extLst>
   </p:cSld>
@@ -4100,6 +4218,55 @@
           </a:prstGeom>
         </p:spPr>
       </p:pic>
+      <p:sp>
+        <p:nvSpPr>
+          <p:cNvPr id="2" name="Retângulo 1">
+            <a:extLst>
+              <a:ext uri="{FF2B5EF4-FFF2-40B4-BE49-F238E27FC236}">
+                <a16:creationId xmlns:a16="http://schemas.microsoft.com/office/drawing/2014/main" id="{27123E5F-8245-44FA-A455-29CA3E43B105}"/>
+              </a:ext>
+            </a:extLst>
+          </p:cNvPr>
+          <p:cNvSpPr/>
+          <p:nvPr/>
+        </p:nvSpPr>
+        <p:spPr>
+          <a:xfrm>
+            <a:off x="2914650" y="2171700"/>
+            <a:ext cx="4171950" cy="2200275"/>
+          </a:xfrm>
+          <a:prstGeom prst="rect">
+            <a:avLst/>
+          </a:prstGeom>
+        </p:spPr>
+        <p:style>
+          <a:lnRef idx="2">
+            <a:schemeClr val="accent1">
+              <a:shade val="50000"/>
+            </a:schemeClr>
+          </a:lnRef>
+          <a:fillRef idx="1">
+            <a:schemeClr val="accent1"/>
+          </a:fillRef>
+          <a:effectRef idx="0">
+            <a:schemeClr val="accent1"/>
+          </a:effectRef>
+          <a:fontRef idx="minor">
+            <a:schemeClr val="lt1"/>
+          </a:fontRef>
+        </p:style>
+        <p:txBody>
+          <a:bodyPr rtlCol="0" anchor="ctr"/>
+          <a:lstStyle/>
+          <a:p>
+            <a:pPr algn="ctr"/>
+            <a:r>
+              <a:rPr lang="pt-BR" sz="2800" dirty="0"/>
+              <a:t>Alterar o texto para deixar claro que estamos tratando de perguntas objetivas</a:t>
+            </a:r>
+          </a:p>
+        </p:txBody>
+      </p:sp>
     </p:spTree>
     <p:extLst>
       <p:ext uri="{BB962C8B-B14F-4D97-AF65-F5344CB8AC3E}">
@@ -4132,10 +4299,10 @@
       </p:grpSpPr>
       <p:pic>
         <p:nvPicPr>
-          <p:cNvPr id="5" name="Imagem 4" descr="Tela de celular com texto preto sobre fundo branco&#10;&#10;Descrição gerada automaticamente">
-            <a:extLst>
-              <a:ext uri="{FF2B5EF4-FFF2-40B4-BE49-F238E27FC236}">
-                <a16:creationId xmlns:a16="http://schemas.microsoft.com/office/drawing/2014/main" id="{D505D429-AF18-4C26-B58D-E69A4673C243}"/>
+          <p:cNvPr id="5" name="Imagem 4" descr="Uma imagem contendo screenshot, texto, desenho&#10;&#10;Descrição gerada automaticamente">
+            <a:extLst>
+              <a:ext uri="{FF2B5EF4-FFF2-40B4-BE49-F238E27FC236}">
+                <a16:creationId xmlns:a16="http://schemas.microsoft.com/office/drawing/2014/main" id="{C90ADE1E-B4F6-474D-97C1-F7B2F287795F}"/>
               </a:ext>
             </a:extLst>
           </p:cNvPr>
@@ -4166,10 +4333,59 @@
           </a:prstGeom>
         </p:spPr>
       </p:pic>
+      <p:sp>
+        <p:nvSpPr>
+          <p:cNvPr id="2" name="Retângulo 1">
+            <a:extLst>
+              <a:ext uri="{FF2B5EF4-FFF2-40B4-BE49-F238E27FC236}">
+                <a16:creationId xmlns:a16="http://schemas.microsoft.com/office/drawing/2014/main" id="{382F366A-E39D-485C-83BB-7BD0E8FD75C4}"/>
+              </a:ext>
+            </a:extLst>
+          </p:cNvPr>
+          <p:cNvSpPr/>
+          <p:nvPr/>
+        </p:nvSpPr>
+        <p:spPr>
+          <a:xfrm>
+            <a:off x="2128838" y="1171575"/>
+            <a:ext cx="5957888" cy="2871787"/>
+          </a:xfrm>
+          <a:prstGeom prst="rect">
+            <a:avLst/>
+          </a:prstGeom>
+        </p:spPr>
+        <p:style>
+          <a:lnRef idx="2">
+            <a:schemeClr val="accent1">
+              <a:shade val="50000"/>
+            </a:schemeClr>
+          </a:lnRef>
+          <a:fillRef idx="1">
+            <a:schemeClr val="accent1"/>
+          </a:fillRef>
+          <a:effectRef idx="0">
+            <a:schemeClr val="accent1"/>
+          </a:effectRef>
+          <a:fontRef idx="minor">
+            <a:schemeClr val="lt1"/>
+          </a:fontRef>
+        </p:style>
+        <p:txBody>
+          <a:bodyPr rtlCol="0" anchor="ctr"/>
+          <a:lstStyle/>
+          <a:p>
+            <a:pPr algn="ctr"/>
+            <a:r>
+              <a:rPr lang="pt-BR" sz="2800" dirty="0"/>
+              <a:t>Melhorar a apresentação. Não ficou claro como o sistema vai funcionar. Talvez contar uma história!</a:t>
+            </a:r>
+          </a:p>
+        </p:txBody>
+      </p:sp>
     </p:spTree>
     <p:extLst>
       <p:ext uri="{BB962C8B-B14F-4D97-AF65-F5344CB8AC3E}">
-        <p14:creationId xmlns:p14="http://schemas.microsoft.com/office/powerpoint/2010/main" val="14479773"/>
+        <p14:creationId xmlns:p14="http://schemas.microsoft.com/office/powerpoint/2010/main" val="3211799982"/>
       </p:ext>
     </p:extLst>
   </p:cSld>

</xml_diff>

<commit_message>
Aplicando as correções na apresentação
</commit_message>
<xml_diff>
--- a/apresentacao/apresentacao.pptx
+++ b/apresentacao/apresentacao.pptx
@@ -269,7 +269,7 @@
           <a:p>
             <a:fld id="{1F1FAA24-82E9-47BA-A53E-AEAD71F0EE56}" type="datetimeFigureOut">
               <a:rPr lang="pt-BR" smtClean="0"/>
-              <a:t>16/02/2020</a:t>
+              <a:t>07/03/2020</a:t>
             </a:fld>
             <a:endParaRPr lang="pt-BR"/>
           </a:p>
@@ -467,7 +467,7 @@
           <a:p>
             <a:fld id="{1F1FAA24-82E9-47BA-A53E-AEAD71F0EE56}" type="datetimeFigureOut">
               <a:rPr lang="pt-BR" smtClean="0"/>
-              <a:t>16/02/2020</a:t>
+              <a:t>07/03/2020</a:t>
             </a:fld>
             <a:endParaRPr lang="pt-BR"/>
           </a:p>
@@ -675,7 +675,7 @@
           <a:p>
             <a:fld id="{1F1FAA24-82E9-47BA-A53E-AEAD71F0EE56}" type="datetimeFigureOut">
               <a:rPr lang="pt-BR" smtClean="0"/>
-              <a:t>16/02/2020</a:t>
+              <a:t>07/03/2020</a:t>
             </a:fld>
             <a:endParaRPr lang="pt-BR"/>
           </a:p>
@@ -873,7 +873,7 @@
           <a:p>
             <a:fld id="{1F1FAA24-82E9-47BA-A53E-AEAD71F0EE56}" type="datetimeFigureOut">
               <a:rPr lang="pt-BR" smtClean="0"/>
-              <a:t>16/02/2020</a:t>
+              <a:t>07/03/2020</a:t>
             </a:fld>
             <a:endParaRPr lang="pt-BR"/>
           </a:p>
@@ -1148,7 +1148,7 @@
           <a:p>
             <a:fld id="{1F1FAA24-82E9-47BA-A53E-AEAD71F0EE56}" type="datetimeFigureOut">
               <a:rPr lang="pt-BR" smtClean="0"/>
-              <a:t>16/02/2020</a:t>
+              <a:t>07/03/2020</a:t>
             </a:fld>
             <a:endParaRPr lang="pt-BR"/>
           </a:p>
@@ -1413,7 +1413,7 @@
           <a:p>
             <a:fld id="{1F1FAA24-82E9-47BA-A53E-AEAD71F0EE56}" type="datetimeFigureOut">
               <a:rPr lang="pt-BR" smtClean="0"/>
-              <a:t>16/02/2020</a:t>
+              <a:t>07/03/2020</a:t>
             </a:fld>
             <a:endParaRPr lang="pt-BR"/>
           </a:p>
@@ -1825,7 +1825,7 @@
           <a:p>
             <a:fld id="{1F1FAA24-82E9-47BA-A53E-AEAD71F0EE56}" type="datetimeFigureOut">
               <a:rPr lang="pt-BR" smtClean="0"/>
-              <a:t>16/02/2020</a:t>
+              <a:t>07/03/2020</a:t>
             </a:fld>
             <a:endParaRPr lang="pt-BR"/>
           </a:p>
@@ -1966,7 +1966,7 @@
           <a:p>
             <a:fld id="{1F1FAA24-82E9-47BA-A53E-AEAD71F0EE56}" type="datetimeFigureOut">
               <a:rPr lang="pt-BR" smtClean="0"/>
-              <a:t>16/02/2020</a:t>
+              <a:t>07/03/2020</a:t>
             </a:fld>
             <a:endParaRPr lang="pt-BR"/>
           </a:p>
@@ -2079,7 +2079,7 @@
           <a:p>
             <a:fld id="{1F1FAA24-82E9-47BA-A53E-AEAD71F0EE56}" type="datetimeFigureOut">
               <a:rPr lang="pt-BR" smtClean="0"/>
-              <a:t>16/02/2020</a:t>
+              <a:t>07/03/2020</a:t>
             </a:fld>
             <a:endParaRPr lang="pt-BR"/>
           </a:p>
@@ -2390,7 +2390,7 @@
           <a:p>
             <a:fld id="{1F1FAA24-82E9-47BA-A53E-AEAD71F0EE56}" type="datetimeFigureOut">
               <a:rPr lang="pt-BR" smtClean="0"/>
-              <a:t>16/02/2020</a:t>
+              <a:t>07/03/2020</a:t>
             </a:fld>
             <a:endParaRPr lang="pt-BR"/>
           </a:p>
@@ -2678,7 +2678,7 @@
           <a:p>
             <a:fld id="{1F1FAA24-82E9-47BA-A53E-AEAD71F0EE56}" type="datetimeFigureOut">
               <a:rPr lang="pt-BR" smtClean="0"/>
-              <a:t>16/02/2020</a:t>
+              <a:t>07/03/2020</a:t>
             </a:fld>
             <a:endParaRPr lang="pt-BR"/>
           </a:p>
@@ -2919,7 +2919,7 @@
           <a:p>
             <a:fld id="{1F1FAA24-82E9-47BA-A53E-AEAD71F0EE56}" type="datetimeFigureOut">
               <a:rPr lang="pt-BR" smtClean="0"/>
-              <a:t>16/02/2020</a:t>
+              <a:t>07/03/2020</a:t>
             </a:fld>
             <a:endParaRPr lang="pt-BR"/>
           </a:p>
@@ -3519,10 +3519,10 @@
       </p:grpSpPr>
       <p:pic>
         <p:nvPicPr>
-          <p:cNvPr id="6" name="Imagem 5" descr="Tela de celular com texto preto sobre fundo branco&#10;&#10;Descrição gerada automaticamente">
-            <a:extLst>
-              <a:ext uri="{FF2B5EF4-FFF2-40B4-BE49-F238E27FC236}">
-                <a16:creationId xmlns:a16="http://schemas.microsoft.com/office/drawing/2014/main" id="{BD77868B-CA7D-4588-A580-084FA005436B}"/>
+          <p:cNvPr id="3" name="Imagem 2" descr="Tela de celular com texto preto sobre fundo branco&#10;&#10;Descrição gerada automaticamente">
+            <a:extLst>
+              <a:ext uri="{FF2B5EF4-FFF2-40B4-BE49-F238E27FC236}">
+                <a16:creationId xmlns:a16="http://schemas.microsoft.com/office/drawing/2014/main" id="{9DB71A19-7736-41BF-8EE7-A23DA1E23F59}"/>
               </a:ext>
             </a:extLst>
           </p:cNvPr>
@@ -3715,57 +3715,21 @@
           <a:chExt cx="0" cy="0"/>
         </a:xfrm>
       </p:grpSpPr>
-      <p:pic>
-        <p:nvPicPr>
-          <p:cNvPr id="6" name="Imagem 5" descr="Tela de celular com texto preto sobre fundo branco&#10;&#10;Descrição gerada automaticamente">
-            <a:extLst>
-              <a:ext uri="{FF2B5EF4-FFF2-40B4-BE49-F238E27FC236}">
-                <a16:creationId xmlns:a16="http://schemas.microsoft.com/office/drawing/2014/main" id="{57B337ED-1B4D-4F41-9693-906D7CC1C126}"/>
-              </a:ext>
-            </a:extLst>
-          </p:cNvPr>
-          <p:cNvPicPr>
-            <a:picLocks noChangeAspect="1"/>
-          </p:cNvPicPr>
+      <p:sp>
+        <p:nvSpPr>
+          <p:cNvPr id="2" name="Retângulo 1">
+            <a:extLst>
+              <a:ext uri="{FF2B5EF4-FFF2-40B4-BE49-F238E27FC236}">
+                <a16:creationId xmlns:a16="http://schemas.microsoft.com/office/drawing/2014/main" id="{F37C2FCE-3E7C-4831-838F-A79D3051EF3D}"/>
+              </a:ext>
+            </a:extLst>
+          </p:cNvPr>
+          <p:cNvSpPr/>
           <p:nvPr/>
-        </p:nvPicPr>
-        <p:blipFill>
-          <a:blip r:embed="rId2">
-            <a:extLst>
-              <a:ext uri="{28A0092B-C50C-407E-A947-70E740481C1C}">
-                <a14:useLocalDpi xmlns:a14="http://schemas.microsoft.com/office/drawing/2010/main" val="0"/>
-              </a:ext>
-            </a:extLst>
-          </a:blip>
-          <a:stretch>
-            <a:fillRect/>
-          </a:stretch>
-        </p:blipFill>
+        </p:nvSpPr>
         <p:spPr>
           <a:xfrm>
-            <a:off x="0" y="0"/>
-            <a:ext cx="12192000" cy="6858000"/>
-          </a:xfrm>
-          <a:prstGeom prst="rect">
-            <a:avLst/>
-          </a:prstGeom>
-        </p:spPr>
-      </p:pic>
-      <p:sp>
-        <p:nvSpPr>
-          <p:cNvPr id="2" name="Retângulo 1">
-            <a:extLst>
-              <a:ext uri="{FF2B5EF4-FFF2-40B4-BE49-F238E27FC236}">
-                <a16:creationId xmlns:a16="http://schemas.microsoft.com/office/drawing/2014/main" id="{F37C2FCE-3E7C-4831-838F-A79D3051EF3D}"/>
-              </a:ext>
-            </a:extLst>
-          </p:cNvPr>
-          <p:cNvSpPr/>
-          <p:nvPr/>
-        </p:nvSpPr>
-        <p:spPr>
-          <a:xfrm>
-            <a:off x="7715251" y="2021681"/>
+            <a:off x="12515851" y="821531"/>
             <a:ext cx="2157412" cy="2814637"/>
           </a:xfrm>
           <a:prstGeom prst="rect">
@@ -3800,6 +3764,42 @@
           </a:p>
         </p:txBody>
       </p:sp>
+      <p:pic>
+        <p:nvPicPr>
+          <p:cNvPr id="4" name="Imagem 3" descr="Tela de celular com texto preto sobre fundo branco&#10;&#10;Descrição gerada automaticamente">
+            <a:extLst>
+              <a:ext uri="{FF2B5EF4-FFF2-40B4-BE49-F238E27FC236}">
+                <a16:creationId xmlns:a16="http://schemas.microsoft.com/office/drawing/2014/main" id="{A258560F-FCF7-448E-B401-FD385AB542EF}"/>
+              </a:ext>
+            </a:extLst>
+          </p:cNvPr>
+          <p:cNvPicPr>
+            <a:picLocks noChangeAspect="1"/>
+          </p:cNvPicPr>
+          <p:nvPr/>
+        </p:nvPicPr>
+        <p:blipFill>
+          <a:blip r:embed="rId2">
+            <a:extLst>
+              <a:ext uri="{28A0092B-C50C-407E-A947-70E740481C1C}">
+                <a14:useLocalDpi xmlns:a14="http://schemas.microsoft.com/office/drawing/2010/main" val="0"/>
+              </a:ext>
+            </a:extLst>
+          </a:blip>
+          <a:stretch>
+            <a:fillRect/>
+          </a:stretch>
+        </p:blipFill>
+        <p:spPr>
+          <a:xfrm>
+            <a:off x="0" y="0"/>
+            <a:ext cx="12192000" cy="6858000"/>
+          </a:xfrm>
+          <a:prstGeom prst="rect">
+            <a:avLst/>
+          </a:prstGeom>
+        </p:spPr>
+      </p:pic>
     </p:spTree>
     <p:extLst>
       <p:ext uri="{BB962C8B-B14F-4D97-AF65-F5344CB8AC3E}">
@@ -3830,57 +3830,21 @@
           <a:chExt cx="0" cy="0"/>
         </a:xfrm>
       </p:grpSpPr>
-      <p:pic>
-        <p:nvPicPr>
-          <p:cNvPr id="4" name="Imagem 3" descr="Tela de celular com texto preto sobre fundo branco&#10;&#10;Descrição gerada automaticamente">
-            <a:extLst>
-              <a:ext uri="{FF2B5EF4-FFF2-40B4-BE49-F238E27FC236}">
-                <a16:creationId xmlns:a16="http://schemas.microsoft.com/office/drawing/2014/main" id="{706BF2F2-3D10-4583-8C56-DD7015E2380F}"/>
-              </a:ext>
-            </a:extLst>
-          </p:cNvPr>
-          <p:cNvPicPr>
-            <a:picLocks noChangeAspect="1"/>
-          </p:cNvPicPr>
+      <p:sp>
+        <p:nvSpPr>
+          <p:cNvPr id="2" name="Retângulo 1">
+            <a:extLst>
+              <a:ext uri="{FF2B5EF4-FFF2-40B4-BE49-F238E27FC236}">
+                <a16:creationId xmlns:a16="http://schemas.microsoft.com/office/drawing/2014/main" id="{5DC163BA-156C-4DE0-913D-76E0A6E87244}"/>
+              </a:ext>
+            </a:extLst>
+          </p:cNvPr>
+          <p:cNvSpPr/>
           <p:nvPr/>
-        </p:nvPicPr>
-        <p:blipFill>
-          <a:blip r:embed="rId2">
-            <a:extLst>
-              <a:ext uri="{28A0092B-C50C-407E-A947-70E740481C1C}">
-                <a14:useLocalDpi xmlns:a14="http://schemas.microsoft.com/office/drawing/2010/main" val="0"/>
-              </a:ext>
-            </a:extLst>
-          </a:blip>
-          <a:stretch>
-            <a:fillRect/>
-          </a:stretch>
-        </p:blipFill>
+        </p:nvSpPr>
         <p:spPr>
           <a:xfrm>
-            <a:off x="0" y="0"/>
-            <a:ext cx="12192000" cy="6858000"/>
-          </a:xfrm>
-          <a:prstGeom prst="rect">
-            <a:avLst/>
-          </a:prstGeom>
-        </p:spPr>
-      </p:pic>
-      <p:sp>
-        <p:nvSpPr>
-          <p:cNvPr id="2" name="Retângulo 1">
-            <a:extLst>
-              <a:ext uri="{FF2B5EF4-FFF2-40B4-BE49-F238E27FC236}">
-                <a16:creationId xmlns:a16="http://schemas.microsoft.com/office/drawing/2014/main" id="{5DC163BA-156C-4DE0-913D-76E0A6E87244}"/>
-              </a:ext>
-            </a:extLst>
-          </p:cNvPr>
-          <p:cNvSpPr/>
-          <p:nvPr/>
-        </p:nvSpPr>
-        <p:spPr>
-          <a:xfrm>
-            <a:off x="657225" y="1371600"/>
+            <a:off x="12838340" y="783772"/>
             <a:ext cx="4743450" cy="1800225"/>
           </a:xfrm>
           <a:prstGeom prst="rect">
@@ -3915,6 +3879,42 @@
           </a:p>
         </p:txBody>
       </p:sp>
+      <p:pic>
+        <p:nvPicPr>
+          <p:cNvPr id="5" name="Imagem 4" descr="Tela de celular com texto preto sobre fundo branco&#10;&#10;Descrição gerada automaticamente">
+            <a:extLst>
+              <a:ext uri="{FF2B5EF4-FFF2-40B4-BE49-F238E27FC236}">
+                <a16:creationId xmlns:a16="http://schemas.microsoft.com/office/drawing/2014/main" id="{71C7EFA7-849D-4606-B0C1-083B34A5094C}"/>
+              </a:ext>
+            </a:extLst>
+          </p:cNvPr>
+          <p:cNvPicPr>
+            <a:picLocks noChangeAspect="1"/>
+          </p:cNvPicPr>
+          <p:nvPr/>
+        </p:nvPicPr>
+        <p:blipFill>
+          <a:blip r:embed="rId2">
+            <a:extLst>
+              <a:ext uri="{28A0092B-C50C-407E-A947-70E740481C1C}">
+                <a14:useLocalDpi xmlns:a14="http://schemas.microsoft.com/office/drawing/2010/main" val="0"/>
+              </a:ext>
+            </a:extLst>
+          </a:blip>
+          <a:stretch>
+            <a:fillRect/>
+          </a:stretch>
+        </p:blipFill>
+        <p:spPr>
+          <a:xfrm>
+            <a:off x="0" y="0"/>
+            <a:ext cx="12192000" cy="6858000"/>
+          </a:xfrm>
+          <a:prstGeom prst="rect">
+            <a:avLst/>
+          </a:prstGeom>
+        </p:spPr>
+      </p:pic>
     </p:spTree>
     <p:extLst>
       <p:ext uri="{BB962C8B-B14F-4D97-AF65-F5344CB8AC3E}">
@@ -3947,10 +3947,10 @@
       </p:grpSpPr>
       <p:pic>
         <p:nvPicPr>
-          <p:cNvPr id="3" name="Imagem 2" descr="Texto preto sobre fundo branco&#10;&#10;Descrição gerada automaticamente">
-            <a:extLst>
-              <a:ext uri="{FF2B5EF4-FFF2-40B4-BE49-F238E27FC236}">
-                <a16:creationId xmlns:a16="http://schemas.microsoft.com/office/drawing/2014/main" id="{6A3C6D80-8A02-497C-9EDA-EFF520597365}"/>
+          <p:cNvPr id="5" name="Imagem 4" descr="Texto preto sobre fundo branco&#10;&#10;Descrição gerada automaticamente">
+            <a:extLst>
+              <a:ext uri="{FF2B5EF4-FFF2-40B4-BE49-F238E27FC236}">
+                <a16:creationId xmlns:a16="http://schemas.microsoft.com/office/drawing/2014/main" id="{E2DD12C9-E9CB-4AE6-ABD8-3BE60A1FFE59}"/>
               </a:ext>
             </a:extLst>
           </p:cNvPr>
@@ -3995,7 +3995,7 @@
         </p:nvSpPr>
         <p:spPr>
           <a:xfrm>
-            <a:off x="1300162" y="1828800"/>
+            <a:off x="12749212" y="0"/>
             <a:ext cx="4067175" cy="1828800"/>
           </a:xfrm>
           <a:prstGeom prst="rect">
@@ -4067,57 +4067,21 @@
           <a:chExt cx="0" cy="0"/>
         </a:xfrm>
       </p:grpSpPr>
-      <p:pic>
-        <p:nvPicPr>
-          <p:cNvPr id="5" name="Imagem 4" descr="Tela de celular com texto preto sobre fundo branco&#10;&#10;Descrição gerada automaticamente">
-            <a:extLst>
-              <a:ext uri="{FF2B5EF4-FFF2-40B4-BE49-F238E27FC236}">
-                <a16:creationId xmlns:a16="http://schemas.microsoft.com/office/drawing/2014/main" id="{D505D429-AF18-4C26-B58D-E69A4673C243}"/>
-              </a:ext>
-            </a:extLst>
-          </p:cNvPr>
-          <p:cNvPicPr>
-            <a:picLocks noChangeAspect="1"/>
-          </p:cNvPicPr>
+      <p:sp>
+        <p:nvSpPr>
+          <p:cNvPr id="2" name="Retângulo 1">
+            <a:extLst>
+              <a:ext uri="{FF2B5EF4-FFF2-40B4-BE49-F238E27FC236}">
+                <a16:creationId xmlns:a16="http://schemas.microsoft.com/office/drawing/2014/main" id="{B259B3B9-6849-45BD-B572-2BCF8056A73D}"/>
+              </a:ext>
+            </a:extLst>
+          </p:cNvPr>
+          <p:cNvSpPr/>
           <p:nvPr/>
-        </p:nvPicPr>
-        <p:blipFill>
-          <a:blip r:embed="rId2">
-            <a:extLst>
-              <a:ext uri="{28A0092B-C50C-407E-A947-70E740481C1C}">
-                <a14:useLocalDpi xmlns:a14="http://schemas.microsoft.com/office/drawing/2010/main" val="0"/>
-              </a:ext>
-            </a:extLst>
-          </a:blip>
-          <a:stretch>
-            <a:fillRect/>
-          </a:stretch>
-        </p:blipFill>
+        </p:nvSpPr>
         <p:spPr>
           <a:xfrm>
-            <a:off x="0" y="0"/>
-            <a:ext cx="12192000" cy="6858000"/>
-          </a:xfrm>
-          <a:prstGeom prst="rect">
-            <a:avLst/>
-          </a:prstGeom>
-        </p:spPr>
-      </p:pic>
-      <p:sp>
-        <p:nvSpPr>
-          <p:cNvPr id="2" name="Retângulo 1">
-            <a:extLst>
-              <a:ext uri="{FF2B5EF4-FFF2-40B4-BE49-F238E27FC236}">
-                <a16:creationId xmlns:a16="http://schemas.microsoft.com/office/drawing/2014/main" id="{B259B3B9-6849-45BD-B572-2BCF8056A73D}"/>
-              </a:ext>
-            </a:extLst>
-          </p:cNvPr>
-          <p:cNvSpPr/>
-          <p:nvPr/>
-        </p:nvSpPr>
-        <p:spPr>
-          <a:xfrm>
-            <a:off x="7205664" y="3886200"/>
+            <a:off x="12541085" y="0"/>
             <a:ext cx="4400550" cy="1771650"/>
           </a:xfrm>
           <a:prstGeom prst="rect">
@@ -4152,6 +4116,42 @@
           </a:p>
         </p:txBody>
       </p:sp>
+      <p:pic>
+        <p:nvPicPr>
+          <p:cNvPr id="7" name="Imagem 6" descr="Uma imagem contendo texto, screenshot&#10;&#10;Descrição gerada automaticamente">
+            <a:extLst>
+              <a:ext uri="{FF2B5EF4-FFF2-40B4-BE49-F238E27FC236}">
+                <a16:creationId xmlns:a16="http://schemas.microsoft.com/office/drawing/2014/main" id="{15612ED1-52FB-4945-B499-F44A61FB9E37}"/>
+              </a:ext>
+            </a:extLst>
+          </p:cNvPr>
+          <p:cNvPicPr>
+            <a:picLocks noChangeAspect="1"/>
+          </p:cNvPicPr>
+          <p:nvPr/>
+        </p:nvPicPr>
+        <p:blipFill>
+          <a:blip r:embed="rId2">
+            <a:extLst>
+              <a:ext uri="{28A0092B-C50C-407E-A947-70E740481C1C}">
+                <a14:useLocalDpi xmlns:a14="http://schemas.microsoft.com/office/drawing/2010/main" val="0"/>
+              </a:ext>
+            </a:extLst>
+          </a:blip>
+          <a:stretch>
+            <a:fillRect/>
+          </a:stretch>
+        </p:blipFill>
+        <p:spPr>
+          <a:xfrm>
+            <a:off x="0" y="0"/>
+            <a:ext cx="12192000" cy="6858000"/>
+          </a:xfrm>
+          <a:prstGeom prst="rect">
+            <a:avLst/>
+          </a:prstGeom>
+        </p:spPr>
+      </p:pic>
     </p:spTree>
     <p:extLst>
       <p:ext uri="{BB962C8B-B14F-4D97-AF65-F5344CB8AC3E}">

</xml_diff>

<commit_message>
ajustando a apresentação e incluindo os resultados parciais
</commit_message>
<xml_diff>
--- a/apresentacao/apresentacao.pptx
+++ b/apresentacao/apresentacao.pptx
@@ -270,7 +270,7 @@
           <a:p>
             <a:fld id="{1F1FAA24-82E9-47BA-A53E-AEAD71F0EE56}" type="datetimeFigureOut">
               <a:rPr lang="pt-BR" smtClean="0"/>
-              <a:t>08/05/2020</a:t>
+              <a:t>10/05/2020</a:t>
             </a:fld>
             <a:endParaRPr lang="pt-BR"/>
           </a:p>
@@ -468,7 +468,7 @@
           <a:p>
             <a:fld id="{1F1FAA24-82E9-47BA-A53E-AEAD71F0EE56}" type="datetimeFigureOut">
               <a:rPr lang="pt-BR" smtClean="0"/>
-              <a:t>08/05/2020</a:t>
+              <a:t>10/05/2020</a:t>
             </a:fld>
             <a:endParaRPr lang="pt-BR"/>
           </a:p>
@@ -676,7 +676,7 @@
           <a:p>
             <a:fld id="{1F1FAA24-82E9-47BA-A53E-AEAD71F0EE56}" type="datetimeFigureOut">
               <a:rPr lang="pt-BR" smtClean="0"/>
-              <a:t>08/05/2020</a:t>
+              <a:t>10/05/2020</a:t>
             </a:fld>
             <a:endParaRPr lang="pt-BR"/>
           </a:p>
@@ -874,7 +874,7 @@
           <a:p>
             <a:fld id="{1F1FAA24-82E9-47BA-A53E-AEAD71F0EE56}" type="datetimeFigureOut">
               <a:rPr lang="pt-BR" smtClean="0"/>
-              <a:t>08/05/2020</a:t>
+              <a:t>10/05/2020</a:t>
             </a:fld>
             <a:endParaRPr lang="pt-BR"/>
           </a:p>
@@ -1149,7 +1149,7 @@
           <a:p>
             <a:fld id="{1F1FAA24-82E9-47BA-A53E-AEAD71F0EE56}" type="datetimeFigureOut">
               <a:rPr lang="pt-BR" smtClean="0"/>
-              <a:t>08/05/2020</a:t>
+              <a:t>10/05/2020</a:t>
             </a:fld>
             <a:endParaRPr lang="pt-BR"/>
           </a:p>
@@ -1414,7 +1414,7 @@
           <a:p>
             <a:fld id="{1F1FAA24-82E9-47BA-A53E-AEAD71F0EE56}" type="datetimeFigureOut">
               <a:rPr lang="pt-BR" smtClean="0"/>
-              <a:t>08/05/2020</a:t>
+              <a:t>10/05/2020</a:t>
             </a:fld>
             <a:endParaRPr lang="pt-BR"/>
           </a:p>
@@ -1826,7 +1826,7 @@
           <a:p>
             <a:fld id="{1F1FAA24-82E9-47BA-A53E-AEAD71F0EE56}" type="datetimeFigureOut">
               <a:rPr lang="pt-BR" smtClean="0"/>
-              <a:t>08/05/2020</a:t>
+              <a:t>10/05/2020</a:t>
             </a:fld>
             <a:endParaRPr lang="pt-BR"/>
           </a:p>
@@ -1967,7 +1967,7 @@
           <a:p>
             <a:fld id="{1F1FAA24-82E9-47BA-A53E-AEAD71F0EE56}" type="datetimeFigureOut">
               <a:rPr lang="pt-BR" smtClean="0"/>
-              <a:t>08/05/2020</a:t>
+              <a:t>10/05/2020</a:t>
             </a:fld>
             <a:endParaRPr lang="pt-BR"/>
           </a:p>
@@ -2080,7 +2080,7 @@
           <a:p>
             <a:fld id="{1F1FAA24-82E9-47BA-A53E-AEAD71F0EE56}" type="datetimeFigureOut">
               <a:rPr lang="pt-BR" smtClean="0"/>
-              <a:t>08/05/2020</a:t>
+              <a:t>10/05/2020</a:t>
             </a:fld>
             <a:endParaRPr lang="pt-BR"/>
           </a:p>
@@ -2391,7 +2391,7 @@
           <a:p>
             <a:fld id="{1F1FAA24-82E9-47BA-A53E-AEAD71F0EE56}" type="datetimeFigureOut">
               <a:rPr lang="pt-BR" smtClean="0"/>
-              <a:t>08/05/2020</a:t>
+              <a:t>10/05/2020</a:t>
             </a:fld>
             <a:endParaRPr lang="pt-BR"/>
           </a:p>
@@ -2679,7 +2679,7 @@
           <a:p>
             <a:fld id="{1F1FAA24-82E9-47BA-A53E-AEAD71F0EE56}" type="datetimeFigureOut">
               <a:rPr lang="pt-BR" smtClean="0"/>
-              <a:t>08/05/2020</a:t>
+              <a:t>10/05/2020</a:t>
             </a:fld>
             <a:endParaRPr lang="pt-BR"/>
           </a:p>
@@ -2920,7 +2920,7 @@
           <a:p>
             <a:fld id="{1F1FAA24-82E9-47BA-A53E-AEAD71F0EE56}" type="datetimeFigureOut">
               <a:rPr lang="pt-BR" smtClean="0"/>
-              <a:t>08/05/2020</a:t>
+              <a:t>10/05/2020</a:t>
             </a:fld>
             <a:endParaRPr lang="pt-BR"/>
           </a:p>
@@ -3389,6 +3389,14 @@
 <file path=ppt/slides/slide10.xml><?xml version="1.0" encoding="utf-8"?>
 <p:sld xmlns:a="http://schemas.openxmlformats.org/drawingml/2006/main" xmlns:r="http://schemas.openxmlformats.org/officeDocument/2006/relationships" xmlns:p="http://schemas.openxmlformats.org/presentationml/2006/main">
   <p:cSld>
+    <p:bg>
+      <p:bgPr>
+        <a:solidFill>
+          <a:schemeClr val="bg1"/>
+        </a:solidFill>
+        <a:effectLst/>
+      </p:bgPr>
+    </p:bg>
     <p:spTree>
       <p:nvGrpSpPr>
         <p:cNvPr id="1" name=""/>
@@ -3403,59 +3411,3768 @@
           <a:chExt cx="0" cy="0"/>
         </a:xfrm>
       </p:grpSpPr>
-      <p:sp>
-        <p:nvSpPr>
-          <p:cNvPr id="2" name="Título 1">
+      <p:pic>
+        <p:nvPicPr>
+          <p:cNvPr id="12" name="Imagem 11" descr="Tela de celular com texto preto sobre fundo branco&#10;&#10;Descrição gerada automaticamente">
             <a:extLst>
               <a:ext uri="{FF2B5EF4-FFF2-40B4-BE49-F238E27FC236}">
-                <a16:creationId xmlns:a16="http://schemas.microsoft.com/office/drawing/2014/main" id="{EAF1EC76-28DB-4D9D-9CBE-31F882B8866E}"/>
+                <a16:creationId xmlns:a16="http://schemas.microsoft.com/office/drawing/2014/main" id="{3D7B3611-3867-4D52-8752-CCEAE5A2D72D}"/>
               </a:ext>
             </a:extLst>
           </p:cNvPr>
-          <p:cNvSpPr>
-            <a:spLocks noGrp="1"/>
-          </p:cNvSpPr>
+          <p:cNvPicPr>
+            <a:picLocks noChangeAspect="1"/>
+          </p:cNvPicPr>
+          <p:nvPr/>
+        </p:nvPicPr>
+        <p:blipFill>
+          <a:blip r:embed="rId2">
+            <a:extLst>
+              <a:ext uri="{28A0092B-C50C-407E-A947-70E740481C1C}">
+                <a14:useLocalDpi xmlns:a14="http://schemas.microsoft.com/office/drawing/2010/main" val="0"/>
+              </a:ext>
+            </a:extLst>
+          </a:blip>
+          <a:stretch>
+            <a:fillRect/>
+          </a:stretch>
+        </p:blipFill>
+        <p:spPr>
+          <a:xfrm>
+            <a:off x="0" y="0"/>
+            <a:ext cx="12192000" cy="6858000"/>
+          </a:xfrm>
+          <a:prstGeom prst="rect">
+            <a:avLst/>
+          </a:prstGeom>
+        </p:spPr>
+      </p:pic>
+      <p:graphicFrame>
+        <p:nvGraphicFramePr>
+          <p:cNvPr id="4" name="Tabela 3">
+            <a:extLst>
+              <a:ext uri="{FF2B5EF4-FFF2-40B4-BE49-F238E27FC236}">
+                <a16:creationId xmlns:a16="http://schemas.microsoft.com/office/drawing/2014/main" id="{87BA5F13-AA30-4547-A165-CD57522D8E9C}"/>
+              </a:ext>
+            </a:extLst>
+          </p:cNvPr>
+          <p:cNvGraphicFramePr>
+            <a:graphicFrameLocks noGrp="1"/>
+          </p:cNvGraphicFramePr>
           <p:nvPr>
-            <p:ph type="title"/>
+            <p:extLst>
+              <p:ext uri="{D42A27DB-BD31-4B8C-83A1-F6EECF244321}">
+                <p14:modId xmlns:p14="http://schemas.microsoft.com/office/powerpoint/2010/main" val="1553218335"/>
+              </p:ext>
+            </p:extLst>
           </p:nvPr>
-        </p:nvSpPr>
-        <p:spPr/>
-        <p:txBody>
-          <a:bodyPr/>
-          <a:lstStyle/>
-          <a:p>
-            <a:r>
-              <a:rPr lang="pt-BR" dirty="0"/>
-              <a:t>Resultados</a:t>
-            </a:r>
-          </a:p>
-        </p:txBody>
-      </p:sp>
-      <p:sp>
-        <p:nvSpPr>
-          <p:cNvPr id="3" name="Espaço Reservado para Conteúdo 2">
-            <a:extLst>
-              <a:ext uri="{FF2B5EF4-FFF2-40B4-BE49-F238E27FC236}">
-                <a16:creationId xmlns:a16="http://schemas.microsoft.com/office/drawing/2014/main" id="{A6DC13CE-DED8-438E-907E-909A79B7715A}"/>
-              </a:ext>
-            </a:extLst>
-          </p:cNvPr>
-          <p:cNvSpPr>
-            <a:spLocks noGrp="1"/>
-          </p:cNvSpPr>
-          <p:nvPr>
-            <p:ph idx="1"/>
-          </p:nvPr>
-        </p:nvSpPr>
-        <p:spPr/>
-        <p:txBody>
-          <a:bodyPr/>
-          <a:lstStyle/>
-          <a:p>
-            <a:endParaRPr lang="pt-BR"/>
-          </a:p>
-        </p:txBody>
-      </p:sp>
+        </p:nvGraphicFramePr>
+        <p:xfrm>
+          <a:off x="1789976" y="1371244"/>
+          <a:ext cx="8612048" cy="4930992"/>
+        </p:xfrm>
+        <a:graphic>
+          <a:graphicData uri="http://schemas.openxmlformats.org/drawingml/2006/table">
+            <a:tbl>
+              <a:tblPr firstRow="1" bandRow="1">
+                <a:noFill/>
+                <a:tableStyleId>{5C22544A-7EE6-4342-B048-85BDC9FD1C3A}</a:tableStyleId>
+              </a:tblPr>
+              <a:tblGrid>
+                <a:gridCol w="1341325">
+                  <a:extLst>
+                    <a:ext uri="{9D8B030D-6E8A-4147-A177-3AD203B41FA5}">
+                      <a16:colId xmlns:a16="http://schemas.microsoft.com/office/drawing/2014/main" val="1943774227"/>
+                    </a:ext>
+                  </a:extLst>
+                </a:gridCol>
+                <a:gridCol w="2638933">
+                  <a:extLst>
+                    <a:ext uri="{9D8B030D-6E8A-4147-A177-3AD203B41FA5}">
+                      <a16:colId xmlns:a16="http://schemas.microsoft.com/office/drawing/2014/main" val="1431320554"/>
+                    </a:ext>
+                  </a:extLst>
+                </a:gridCol>
+                <a:gridCol w="1543930">
+                  <a:extLst>
+                    <a:ext uri="{9D8B030D-6E8A-4147-A177-3AD203B41FA5}">
+                      <a16:colId xmlns:a16="http://schemas.microsoft.com/office/drawing/2014/main" val="2206437670"/>
+                    </a:ext>
+                  </a:extLst>
+                </a:gridCol>
+                <a:gridCol w="1543930">
+                  <a:extLst>
+                    <a:ext uri="{9D8B030D-6E8A-4147-A177-3AD203B41FA5}">
+                      <a16:colId xmlns:a16="http://schemas.microsoft.com/office/drawing/2014/main" val="1942348486"/>
+                    </a:ext>
+                  </a:extLst>
+                </a:gridCol>
+                <a:gridCol w="1543930">
+                  <a:extLst>
+                    <a:ext uri="{9D8B030D-6E8A-4147-A177-3AD203B41FA5}">
+                      <a16:colId xmlns:a16="http://schemas.microsoft.com/office/drawing/2014/main" val="1601922158"/>
+                    </a:ext>
+                  </a:extLst>
+                </a:gridCol>
+              </a:tblGrid>
+              <a:tr h="410916">
+                <a:tc>
+                  <a:txBody>
+                    <a:bodyPr/>
+                    <a:lstStyle/>
+                    <a:p>
+                      <a:pPr algn="ctr" fontAlgn="b"/>
+                      <a:r>
+                        <a:rPr lang="pt-BR" sz="1400" b="1" u="none" strike="noStrike">
+                          <a:solidFill>
+                            <a:schemeClr val="tx1">
+                              <a:lumMod val="75000"/>
+                              <a:lumOff val="25000"/>
+                            </a:schemeClr>
+                          </a:solidFill>
+                          <a:effectLst/>
+                        </a:rPr>
+                        <a:t>Base</a:t>
+                      </a:r>
+                      <a:endParaRPr lang="pt-BR" sz="1400" b="1" i="0" u="none" strike="noStrike">
+                        <a:solidFill>
+                          <a:schemeClr val="tx1">
+                            <a:lumMod val="75000"/>
+                            <a:lumOff val="25000"/>
+                          </a:schemeClr>
+                        </a:solidFill>
+                        <a:effectLst/>
+                        <a:latin typeface="Calibri" panose="020F0502020204030204" pitchFamily="34" charset="0"/>
+                      </a:endParaRPr>
+                    </a:p>
+                  </a:txBody>
+                  <a:tcPr marL="167721" marR="15913" marT="83860" marB="83860" anchor="b">
+                    <a:lnL w="12700" cmpd="sng">
+                      <a:noFill/>
+                      <a:prstDash val="solid"/>
+                    </a:lnL>
+                    <a:lnR w="12700" cmpd="sng">
+                      <a:noFill/>
+                      <a:prstDash val="solid"/>
+                    </a:lnR>
+                    <a:lnT w="12700" cmpd="sng">
+                      <a:noFill/>
+                      <a:prstDash val="solid"/>
+                    </a:lnT>
+                    <a:lnB w="9525" cap="flat" cmpd="sng" algn="ctr">
+                      <a:solidFill>
+                        <a:srgbClr val="D8DCDC"/>
+                      </a:solidFill>
+                      <a:prstDash val="solid"/>
+                    </a:lnB>
+                    <a:noFill/>
+                  </a:tcPr>
+                </a:tc>
+                <a:tc>
+                  <a:txBody>
+                    <a:bodyPr/>
+                    <a:lstStyle/>
+                    <a:p>
+                      <a:pPr algn="ctr" fontAlgn="b"/>
+                      <a:r>
+                        <a:rPr lang="pt-BR" sz="1400" b="1" u="none" strike="noStrike">
+                          <a:solidFill>
+                            <a:schemeClr val="tx1">
+                              <a:lumMod val="75000"/>
+                              <a:lumOff val="25000"/>
+                            </a:schemeClr>
+                          </a:solidFill>
+                          <a:effectLst/>
+                        </a:rPr>
+                        <a:t>Novas Respostas</a:t>
+                      </a:r>
+                      <a:endParaRPr lang="pt-BR" sz="1400" b="1" i="0" u="none" strike="noStrike">
+                        <a:solidFill>
+                          <a:schemeClr val="tx1">
+                            <a:lumMod val="75000"/>
+                            <a:lumOff val="25000"/>
+                          </a:schemeClr>
+                        </a:solidFill>
+                        <a:effectLst/>
+                        <a:latin typeface="Calibri" panose="020F0502020204030204" pitchFamily="34" charset="0"/>
+                      </a:endParaRPr>
+                    </a:p>
+                  </a:txBody>
+                  <a:tcPr marL="167721" marR="15913" marT="83860" marB="83860" anchor="b">
+                    <a:lnL w="12700" cmpd="sng">
+                      <a:noFill/>
+                      <a:prstDash val="solid"/>
+                    </a:lnL>
+                    <a:lnR w="12700" cmpd="sng">
+                      <a:noFill/>
+                      <a:prstDash val="solid"/>
+                    </a:lnR>
+                    <a:lnT w="12700" cmpd="sng">
+                      <a:noFill/>
+                      <a:prstDash val="solid"/>
+                    </a:lnT>
+                    <a:lnB w="9525" cap="flat" cmpd="sng" algn="ctr">
+                      <a:solidFill>
+                        <a:srgbClr val="D8DCDC"/>
+                      </a:solidFill>
+                      <a:prstDash val="solid"/>
+                    </a:lnB>
+                    <a:noFill/>
+                  </a:tcPr>
+                </a:tc>
+                <a:tc>
+                  <a:txBody>
+                    <a:bodyPr/>
+                    <a:lstStyle/>
+                    <a:p>
+                      <a:pPr algn="ctr" fontAlgn="b"/>
+                      <a:r>
+                        <a:rPr lang="pt-BR" sz="1400" b="1" u="none" strike="noStrike">
+                          <a:solidFill>
+                            <a:schemeClr val="tx1">
+                              <a:lumMod val="75000"/>
+                              <a:lumOff val="25000"/>
+                            </a:schemeClr>
+                          </a:solidFill>
+                          <a:effectLst/>
+                        </a:rPr>
+                        <a:t>k=3</a:t>
+                      </a:r>
+                      <a:endParaRPr lang="pt-BR" sz="1400" b="1" i="0" u="none" strike="noStrike">
+                        <a:solidFill>
+                          <a:schemeClr val="tx1">
+                            <a:lumMod val="75000"/>
+                            <a:lumOff val="25000"/>
+                          </a:schemeClr>
+                        </a:solidFill>
+                        <a:effectLst/>
+                        <a:latin typeface="Calibri" panose="020F0502020204030204" pitchFamily="34" charset="0"/>
+                      </a:endParaRPr>
+                    </a:p>
+                  </a:txBody>
+                  <a:tcPr marL="167721" marR="15913" marT="83860" marB="83860" anchor="b">
+                    <a:lnL w="12700" cmpd="sng">
+                      <a:noFill/>
+                      <a:prstDash val="solid"/>
+                    </a:lnL>
+                    <a:lnR w="12700" cmpd="sng">
+                      <a:noFill/>
+                      <a:prstDash val="solid"/>
+                    </a:lnR>
+                    <a:lnT w="12700" cmpd="sng">
+                      <a:noFill/>
+                      <a:prstDash val="solid"/>
+                    </a:lnT>
+                    <a:lnB w="9525" cap="flat" cmpd="sng" algn="ctr">
+                      <a:solidFill>
+                        <a:srgbClr val="D8DCDC"/>
+                      </a:solidFill>
+                      <a:prstDash val="solid"/>
+                    </a:lnB>
+                    <a:noFill/>
+                  </a:tcPr>
+                </a:tc>
+                <a:tc>
+                  <a:txBody>
+                    <a:bodyPr/>
+                    <a:lstStyle/>
+                    <a:p>
+                      <a:pPr algn="ctr" fontAlgn="b"/>
+                      <a:r>
+                        <a:rPr lang="pt-BR" sz="1400" b="1" u="none" strike="noStrike">
+                          <a:solidFill>
+                            <a:schemeClr val="tx1">
+                              <a:lumMod val="75000"/>
+                              <a:lumOff val="25000"/>
+                            </a:schemeClr>
+                          </a:solidFill>
+                          <a:effectLst/>
+                        </a:rPr>
+                        <a:t>k=5</a:t>
+                      </a:r>
+                      <a:endParaRPr lang="pt-BR" sz="1400" b="1" i="0" u="none" strike="noStrike">
+                        <a:solidFill>
+                          <a:schemeClr val="tx1">
+                            <a:lumMod val="75000"/>
+                            <a:lumOff val="25000"/>
+                          </a:schemeClr>
+                        </a:solidFill>
+                        <a:effectLst/>
+                        <a:latin typeface="Calibri" panose="020F0502020204030204" pitchFamily="34" charset="0"/>
+                      </a:endParaRPr>
+                    </a:p>
+                  </a:txBody>
+                  <a:tcPr marL="167721" marR="15913" marT="83860" marB="83860" anchor="b">
+                    <a:lnL w="12700" cmpd="sng">
+                      <a:noFill/>
+                      <a:prstDash val="solid"/>
+                    </a:lnL>
+                    <a:lnR w="12700" cmpd="sng">
+                      <a:noFill/>
+                      <a:prstDash val="solid"/>
+                    </a:lnR>
+                    <a:lnT w="12700" cmpd="sng">
+                      <a:noFill/>
+                      <a:prstDash val="solid"/>
+                    </a:lnT>
+                    <a:lnB w="9525" cap="flat" cmpd="sng" algn="ctr">
+                      <a:solidFill>
+                        <a:srgbClr val="D8DCDC"/>
+                      </a:solidFill>
+                      <a:prstDash val="solid"/>
+                    </a:lnB>
+                    <a:noFill/>
+                  </a:tcPr>
+                </a:tc>
+                <a:tc>
+                  <a:txBody>
+                    <a:bodyPr/>
+                    <a:lstStyle/>
+                    <a:p>
+                      <a:pPr algn="ctr" fontAlgn="b"/>
+                      <a:r>
+                        <a:rPr lang="pt-BR" sz="1400" b="1" u="none" strike="noStrike">
+                          <a:solidFill>
+                            <a:schemeClr val="tx1">
+                              <a:lumMod val="75000"/>
+                              <a:lumOff val="25000"/>
+                            </a:schemeClr>
+                          </a:solidFill>
+                          <a:effectLst/>
+                        </a:rPr>
+                        <a:t>k=7</a:t>
+                      </a:r>
+                      <a:endParaRPr lang="pt-BR" sz="1400" b="1" i="0" u="none" strike="noStrike">
+                        <a:solidFill>
+                          <a:schemeClr val="tx1">
+                            <a:lumMod val="75000"/>
+                            <a:lumOff val="25000"/>
+                          </a:schemeClr>
+                        </a:solidFill>
+                        <a:effectLst/>
+                        <a:latin typeface="Calibri" panose="020F0502020204030204" pitchFamily="34" charset="0"/>
+                      </a:endParaRPr>
+                    </a:p>
+                  </a:txBody>
+                  <a:tcPr marL="167721" marR="15913" marT="83860" marB="83860" anchor="b">
+                    <a:lnL w="12700" cmpd="sng">
+                      <a:noFill/>
+                      <a:prstDash val="solid"/>
+                    </a:lnL>
+                    <a:lnR w="12700" cmpd="sng">
+                      <a:noFill/>
+                      <a:prstDash val="solid"/>
+                    </a:lnR>
+                    <a:lnT w="12700" cmpd="sng">
+                      <a:noFill/>
+                      <a:prstDash val="solid"/>
+                    </a:lnT>
+                    <a:lnB w="9525" cap="flat" cmpd="sng" algn="ctr">
+                      <a:solidFill>
+                        <a:srgbClr val="D8DCDC"/>
+                      </a:solidFill>
+                      <a:prstDash val="solid"/>
+                    </a:lnB>
+                    <a:noFill/>
+                  </a:tcPr>
+                </a:tc>
+                <a:extLst>
+                  <a:ext uri="{0D108BD9-81ED-4DB2-BD59-A6C34878D82A}">
+                    <a16:rowId xmlns:a16="http://schemas.microsoft.com/office/drawing/2014/main" val="3179250387"/>
+                  </a:ext>
+                </a:extLst>
+              </a:tr>
+              <a:tr h="410916">
+                <a:tc>
+                  <a:txBody>
+                    <a:bodyPr/>
+                    <a:lstStyle/>
+                    <a:p>
+                      <a:pPr algn="ctr" fontAlgn="b"/>
+                      <a:r>
+                        <a:rPr lang="pt-BR" sz="1400" u="none" strike="noStrike">
+                          <a:solidFill>
+                            <a:schemeClr val="tx1">
+                              <a:lumMod val="75000"/>
+                              <a:lumOff val="25000"/>
+                            </a:schemeClr>
+                          </a:solidFill>
+                          <a:effectLst/>
+                        </a:rPr>
+                        <a:t>40</a:t>
+                      </a:r>
+                      <a:endParaRPr lang="pt-BR" sz="1400" b="0" i="0" u="none" strike="noStrike">
+                        <a:solidFill>
+                          <a:schemeClr val="tx1">
+                            <a:lumMod val="75000"/>
+                            <a:lumOff val="25000"/>
+                          </a:schemeClr>
+                        </a:solidFill>
+                        <a:effectLst/>
+                        <a:latin typeface="Calibri" panose="020F0502020204030204" pitchFamily="34" charset="0"/>
+                      </a:endParaRPr>
+                    </a:p>
+                  </a:txBody>
+                  <a:tcPr marL="167721" marR="15913" marT="83860" marB="83860" anchor="b">
+                    <a:lnL w="9525" cap="flat" cmpd="sng" algn="ctr">
+                      <a:solidFill>
+                        <a:srgbClr val="D8DCDC"/>
+                      </a:solidFill>
+                      <a:prstDash val="solid"/>
+                    </a:lnL>
+                    <a:lnR w="9525" cap="flat" cmpd="sng" algn="ctr">
+                      <a:solidFill>
+                        <a:srgbClr val="D8DCDC"/>
+                      </a:solidFill>
+                      <a:prstDash val="solid"/>
+                    </a:lnR>
+                    <a:lnT w="9525" cap="flat" cmpd="sng" algn="ctr">
+                      <a:solidFill>
+                        <a:srgbClr val="D8DCDC"/>
+                      </a:solidFill>
+                      <a:prstDash val="solid"/>
+                    </a:lnT>
+                    <a:lnB w="9525" cap="flat" cmpd="sng" algn="ctr">
+                      <a:solidFill>
+                        <a:srgbClr val="D8DCDC"/>
+                      </a:solidFill>
+                      <a:prstDash val="solid"/>
+                    </a:lnB>
+                    <a:solidFill>
+                      <a:srgbClr val="D8DEDC">
+                        <a:alpha val="20000"/>
+                      </a:srgbClr>
+                    </a:solidFill>
+                  </a:tcPr>
+                </a:tc>
+                <a:tc>
+                  <a:txBody>
+                    <a:bodyPr/>
+                    <a:lstStyle/>
+                    <a:p>
+                      <a:pPr algn="ctr" fontAlgn="b"/>
+                      <a:r>
+                        <a:rPr lang="pt-BR" sz="1400" u="none" strike="noStrike">
+                          <a:solidFill>
+                            <a:schemeClr val="tx1">
+                              <a:lumMod val="75000"/>
+                              <a:lumOff val="25000"/>
+                            </a:schemeClr>
+                          </a:solidFill>
+                          <a:effectLst/>
+                        </a:rPr>
+                        <a:t>40</a:t>
+                      </a:r>
+                      <a:endParaRPr lang="pt-BR" sz="1400" b="0" i="0" u="none" strike="noStrike">
+                        <a:solidFill>
+                          <a:schemeClr val="tx1">
+                            <a:lumMod val="75000"/>
+                            <a:lumOff val="25000"/>
+                          </a:schemeClr>
+                        </a:solidFill>
+                        <a:effectLst/>
+                        <a:latin typeface="Calibri" panose="020F0502020204030204" pitchFamily="34" charset="0"/>
+                      </a:endParaRPr>
+                    </a:p>
+                  </a:txBody>
+                  <a:tcPr marL="167721" marR="15913" marT="83860" marB="83860" anchor="b">
+                    <a:lnL w="9525" cap="flat" cmpd="sng" algn="ctr">
+                      <a:solidFill>
+                        <a:srgbClr val="D8DCDC"/>
+                      </a:solidFill>
+                      <a:prstDash val="solid"/>
+                    </a:lnL>
+                    <a:lnR w="9525" cap="flat" cmpd="sng" algn="ctr">
+                      <a:solidFill>
+                        <a:srgbClr val="D8DCDC"/>
+                      </a:solidFill>
+                      <a:prstDash val="solid"/>
+                    </a:lnR>
+                    <a:lnT w="9525" cap="flat" cmpd="sng" algn="ctr">
+                      <a:solidFill>
+                        <a:srgbClr val="D8DCDC"/>
+                      </a:solidFill>
+                      <a:prstDash val="solid"/>
+                    </a:lnT>
+                    <a:lnB w="9525" cap="flat" cmpd="sng" algn="ctr">
+                      <a:solidFill>
+                        <a:srgbClr val="D8DCDC"/>
+                      </a:solidFill>
+                      <a:prstDash val="solid"/>
+                    </a:lnB>
+                    <a:solidFill>
+                      <a:srgbClr val="D8DEDC">
+                        <a:alpha val="20000"/>
+                      </a:srgbClr>
+                    </a:solidFill>
+                  </a:tcPr>
+                </a:tc>
+                <a:tc>
+                  <a:txBody>
+                    <a:bodyPr/>
+                    <a:lstStyle/>
+                    <a:p>
+                      <a:pPr algn="ctr" fontAlgn="b"/>
+                      <a:r>
+                        <a:rPr lang="pt-BR" sz="1400" u="none" strike="noStrike">
+                          <a:solidFill>
+                            <a:schemeClr val="tx1">
+                              <a:lumMod val="75000"/>
+                              <a:lumOff val="25000"/>
+                            </a:schemeClr>
+                          </a:solidFill>
+                          <a:effectLst/>
+                        </a:rPr>
+                        <a:t>65,0%</a:t>
+                      </a:r>
+                      <a:endParaRPr lang="pt-BR" sz="1400" b="0" i="0" u="none" strike="noStrike">
+                        <a:solidFill>
+                          <a:schemeClr val="tx1">
+                            <a:lumMod val="75000"/>
+                            <a:lumOff val="25000"/>
+                          </a:schemeClr>
+                        </a:solidFill>
+                        <a:effectLst/>
+                        <a:latin typeface="Calibri" panose="020F0502020204030204" pitchFamily="34" charset="0"/>
+                      </a:endParaRPr>
+                    </a:p>
+                  </a:txBody>
+                  <a:tcPr marL="167721" marR="15913" marT="83860" marB="83860" anchor="b">
+                    <a:lnL w="9525" cap="flat" cmpd="sng" algn="ctr">
+                      <a:solidFill>
+                        <a:srgbClr val="D8DCDC"/>
+                      </a:solidFill>
+                      <a:prstDash val="solid"/>
+                    </a:lnL>
+                    <a:lnR w="9525" cap="flat" cmpd="sng" algn="ctr">
+                      <a:solidFill>
+                        <a:srgbClr val="D8DCDC"/>
+                      </a:solidFill>
+                      <a:prstDash val="solid"/>
+                    </a:lnR>
+                    <a:lnT w="9525" cap="flat" cmpd="sng" algn="ctr">
+                      <a:solidFill>
+                        <a:srgbClr val="D8DCDC"/>
+                      </a:solidFill>
+                      <a:prstDash val="solid"/>
+                    </a:lnT>
+                    <a:lnB w="9525" cap="flat" cmpd="sng" algn="ctr">
+                      <a:solidFill>
+                        <a:srgbClr val="D8DCDC"/>
+                      </a:solidFill>
+                      <a:prstDash val="solid"/>
+                    </a:lnB>
+                    <a:solidFill>
+                      <a:srgbClr val="D8DEDC">
+                        <a:alpha val="20000"/>
+                      </a:srgbClr>
+                    </a:solidFill>
+                  </a:tcPr>
+                </a:tc>
+                <a:tc>
+                  <a:txBody>
+                    <a:bodyPr/>
+                    <a:lstStyle/>
+                    <a:p>
+                      <a:pPr algn="ctr" fontAlgn="b"/>
+                      <a:r>
+                        <a:rPr lang="pt-BR" sz="1400" u="none" strike="noStrike">
+                          <a:solidFill>
+                            <a:schemeClr val="tx1">
+                              <a:lumMod val="75000"/>
+                              <a:lumOff val="25000"/>
+                            </a:schemeClr>
+                          </a:solidFill>
+                          <a:effectLst/>
+                        </a:rPr>
+                        <a:t>65,0%</a:t>
+                      </a:r>
+                      <a:endParaRPr lang="pt-BR" sz="1400" b="0" i="0" u="none" strike="noStrike">
+                        <a:solidFill>
+                          <a:schemeClr val="tx1">
+                            <a:lumMod val="75000"/>
+                            <a:lumOff val="25000"/>
+                          </a:schemeClr>
+                        </a:solidFill>
+                        <a:effectLst/>
+                        <a:latin typeface="Calibri" panose="020F0502020204030204" pitchFamily="34" charset="0"/>
+                      </a:endParaRPr>
+                    </a:p>
+                  </a:txBody>
+                  <a:tcPr marL="167721" marR="15913" marT="83860" marB="83860" anchor="b">
+                    <a:lnL w="9525" cap="flat" cmpd="sng" algn="ctr">
+                      <a:solidFill>
+                        <a:srgbClr val="D8DCDC"/>
+                      </a:solidFill>
+                      <a:prstDash val="solid"/>
+                    </a:lnL>
+                    <a:lnR w="9525" cap="flat" cmpd="sng" algn="ctr">
+                      <a:solidFill>
+                        <a:srgbClr val="D8DCDC"/>
+                      </a:solidFill>
+                      <a:prstDash val="solid"/>
+                    </a:lnR>
+                    <a:lnT w="9525" cap="flat" cmpd="sng" algn="ctr">
+                      <a:solidFill>
+                        <a:srgbClr val="D8DCDC"/>
+                      </a:solidFill>
+                      <a:prstDash val="solid"/>
+                    </a:lnT>
+                    <a:lnB w="9525" cap="flat" cmpd="sng" algn="ctr">
+                      <a:solidFill>
+                        <a:srgbClr val="D8DCDC"/>
+                      </a:solidFill>
+                      <a:prstDash val="solid"/>
+                    </a:lnB>
+                    <a:solidFill>
+                      <a:srgbClr val="D8DEDC">
+                        <a:alpha val="20000"/>
+                      </a:srgbClr>
+                    </a:solidFill>
+                  </a:tcPr>
+                </a:tc>
+                <a:tc>
+                  <a:txBody>
+                    <a:bodyPr/>
+                    <a:lstStyle/>
+                    <a:p>
+                      <a:pPr algn="ctr" fontAlgn="b"/>
+                      <a:r>
+                        <a:rPr lang="pt-BR" sz="1400" u="none" strike="noStrike">
+                          <a:solidFill>
+                            <a:schemeClr val="tx1">
+                              <a:lumMod val="75000"/>
+                              <a:lumOff val="25000"/>
+                            </a:schemeClr>
+                          </a:solidFill>
+                          <a:effectLst/>
+                        </a:rPr>
+                        <a:t>75,0%</a:t>
+                      </a:r>
+                      <a:endParaRPr lang="pt-BR" sz="1400" b="0" i="0" u="none" strike="noStrike">
+                        <a:solidFill>
+                          <a:schemeClr val="tx1">
+                            <a:lumMod val="75000"/>
+                            <a:lumOff val="25000"/>
+                          </a:schemeClr>
+                        </a:solidFill>
+                        <a:effectLst/>
+                        <a:latin typeface="Calibri" panose="020F0502020204030204" pitchFamily="34" charset="0"/>
+                      </a:endParaRPr>
+                    </a:p>
+                  </a:txBody>
+                  <a:tcPr marL="167721" marR="15913" marT="83860" marB="83860" anchor="b">
+                    <a:lnL w="9525" cap="flat" cmpd="sng" algn="ctr">
+                      <a:solidFill>
+                        <a:srgbClr val="D8DCDC"/>
+                      </a:solidFill>
+                      <a:prstDash val="solid"/>
+                    </a:lnL>
+                    <a:lnR w="9525" cap="flat" cmpd="sng" algn="ctr">
+                      <a:solidFill>
+                        <a:srgbClr val="D8DCDC"/>
+                      </a:solidFill>
+                      <a:prstDash val="solid"/>
+                    </a:lnR>
+                    <a:lnT w="9525" cap="flat" cmpd="sng" algn="ctr">
+                      <a:solidFill>
+                        <a:srgbClr val="D8DCDC"/>
+                      </a:solidFill>
+                      <a:prstDash val="solid"/>
+                    </a:lnT>
+                    <a:lnB w="9525" cap="flat" cmpd="sng" algn="ctr">
+                      <a:solidFill>
+                        <a:srgbClr val="D8DCDC"/>
+                      </a:solidFill>
+                      <a:prstDash val="solid"/>
+                    </a:lnB>
+                    <a:solidFill>
+                      <a:srgbClr val="D8DEDC">
+                        <a:alpha val="20000"/>
+                      </a:srgbClr>
+                    </a:solidFill>
+                  </a:tcPr>
+                </a:tc>
+                <a:extLst>
+                  <a:ext uri="{0D108BD9-81ED-4DB2-BD59-A6C34878D82A}">
+                    <a16:rowId xmlns:a16="http://schemas.microsoft.com/office/drawing/2014/main" val="1708397619"/>
+                  </a:ext>
+                </a:extLst>
+              </a:tr>
+              <a:tr h="410916">
+                <a:tc>
+                  <a:txBody>
+                    <a:bodyPr/>
+                    <a:lstStyle/>
+                    <a:p>
+                      <a:pPr algn="ctr" fontAlgn="b"/>
+                      <a:r>
+                        <a:rPr lang="pt-BR" sz="1400" u="none" strike="noStrike">
+                          <a:solidFill>
+                            <a:schemeClr val="tx1">
+                              <a:lumMod val="75000"/>
+                              <a:lumOff val="25000"/>
+                            </a:schemeClr>
+                          </a:solidFill>
+                          <a:effectLst/>
+                        </a:rPr>
+                        <a:t>80</a:t>
+                      </a:r>
+                      <a:endParaRPr lang="pt-BR" sz="1400" b="0" i="0" u="none" strike="noStrike">
+                        <a:solidFill>
+                          <a:schemeClr val="tx1">
+                            <a:lumMod val="75000"/>
+                            <a:lumOff val="25000"/>
+                          </a:schemeClr>
+                        </a:solidFill>
+                        <a:effectLst/>
+                        <a:latin typeface="Calibri" panose="020F0502020204030204" pitchFamily="34" charset="0"/>
+                      </a:endParaRPr>
+                    </a:p>
+                  </a:txBody>
+                  <a:tcPr marL="167721" marR="15913" marT="83860" marB="83860" anchor="b">
+                    <a:lnL w="9525" cap="flat" cmpd="sng" algn="ctr">
+                      <a:solidFill>
+                        <a:srgbClr val="D8DEDC"/>
+                      </a:solidFill>
+                      <a:prstDash val="solid"/>
+                    </a:lnL>
+                    <a:lnR w="9525" cap="flat" cmpd="sng" algn="ctr">
+                      <a:solidFill>
+                        <a:srgbClr val="D8DEDC"/>
+                      </a:solidFill>
+                      <a:prstDash val="solid"/>
+                    </a:lnR>
+                    <a:lnT w="9525" cap="flat" cmpd="sng" algn="ctr">
+                      <a:solidFill>
+                        <a:srgbClr val="D8DCDC"/>
+                      </a:solidFill>
+                      <a:prstDash val="solid"/>
+                    </a:lnT>
+                    <a:lnB w="9525" cap="flat" cmpd="sng" algn="ctr">
+                      <a:solidFill>
+                        <a:srgbClr val="D8DCDC"/>
+                      </a:solidFill>
+                      <a:prstDash val="solid"/>
+                    </a:lnB>
+                    <a:noFill/>
+                  </a:tcPr>
+                </a:tc>
+                <a:tc>
+                  <a:txBody>
+                    <a:bodyPr/>
+                    <a:lstStyle/>
+                    <a:p>
+                      <a:pPr algn="ctr" fontAlgn="b"/>
+                      <a:r>
+                        <a:rPr lang="pt-BR" sz="1400" u="none" strike="noStrike">
+                          <a:solidFill>
+                            <a:schemeClr val="tx1">
+                              <a:lumMod val="75000"/>
+                              <a:lumOff val="25000"/>
+                            </a:schemeClr>
+                          </a:solidFill>
+                          <a:effectLst/>
+                        </a:rPr>
+                        <a:t>40</a:t>
+                      </a:r>
+                      <a:endParaRPr lang="pt-BR" sz="1400" b="0" i="0" u="none" strike="noStrike">
+                        <a:solidFill>
+                          <a:schemeClr val="tx1">
+                            <a:lumMod val="75000"/>
+                            <a:lumOff val="25000"/>
+                          </a:schemeClr>
+                        </a:solidFill>
+                        <a:effectLst/>
+                        <a:latin typeface="Calibri" panose="020F0502020204030204" pitchFamily="34" charset="0"/>
+                      </a:endParaRPr>
+                    </a:p>
+                  </a:txBody>
+                  <a:tcPr marL="167721" marR="15913" marT="83860" marB="83860" anchor="b">
+                    <a:lnL w="9525" cap="flat" cmpd="sng" algn="ctr">
+                      <a:solidFill>
+                        <a:srgbClr val="D8DEDC"/>
+                      </a:solidFill>
+                      <a:prstDash val="solid"/>
+                    </a:lnL>
+                    <a:lnR w="9525" cap="flat" cmpd="sng" algn="ctr">
+                      <a:solidFill>
+                        <a:srgbClr val="D8DEDC"/>
+                      </a:solidFill>
+                      <a:prstDash val="solid"/>
+                    </a:lnR>
+                    <a:lnT w="9525" cap="flat" cmpd="sng" algn="ctr">
+                      <a:solidFill>
+                        <a:srgbClr val="D8DCDC"/>
+                      </a:solidFill>
+                      <a:prstDash val="solid"/>
+                    </a:lnT>
+                    <a:lnB w="9525" cap="flat" cmpd="sng" algn="ctr">
+                      <a:solidFill>
+                        <a:srgbClr val="D8DCDC"/>
+                      </a:solidFill>
+                      <a:prstDash val="solid"/>
+                    </a:lnB>
+                    <a:noFill/>
+                  </a:tcPr>
+                </a:tc>
+                <a:tc>
+                  <a:txBody>
+                    <a:bodyPr/>
+                    <a:lstStyle/>
+                    <a:p>
+                      <a:pPr algn="ctr" fontAlgn="b"/>
+                      <a:r>
+                        <a:rPr lang="pt-BR" sz="1400" u="none" strike="noStrike">
+                          <a:solidFill>
+                            <a:schemeClr val="tx1">
+                              <a:lumMod val="75000"/>
+                              <a:lumOff val="25000"/>
+                            </a:schemeClr>
+                          </a:solidFill>
+                          <a:effectLst/>
+                        </a:rPr>
+                        <a:t>72,5%</a:t>
+                      </a:r>
+                      <a:endParaRPr lang="pt-BR" sz="1400" b="0" i="0" u="none" strike="noStrike">
+                        <a:solidFill>
+                          <a:schemeClr val="tx1">
+                            <a:lumMod val="75000"/>
+                            <a:lumOff val="25000"/>
+                          </a:schemeClr>
+                        </a:solidFill>
+                        <a:effectLst/>
+                        <a:latin typeface="Calibri" panose="020F0502020204030204" pitchFamily="34" charset="0"/>
+                      </a:endParaRPr>
+                    </a:p>
+                  </a:txBody>
+                  <a:tcPr marL="167721" marR="15913" marT="83860" marB="83860" anchor="b">
+                    <a:lnL w="9525" cap="flat" cmpd="sng" algn="ctr">
+                      <a:solidFill>
+                        <a:srgbClr val="D8DEDC"/>
+                      </a:solidFill>
+                      <a:prstDash val="solid"/>
+                    </a:lnL>
+                    <a:lnR w="9525" cap="flat" cmpd="sng" algn="ctr">
+                      <a:solidFill>
+                        <a:srgbClr val="D8DEDC"/>
+                      </a:solidFill>
+                      <a:prstDash val="solid"/>
+                    </a:lnR>
+                    <a:lnT w="9525" cap="flat" cmpd="sng" algn="ctr">
+                      <a:solidFill>
+                        <a:srgbClr val="D8DCDC"/>
+                      </a:solidFill>
+                      <a:prstDash val="solid"/>
+                    </a:lnT>
+                    <a:lnB w="9525" cap="flat" cmpd="sng" algn="ctr">
+                      <a:solidFill>
+                        <a:srgbClr val="D8DCDC"/>
+                      </a:solidFill>
+                      <a:prstDash val="solid"/>
+                    </a:lnB>
+                    <a:noFill/>
+                  </a:tcPr>
+                </a:tc>
+                <a:tc>
+                  <a:txBody>
+                    <a:bodyPr/>
+                    <a:lstStyle/>
+                    <a:p>
+                      <a:pPr algn="ctr" fontAlgn="b"/>
+                      <a:r>
+                        <a:rPr lang="pt-BR" sz="1400" u="none" strike="noStrike">
+                          <a:solidFill>
+                            <a:schemeClr val="tx1">
+                              <a:lumMod val="75000"/>
+                              <a:lumOff val="25000"/>
+                            </a:schemeClr>
+                          </a:solidFill>
+                          <a:effectLst/>
+                        </a:rPr>
+                        <a:t>75,0%</a:t>
+                      </a:r>
+                      <a:endParaRPr lang="pt-BR" sz="1400" b="0" i="0" u="none" strike="noStrike">
+                        <a:solidFill>
+                          <a:schemeClr val="tx1">
+                            <a:lumMod val="75000"/>
+                            <a:lumOff val="25000"/>
+                          </a:schemeClr>
+                        </a:solidFill>
+                        <a:effectLst/>
+                        <a:latin typeface="Calibri" panose="020F0502020204030204" pitchFamily="34" charset="0"/>
+                      </a:endParaRPr>
+                    </a:p>
+                  </a:txBody>
+                  <a:tcPr marL="167721" marR="15913" marT="83860" marB="83860" anchor="b">
+                    <a:lnL w="9525" cap="flat" cmpd="sng" algn="ctr">
+                      <a:solidFill>
+                        <a:srgbClr val="D8DEDC"/>
+                      </a:solidFill>
+                      <a:prstDash val="solid"/>
+                    </a:lnL>
+                    <a:lnR w="9525" cap="flat" cmpd="sng" algn="ctr">
+                      <a:solidFill>
+                        <a:srgbClr val="D8DEDC"/>
+                      </a:solidFill>
+                      <a:prstDash val="solid"/>
+                    </a:lnR>
+                    <a:lnT w="9525" cap="flat" cmpd="sng" algn="ctr">
+                      <a:solidFill>
+                        <a:srgbClr val="D8DCDC"/>
+                      </a:solidFill>
+                      <a:prstDash val="solid"/>
+                    </a:lnT>
+                    <a:lnB w="9525" cap="flat" cmpd="sng" algn="ctr">
+                      <a:solidFill>
+                        <a:srgbClr val="D8DCDC"/>
+                      </a:solidFill>
+                      <a:prstDash val="solid"/>
+                    </a:lnB>
+                    <a:noFill/>
+                  </a:tcPr>
+                </a:tc>
+                <a:tc>
+                  <a:txBody>
+                    <a:bodyPr/>
+                    <a:lstStyle/>
+                    <a:p>
+                      <a:pPr algn="ctr" fontAlgn="b"/>
+                      <a:r>
+                        <a:rPr lang="pt-BR" sz="1400" u="none" strike="noStrike">
+                          <a:solidFill>
+                            <a:schemeClr val="tx1">
+                              <a:lumMod val="75000"/>
+                              <a:lumOff val="25000"/>
+                            </a:schemeClr>
+                          </a:solidFill>
+                          <a:effectLst/>
+                        </a:rPr>
+                        <a:t>72,5%</a:t>
+                      </a:r>
+                      <a:endParaRPr lang="pt-BR" sz="1400" b="0" i="0" u="none" strike="noStrike">
+                        <a:solidFill>
+                          <a:schemeClr val="tx1">
+                            <a:lumMod val="75000"/>
+                            <a:lumOff val="25000"/>
+                          </a:schemeClr>
+                        </a:solidFill>
+                        <a:effectLst/>
+                        <a:latin typeface="Calibri" panose="020F0502020204030204" pitchFamily="34" charset="0"/>
+                      </a:endParaRPr>
+                    </a:p>
+                  </a:txBody>
+                  <a:tcPr marL="167721" marR="15913" marT="83860" marB="83860" anchor="b">
+                    <a:lnL w="9525" cap="flat" cmpd="sng" algn="ctr">
+                      <a:solidFill>
+                        <a:srgbClr val="D8DEDC"/>
+                      </a:solidFill>
+                      <a:prstDash val="solid"/>
+                    </a:lnL>
+                    <a:lnR w="9525" cap="flat" cmpd="sng" algn="ctr">
+                      <a:solidFill>
+                        <a:srgbClr val="D8DEDC"/>
+                      </a:solidFill>
+                      <a:prstDash val="solid"/>
+                    </a:lnR>
+                    <a:lnT w="9525" cap="flat" cmpd="sng" algn="ctr">
+                      <a:solidFill>
+                        <a:srgbClr val="D8DCDC"/>
+                      </a:solidFill>
+                      <a:prstDash val="solid"/>
+                    </a:lnT>
+                    <a:lnB w="9525" cap="flat" cmpd="sng" algn="ctr">
+                      <a:solidFill>
+                        <a:srgbClr val="D8DCDC"/>
+                      </a:solidFill>
+                      <a:prstDash val="solid"/>
+                    </a:lnB>
+                    <a:noFill/>
+                  </a:tcPr>
+                </a:tc>
+                <a:extLst>
+                  <a:ext uri="{0D108BD9-81ED-4DB2-BD59-A6C34878D82A}">
+                    <a16:rowId xmlns:a16="http://schemas.microsoft.com/office/drawing/2014/main" val="1756492351"/>
+                  </a:ext>
+                </a:extLst>
+              </a:tr>
+              <a:tr h="410916">
+                <a:tc>
+                  <a:txBody>
+                    <a:bodyPr/>
+                    <a:lstStyle/>
+                    <a:p>
+                      <a:pPr algn="ctr" fontAlgn="b"/>
+                      <a:r>
+                        <a:rPr lang="pt-BR" sz="1400" u="none" strike="noStrike">
+                          <a:solidFill>
+                            <a:schemeClr val="tx1">
+                              <a:lumMod val="75000"/>
+                              <a:lumOff val="25000"/>
+                            </a:schemeClr>
+                          </a:solidFill>
+                          <a:effectLst/>
+                        </a:rPr>
+                        <a:t>120</a:t>
+                      </a:r>
+                      <a:endParaRPr lang="pt-BR" sz="1400" b="0" i="0" u="none" strike="noStrike">
+                        <a:solidFill>
+                          <a:schemeClr val="tx1">
+                            <a:lumMod val="75000"/>
+                            <a:lumOff val="25000"/>
+                          </a:schemeClr>
+                        </a:solidFill>
+                        <a:effectLst/>
+                        <a:latin typeface="Calibri" panose="020F0502020204030204" pitchFamily="34" charset="0"/>
+                      </a:endParaRPr>
+                    </a:p>
+                  </a:txBody>
+                  <a:tcPr marL="167721" marR="15913" marT="83860" marB="83860" anchor="b">
+                    <a:lnL w="9525" cap="flat" cmpd="sng" algn="ctr">
+                      <a:solidFill>
+                        <a:srgbClr val="D8DCDC"/>
+                      </a:solidFill>
+                      <a:prstDash val="solid"/>
+                    </a:lnL>
+                    <a:lnR w="9525" cap="flat" cmpd="sng" algn="ctr">
+                      <a:solidFill>
+                        <a:srgbClr val="D8DCDC"/>
+                      </a:solidFill>
+                      <a:prstDash val="solid"/>
+                    </a:lnR>
+                    <a:lnT w="9525" cap="flat" cmpd="sng" algn="ctr">
+                      <a:solidFill>
+                        <a:srgbClr val="D8DCDC"/>
+                      </a:solidFill>
+                      <a:prstDash val="solid"/>
+                    </a:lnT>
+                    <a:lnB w="9525" cap="flat" cmpd="sng" algn="ctr">
+                      <a:solidFill>
+                        <a:srgbClr val="D8DCDC"/>
+                      </a:solidFill>
+                      <a:prstDash val="solid"/>
+                    </a:lnB>
+                    <a:solidFill>
+                      <a:srgbClr val="D8DEDC">
+                        <a:alpha val="20000"/>
+                      </a:srgbClr>
+                    </a:solidFill>
+                  </a:tcPr>
+                </a:tc>
+                <a:tc>
+                  <a:txBody>
+                    <a:bodyPr/>
+                    <a:lstStyle/>
+                    <a:p>
+                      <a:pPr algn="ctr" fontAlgn="b"/>
+                      <a:r>
+                        <a:rPr lang="pt-BR" sz="1400" u="none" strike="noStrike">
+                          <a:solidFill>
+                            <a:schemeClr val="tx1">
+                              <a:lumMod val="75000"/>
+                              <a:lumOff val="25000"/>
+                            </a:schemeClr>
+                          </a:solidFill>
+                          <a:effectLst/>
+                        </a:rPr>
+                        <a:t>40</a:t>
+                      </a:r>
+                      <a:endParaRPr lang="pt-BR" sz="1400" b="0" i="0" u="none" strike="noStrike">
+                        <a:solidFill>
+                          <a:schemeClr val="tx1">
+                            <a:lumMod val="75000"/>
+                            <a:lumOff val="25000"/>
+                          </a:schemeClr>
+                        </a:solidFill>
+                        <a:effectLst/>
+                        <a:latin typeface="Calibri" panose="020F0502020204030204" pitchFamily="34" charset="0"/>
+                      </a:endParaRPr>
+                    </a:p>
+                  </a:txBody>
+                  <a:tcPr marL="167721" marR="15913" marT="83860" marB="83860" anchor="b">
+                    <a:lnL w="9525" cap="flat" cmpd="sng" algn="ctr">
+                      <a:solidFill>
+                        <a:srgbClr val="D8DCDC"/>
+                      </a:solidFill>
+                      <a:prstDash val="solid"/>
+                    </a:lnL>
+                    <a:lnR w="9525" cap="flat" cmpd="sng" algn="ctr">
+                      <a:solidFill>
+                        <a:srgbClr val="D8DCDC"/>
+                      </a:solidFill>
+                      <a:prstDash val="solid"/>
+                    </a:lnR>
+                    <a:lnT w="9525" cap="flat" cmpd="sng" algn="ctr">
+                      <a:solidFill>
+                        <a:srgbClr val="D8DCDC"/>
+                      </a:solidFill>
+                      <a:prstDash val="solid"/>
+                    </a:lnT>
+                    <a:lnB w="9525" cap="flat" cmpd="sng" algn="ctr">
+                      <a:solidFill>
+                        <a:srgbClr val="D8DCDC"/>
+                      </a:solidFill>
+                      <a:prstDash val="solid"/>
+                    </a:lnB>
+                    <a:solidFill>
+                      <a:srgbClr val="D8DEDC">
+                        <a:alpha val="20000"/>
+                      </a:srgbClr>
+                    </a:solidFill>
+                  </a:tcPr>
+                </a:tc>
+                <a:tc>
+                  <a:txBody>
+                    <a:bodyPr/>
+                    <a:lstStyle/>
+                    <a:p>
+                      <a:pPr algn="ctr" fontAlgn="b"/>
+                      <a:r>
+                        <a:rPr lang="pt-BR" sz="1400" u="none" strike="noStrike">
+                          <a:solidFill>
+                            <a:schemeClr val="tx1">
+                              <a:lumMod val="75000"/>
+                              <a:lumOff val="25000"/>
+                            </a:schemeClr>
+                          </a:solidFill>
+                          <a:effectLst/>
+                        </a:rPr>
+                        <a:t>77,5%</a:t>
+                      </a:r>
+                      <a:endParaRPr lang="pt-BR" sz="1400" b="0" i="0" u="none" strike="noStrike">
+                        <a:solidFill>
+                          <a:schemeClr val="tx1">
+                            <a:lumMod val="75000"/>
+                            <a:lumOff val="25000"/>
+                          </a:schemeClr>
+                        </a:solidFill>
+                        <a:effectLst/>
+                        <a:latin typeface="Calibri" panose="020F0502020204030204" pitchFamily="34" charset="0"/>
+                      </a:endParaRPr>
+                    </a:p>
+                  </a:txBody>
+                  <a:tcPr marL="167721" marR="15913" marT="83860" marB="83860" anchor="b">
+                    <a:lnL w="9525" cap="flat" cmpd="sng" algn="ctr">
+                      <a:solidFill>
+                        <a:srgbClr val="D8DCDC"/>
+                      </a:solidFill>
+                      <a:prstDash val="solid"/>
+                    </a:lnL>
+                    <a:lnR w="9525" cap="flat" cmpd="sng" algn="ctr">
+                      <a:solidFill>
+                        <a:srgbClr val="D8DCDC"/>
+                      </a:solidFill>
+                      <a:prstDash val="solid"/>
+                    </a:lnR>
+                    <a:lnT w="9525" cap="flat" cmpd="sng" algn="ctr">
+                      <a:solidFill>
+                        <a:srgbClr val="D8DCDC"/>
+                      </a:solidFill>
+                      <a:prstDash val="solid"/>
+                    </a:lnT>
+                    <a:lnB w="9525" cap="flat" cmpd="sng" algn="ctr">
+                      <a:solidFill>
+                        <a:srgbClr val="D8DCDC"/>
+                      </a:solidFill>
+                      <a:prstDash val="solid"/>
+                    </a:lnB>
+                    <a:solidFill>
+                      <a:srgbClr val="D8DEDC">
+                        <a:alpha val="20000"/>
+                      </a:srgbClr>
+                    </a:solidFill>
+                  </a:tcPr>
+                </a:tc>
+                <a:tc>
+                  <a:txBody>
+                    <a:bodyPr/>
+                    <a:lstStyle/>
+                    <a:p>
+                      <a:pPr algn="ctr" fontAlgn="b"/>
+                      <a:r>
+                        <a:rPr lang="pt-BR" sz="1400" u="none" strike="noStrike">
+                          <a:solidFill>
+                            <a:schemeClr val="tx1">
+                              <a:lumMod val="75000"/>
+                              <a:lumOff val="25000"/>
+                            </a:schemeClr>
+                          </a:solidFill>
+                          <a:effectLst/>
+                        </a:rPr>
+                        <a:t>75,0%</a:t>
+                      </a:r>
+                      <a:endParaRPr lang="pt-BR" sz="1400" b="0" i="0" u="none" strike="noStrike">
+                        <a:solidFill>
+                          <a:schemeClr val="tx1">
+                            <a:lumMod val="75000"/>
+                            <a:lumOff val="25000"/>
+                          </a:schemeClr>
+                        </a:solidFill>
+                        <a:effectLst/>
+                        <a:latin typeface="Calibri" panose="020F0502020204030204" pitchFamily="34" charset="0"/>
+                      </a:endParaRPr>
+                    </a:p>
+                  </a:txBody>
+                  <a:tcPr marL="167721" marR="15913" marT="83860" marB="83860" anchor="b">
+                    <a:lnL w="9525" cap="flat" cmpd="sng" algn="ctr">
+                      <a:solidFill>
+                        <a:srgbClr val="D8DCDC"/>
+                      </a:solidFill>
+                      <a:prstDash val="solid"/>
+                    </a:lnL>
+                    <a:lnR w="9525" cap="flat" cmpd="sng" algn="ctr">
+                      <a:solidFill>
+                        <a:srgbClr val="D8DCDC"/>
+                      </a:solidFill>
+                      <a:prstDash val="solid"/>
+                    </a:lnR>
+                    <a:lnT w="9525" cap="flat" cmpd="sng" algn="ctr">
+                      <a:solidFill>
+                        <a:srgbClr val="D8DCDC"/>
+                      </a:solidFill>
+                      <a:prstDash val="solid"/>
+                    </a:lnT>
+                    <a:lnB w="9525" cap="flat" cmpd="sng" algn="ctr">
+                      <a:solidFill>
+                        <a:srgbClr val="D8DCDC"/>
+                      </a:solidFill>
+                      <a:prstDash val="solid"/>
+                    </a:lnB>
+                    <a:solidFill>
+                      <a:srgbClr val="D8DEDC">
+                        <a:alpha val="20000"/>
+                      </a:srgbClr>
+                    </a:solidFill>
+                  </a:tcPr>
+                </a:tc>
+                <a:tc>
+                  <a:txBody>
+                    <a:bodyPr/>
+                    <a:lstStyle/>
+                    <a:p>
+                      <a:pPr algn="ctr" fontAlgn="b"/>
+                      <a:r>
+                        <a:rPr lang="pt-BR" sz="1400" u="none" strike="noStrike">
+                          <a:solidFill>
+                            <a:schemeClr val="tx1">
+                              <a:lumMod val="75000"/>
+                              <a:lumOff val="25000"/>
+                            </a:schemeClr>
+                          </a:solidFill>
+                          <a:effectLst/>
+                        </a:rPr>
+                        <a:t>75,0%</a:t>
+                      </a:r>
+                      <a:endParaRPr lang="pt-BR" sz="1400" b="0" i="0" u="none" strike="noStrike">
+                        <a:solidFill>
+                          <a:schemeClr val="tx1">
+                            <a:lumMod val="75000"/>
+                            <a:lumOff val="25000"/>
+                          </a:schemeClr>
+                        </a:solidFill>
+                        <a:effectLst/>
+                        <a:latin typeface="Calibri" panose="020F0502020204030204" pitchFamily="34" charset="0"/>
+                      </a:endParaRPr>
+                    </a:p>
+                  </a:txBody>
+                  <a:tcPr marL="167721" marR="15913" marT="83860" marB="83860" anchor="b">
+                    <a:lnL w="9525" cap="flat" cmpd="sng" algn="ctr">
+                      <a:solidFill>
+                        <a:srgbClr val="D8DCDC"/>
+                      </a:solidFill>
+                      <a:prstDash val="solid"/>
+                    </a:lnL>
+                    <a:lnR w="9525" cap="flat" cmpd="sng" algn="ctr">
+                      <a:solidFill>
+                        <a:srgbClr val="D8DCDC"/>
+                      </a:solidFill>
+                      <a:prstDash val="solid"/>
+                    </a:lnR>
+                    <a:lnT w="9525" cap="flat" cmpd="sng" algn="ctr">
+                      <a:solidFill>
+                        <a:srgbClr val="D8DCDC"/>
+                      </a:solidFill>
+                      <a:prstDash val="solid"/>
+                    </a:lnT>
+                    <a:lnB w="9525" cap="flat" cmpd="sng" algn="ctr">
+                      <a:solidFill>
+                        <a:srgbClr val="D8DCDC"/>
+                      </a:solidFill>
+                      <a:prstDash val="solid"/>
+                    </a:lnB>
+                    <a:solidFill>
+                      <a:srgbClr val="D8DEDC">
+                        <a:alpha val="20000"/>
+                      </a:srgbClr>
+                    </a:solidFill>
+                  </a:tcPr>
+                </a:tc>
+                <a:extLst>
+                  <a:ext uri="{0D108BD9-81ED-4DB2-BD59-A6C34878D82A}">
+                    <a16:rowId xmlns:a16="http://schemas.microsoft.com/office/drawing/2014/main" val="2498082664"/>
+                  </a:ext>
+                </a:extLst>
+              </a:tr>
+              <a:tr h="410916">
+                <a:tc>
+                  <a:txBody>
+                    <a:bodyPr/>
+                    <a:lstStyle/>
+                    <a:p>
+                      <a:pPr algn="ctr" fontAlgn="b"/>
+                      <a:r>
+                        <a:rPr lang="pt-BR" sz="1400" u="none" strike="noStrike">
+                          <a:solidFill>
+                            <a:schemeClr val="tx1">
+                              <a:lumMod val="75000"/>
+                              <a:lumOff val="25000"/>
+                            </a:schemeClr>
+                          </a:solidFill>
+                          <a:effectLst/>
+                        </a:rPr>
+                        <a:t>160</a:t>
+                      </a:r>
+                      <a:endParaRPr lang="pt-BR" sz="1400" b="0" i="0" u="none" strike="noStrike">
+                        <a:solidFill>
+                          <a:schemeClr val="tx1">
+                            <a:lumMod val="75000"/>
+                            <a:lumOff val="25000"/>
+                          </a:schemeClr>
+                        </a:solidFill>
+                        <a:effectLst/>
+                        <a:latin typeface="Calibri" panose="020F0502020204030204" pitchFamily="34" charset="0"/>
+                      </a:endParaRPr>
+                    </a:p>
+                  </a:txBody>
+                  <a:tcPr marL="167721" marR="15913" marT="83860" marB="83860" anchor="b">
+                    <a:lnL w="9525" cap="flat" cmpd="sng" algn="ctr">
+                      <a:solidFill>
+                        <a:srgbClr val="D8DEDC"/>
+                      </a:solidFill>
+                      <a:prstDash val="solid"/>
+                    </a:lnL>
+                    <a:lnR w="9525" cap="flat" cmpd="sng" algn="ctr">
+                      <a:solidFill>
+                        <a:srgbClr val="D8DEDC"/>
+                      </a:solidFill>
+                      <a:prstDash val="solid"/>
+                    </a:lnR>
+                    <a:lnT w="9525" cap="flat" cmpd="sng" algn="ctr">
+                      <a:solidFill>
+                        <a:srgbClr val="D8DCDC"/>
+                      </a:solidFill>
+                      <a:prstDash val="solid"/>
+                    </a:lnT>
+                    <a:lnB w="9525" cap="flat" cmpd="sng" algn="ctr">
+                      <a:solidFill>
+                        <a:srgbClr val="D8DCDC"/>
+                      </a:solidFill>
+                      <a:prstDash val="solid"/>
+                    </a:lnB>
+                    <a:noFill/>
+                  </a:tcPr>
+                </a:tc>
+                <a:tc>
+                  <a:txBody>
+                    <a:bodyPr/>
+                    <a:lstStyle/>
+                    <a:p>
+                      <a:pPr algn="ctr" fontAlgn="b"/>
+                      <a:r>
+                        <a:rPr lang="pt-BR" sz="1400" u="none" strike="noStrike">
+                          <a:solidFill>
+                            <a:schemeClr val="tx1">
+                              <a:lumMod val="75000"/>
+                              <a:lumOff val="25000"/>
+                            </a:schemeClr>
+                          </a:solidFill>
+                          <a:effectLst/>
+                        </a:rPr>
+                        <a:t>40</a:t>
+                      </a:r>
+                      <a:endParaRPr lang="pt-BR" sz="1400" b="0" i="0" u="none" strike="noStrike">
+                        <a:solidFill>
+                          <a:schemeClr val="tx1">
+                            <a:lumMod val="75000"/>
+                            <a:lumOff val="25000"/>
+                          </a:schemeClr>
+                        </a:solidFill>
+                        <a:effectLst/>
+                        <a:latin typeface="Calibri" panose="020F0502020204030204" pitchFamily="34" charset="0"/>
+                      </a:endParaRPr>
+                    </a:p>
+                  </a:txBody>
+                  <a:tcPr marL="167721" marR="15913" marT="83860" marB="83860" anchor="b">
+                    <a:lnL w="9525" cap="flat" cmpd="sng" algn="ctr">
+                      <a:solidFill>
+                        <a:srgbClr val="D8DEDC"/>
+                      </a:solidFill>
+                      <a:prstDash val="solid"/>
+                    </a:lnL>
+                    <a:lnR w="9525" cap="flat" cmpd="sng" algn="ctr">
+                      <a:solidFill>
+                        <a:srgbClr val="D8DEDC"/>
+                      </a:solidFill>
+                      <a:prstDash val="solid"/>
+                    </a:lnR>
+                    <a:lnT w="9525" cap="flat" cmpd="sng" algn="ctr">
+                      <a:solidFill>
+                        <a:srgbClr val="D8DCDC"/>
+                      </a:solidFill>
+                      <a:prstDash val="solid"/>
+                    </a:lnT>
+                    <a:lnB w="9525" cap="flat" cmpd="sng" algn="ctr">
+                      <a:solidFill>
+                        <a:srgbClr val="D8DCDC"/>
+                      </a:solidFill>
+                      <a:prstDash val="solid"/>
+                    </a:lnB>
+                    <a:noFill/>
+                  </a:tcPr>
+                </a:tc>
+                <a:tc>
+                  <a:txBody>
+                    <a:bodyPr/>
+                    <a:lstStyle/>
+                    <a:p>
+                      <a:pPr algn="ctr" fontAlgn="b"/>
+                      <a:r>
+                        <a:rPr lang="pt-BR" sz="1400" u="none" strike="noStrike">
+                          <a:solidFill>
+                            <a:schemeClr val="tx1">
+                              <a:lumMod val="75000"/>
+                              <a:lumOff val="25000"/>
+                            </a:schemeClr>
+                          </a:solidFill>
+                          <a:effectLst/>
+                        </a:rPr>
+                        <a:t>82,5%</a:t>
+                      </a:r>
+                      <a:endParaRPr lang="pt-BR" sz="1400" b="0" i="0" u="none" strike="noStrike">
+                        <a:solidFill>
+                          <a:schemeClr val="tx1">
+                            <a:lumMod val="75000"/>
+                            <a:lumOff val="25000"/>
+                          </a:schemeClr>
+                        </a:solidFill>
+                        <a:effectLst/>
+                        <a:latin typeface="Calibri" panose="020F0502020204030204" pitchFamily="34" charset="0"/>
+                      </a:endParaRPr>
+                    </a:p>
+                  </a:txBody>
+                  <a:tcPr marL="167721" marR="15913" marT="83860" marB="83860" anchor="b">
+                    <a:lnL w="9525" cap="flat" cmpd="sng" algn="ctr">
+                      <a:solidFill>
+                        <a:srgbClr val="D8DEDC"/>
+                      </a:solidFill>
+                      <a:prstDash val="solid"/>
+                    </a:lnL>
+                    <a:lnR w="9525" cap="flat" cmpd="sng" algn="ctr">
+                      <a:solidFill>
+                        <a:srgbClr val="D8DEDC"/>
+                      </a:solidFill>
+                      <a:prstDash val="solid"/>
+                    </a:lnR>
+                    <a:lnT w="9525" cap="flat" cmpd="sng" algn="ctr">
+                      <a:solidFill>
+                        <a:srgbClr val="D8DCDC"/>
+                      </a:solidFill>
+                      <a:prstDash val="solid"/>
+                    </a:lnT>
+                    <a:lnB w="9525" cap="flat" cmpd="sng" algn="ctr">
+                      <a:solidFill>
+                        <a:srgbClr val="D8DCDC"/>
+                      </a:solidFill>
+                      <a:prstDash val="solid"/>
+                    </a:lnB>
+                    <a:noFill/>
+                  </a:tcPr>
+                </a:tc>
+                <a:tc>
+                  <a:txBody>
+                    <a:bodyPr/>
+                    <a:lstStyle/>
+                    <a:p>
+                      <a:pPr algn="ctr" fontAlgn="b"/>
+                      <a:r>
+                        <a:rPr lang="pt-BR" sz="1400" u="none" strike="noStrike">
+                          <a:solidFill>
+                            <a:schemeClr val="tx1">
+                              <a:lumMod val="75000"/>
+                              <a:lumOff val="25000"/>
+                            </a:schemeClr>
+                          </a:solidFill>
+                          <a:effectLst/>
+                        </a:rPr>
+                        <a:t>82,5%</a:t>
+                      </a:r>
+                      <a:endParaRPr lang="pt-BR" sz="1400" b="0" i="0" u="none" strike="noStrike">
+                        <a:solidFill>
+                          <a:schemeClr val="tx1">
+                            <a:lumMod val="75000"/>
+                            <a:lumOff val="25000"/>
+                          </a:schemeClr>
+                        </a:solidFill>
+                        <a:effectLst/>
+                        <a:latin typeface="Calibri" panose="020F0502020204030204" pitchFamily="34" charset="0"/>
+                      </a:endParaRPr>
+                    </a:p>
+                  </a:txBody>
+                  <a:tcPr marL="167721" marR="15913" marT="83860" marB="83860" anchor="b">
+                    <a:lnL w="9525" cap="flat" cmpd="sng" algn="ctr">
+                      <a:solidFill>
+                        <a:srgbClr val="D8DEDC"/>
+                      </a:solidFill>
+                      <a:prstDash val="solid"/>
+                    </a:lnL>
+                    <a:lnR w="9525" cap="flat" cmpd="sng" algn="ctr">
+                      <a:solidFill>
+                        <a:srgbClr val="D8DEDC"/>
+                      </a:solidFill>
+                      <a:prstDash val="solid"/>
+                    </a:lnR>
+                    <a:lnT w="9525" cap="flat" cmpd="sng" algn="ctr">
+                      <a:solidFill>
+                        <a:srgbClr val="D8DCDC"/>
+                      </a:solidFill>
+                      <a:prstDash val="solid"/>
+                    </a:lnT>
+                    <a:lnB w="9525" cap="flat" cmpd="sng" algn="ctr">
+                      <a:solidFill>
+                        <a:srgbClr val="D8DCDC"/>
+                      </a:solidFill>
+                      <a:prstDash val="solid"/>
+                    </a:lnB>
+                    <a:noFill/>
+                  </a:tcPr>
+                </a:tc>
+                <a:tc>
+                  <a:txBody>
+                    <a:bodyPr/>
+                    <a:lstStyle/>
+                    <a:p>
+                      <a:pPr algn="ctr" fontAlgn="b"/>
+                      <a:r>
+                        <a:rPr lang="pt-BR" sz="1400" u="none" strike="noStrike">
+                          <a:solidFill>
+                            <a:schemeClr val="tx1">
+                              <a:lumMod val="75000"/>
+                              <a:lumOff val="25000"/>
+                            </a:schemeClr>
+                          </a:solidFill>
+                          <a:effectLst/>
+                        </a:rPr>
+                        <a:t>82,5%</a:t>
+                      </a:r>
+                      <a:endParaRPr lang="pt-BR" sz="1400" b="0" i="0" u="none" strike="noStrike">
+                        <a:solidFill>
+                          <a:schemeClr val="tx1">
+                            <a:lumMod val="75000"/>
+                            <a:lumOff val="25000"/>
+                          </a:schemeClr>
+                        </a:solidFill>
+                        <a:effectLst/>
+                        <a:latin typeface="Calibri" panose="020F0502020204030204" pitchFamily="34" charset="0"/>
+                      </a:endParaRPr>
+                    </a:p>
+                  </a:txBody>
+                  <a:tcPr marL="167721" marR="15913" marT="83860" marB="83860" anchor="b">
+                    <a:lnL w="9525" cap="flat" cmpd="sng" algn="ctr">
+                      <a:solidFill>
+                        <a:srgbClr val="D8DEDC"/>
+                      </a:solidFill>
+                      <a:prstDash val="solid"/>
+                    </a:lnL>
+                    <a:lnR w="9525" cap="flat" cmpd="sng" algn="ctr">
+                      <a:solidFill>
+                        <a:srgbClr val="D8DEDC"/>
+                      </a:solidFill>
+                      <a:prstDash val="solid"/>
+                    </a:lnR>
+                    <a:lnT w="9525" cap="flat" cmpd="sng" algn="ctr">
+                      <a:solidFill>
+                        <a:srgbClr val="D8DCDC"/>
+                      </a:solidFill>
+                      <a:prstDash val="solid"/>
+                    </a:lnT>
+                    <a:lnB w="9525" cap="flat" cmpd="sng" algn="ctr">
+                      <a:solidFill>
+                        <a:srgbClr val="D8DCDC"/>
+                      </a:solidFill>
+                      <a:prstDash val="solid"/>
+                    </a:lnB>
+                    <a:noFill/>
+                  </a:tcPr>
+                </a:tc>
+                <a:extLst>
+                  <a:ext uri="{0D108BD9-81ED-4DB2-BD59-A6C34878D82A}">
+                    <a16:rowId xmlns:a16="http://schemas.microsoft.com/office/drawing/2014/main" val="919929150"/>
+                  </a:ext>
+                </a:extLst>
+              </a:tr>
+              <a:tr h="410916">
+                <a:tc>
+                  <a:txBody>
+                    <a:bodyPr/>
+                    <a:lstStyle/>
+                    <a:p>
+                      <a:pPr algn="ctr" fontAlgn="b"/>
+                      <a:r>
+                        <a:rPr lang="pt-BR" sz="1400" u="none" strike="noStrike">
+                          <a:solidFill>
+                            <a:schemeClr val="tx1">
+                              <a:lumMod val="75000"/>
+                              <a:lumOff val="25000"/>
+                            </a:schemeClr>
+                          </a:solidFill>
+                          <a:effectLst/>
+                        </a:rPr>
+                        <a:t>200</a:t>
+                      </a:r>
+                      <a:endParaRPr lang="pt-BR" sz="1400" b="0" i="0" u="none" strike="noStrike">
+                        <a:solidFill>
+                          <a:schemeClr val="tx1">
+                            <a:lumMod val="75000"/>
+                            <a:lumOff val="25000"/>
+                          </a:schemeClr>
+                        </a:solidFill>
+                        <a:effectLst/>
+                        <a:latin typeface="Calibri" panose="020F0502020204030204" pitchFamily="34" charset="0"/>
+                      </a:endParaRPr>
+                    </a:p>
+                  </a:txBody>
+                  <a:tcPr marL="167721" marR="15913" marT="83860" marB="83860" anchor="b">
+                    <a:lnL w="9525" cap="flat" cmpd="sng" algn="ctr">
+                      <a:solidFill>
+                        <a:srgbClr val="D8DCDC"/>
+                      </a:solidFill>
+                      <a:prstDash val="solid"/>
+                    </a:lnL>
+                    <a:lnR w="9525" cap="flat" cmpd="sng" algn="ctr">
+                      <a:solidFill>
+                        <a:srgbClr val="D8DCDC"/>
+                      </a:solidFill>
+                      <a:prstDash val="solid"/>
+                    </a:lnR>
+                    <a:lnT w="9525" cap="flat" cmpd="sng" algn="ctr">
+                      <a:solidFill>
+                        <a:srgbClr val="D8DCDC"/>
+                      </a:solidFill>
+                      <a:prstDash val="solid"/>
+                    </a:lnT>
+                    <a:lnB w="9525" cap="flat" cmpd="sng" algn="ctr">
+                      <a:solidFill>
+                        <a:srgbClr val="D8DCDC"/>
+                      </a:solidFill>
+                      <a:prstDash val="solid"/>
+                    </a:lnB>
+                    <a:solidFill>
+                      <a:srgbClr val="D8DEDC">
+                        <a:alpha val="20000"/>
+                      </a:srgbClr>
+                    </a:solidFill>
+                  </a:tcPr>
+                </a:tc>
+                <a:tc>
+                  <a:txBody>
+                    <a:bodyPr/>
+                    <a:lstStyle/>
+                    <a:p>
+                      <a:pPr algn="ctr" fontAlgn="b"/>
+                      <a:r>
+                        <a:rPr lang="pt-BR" sz="1400" u="none" strike="noStrike">
+                          <a:solidFill>
+                            <a:schemeClr val="tx1">
+                              <a:lumMod val="75000"/>
+                              <a:lumOff val="25000"/>
+                            </a:schemeClr>
+                          </a:solidFill>
+                          <a:effectLst/>
+                        </a:rPr>
+                        <a:t>40</a:t>
+                      </a:r>
+                      <a:endParaRPr lang="pt-BR" sz="1400" b="0" i="0" u="none" strike="noStrike">
+                        <a:solidFill>
+                          <a:schemeClr val="tx1">
+                            <a:lumMod val="75000"/>
+                            <a:lumOff val="25000"/>
+                          </a:schemeClr>
+                        </a:solidFill>
+                        <a:effectLst/>
+                        <a:latin typeface="Calibri" panose="020F0502020204030204" pitchFamily="34" charset="0"/>
+                      </a:endParaRPr>
+                    </a:p>
+                  </a:txBody>
+                  <a:tcPr marL="167721" marR="15913" marT="83860" marB="83860" anchor="b">
+                    <a:lnL w="9525" cap="flat" cmpd="sng" algn="ctr">
+                      <a:solidFill>
+                        <a:srgbClr val="D8DCDC"/>
+                      </a:solidFill>
+                      <a:prstDash val="solid"/>
+                    </a:lnL>
+                    <a:lnR w="9525" cap="flat" cmpd="sng" algn="ctr">
+                      <a:solidFill>
+                        <a:srgbClr val="D8DCDC"/>
+                      </a:solidFill>
+                      <a:prstDash val="solid"/>
+                    </a:lnR>
+                    <a:lnT w="9525" cap="flat" cmpd="sng" algn="ctr">
+                      <a:solidFill>
+                        <a:srgbClr val="D8DCDC"/>
+                      </a:solidFill>
+                      <a:prstDash val="solid"/>
+                    </a:lnT>
+                    <a:lnB w="9525" cap="flat" cmpd="sng" algn="ctr">
+                      <a:solidFill>
+                        <a:srgbClr val="D8DCDC"/>
+                      </a:solidFill>
+                      <a:prstDash val="solid"/>
+                    </a:lnB>
+                    <a:solidFill>
+                      <a:srgbClr val="D8DEDC">
+                        <a:alpha val="20000"/>
+                      </a:srgbClr>
+                    </a:solidFill>
+                  </a:tcPr>
+                </a:tc>
+                <a:tc>
+                  <a:txBody>
+                    <a:bodyPr/>
+                    <a:lstStyle/>
+                    <a:p>
+                      <a:pPr algn="ctr" fontAlgn="b"/>
+                      <a:r>
+                        <a:rPr lang="pt-BR" sz="1400" u="none" strike="noStrike">
+                          <a:solidFill>
+                            <a:schemeClr val="tx1">
+                              <a:lumMod val="75000"/>
+                              <a:lumOff val="25000"/>
+                            </a:schemeClr>
+                          </a:solidFill>
+                          <a:effectLst/>
+                        </a:rPr>
+                        <a:t>82,5%</a:t>
+                      </a:r>
+                      <a:endParaRPr lang="pt-BR" sz="1400" b="0" i="0" u="none" strike="noStrike">
+                        <a:solidFill>
+                          <a:schemeClr val="tx1">
+                            <a:lumMod val="75000"/>
+                            <a:lumOff val="25000"/>
+                          </a:schemeClr>
+                        </a:solidFill>
+                        <a:effectLst/>
+                        <a:latin typeface="Calibri" panose="020F0502020204030204" pitchFamily="34" charset="0"/>
+                      </a:endParaRPr>
+                    </a:p>
+                  </a:txBody>
+                  <a:tcPr marL="167721" marR="15913" marT="83860" marB="83860" anchor="b">
+                    <a:lnL w="9525" cap="flat" cmpd="sng" algn="ctr">
+                      <a:solidFill>
+                        <a:srgbClr val="D8DCDC"/>
+                      </a:solidFill>
+                      <a:prstDash val="solid"/>
+                    </a:lnL>
+                    <a:lnR w="9525" cap="flat" cmpd="sng" algn="ctr">
+                      <a:solidFill>
+                        <a:srgbClr val="D8DCDC"/>
+                      </a:solidFill>
+                      <a:prstDash val="solid"/>
+                    </a:lnR>
+                    <a:lnT w="9525" cap="flat" cmpd="sng" algn="ctr">
+                      <a:solidFill>
+                        <a:srgbClr val="D8DCDC"/>
+                      </a:solidFill>
+                      <a:prstDash val="solid"/>
+                    </a:lnT>
+                    <a:lnB w="9525" cap="flat" cmpd="sng" algn="ctr">
+                      <a:solidFill>
+                        <a:srgbClr val="D8DCDC"/>
+                      </a:solidFill>
+                      <a:prstDash val="solid"/>
+                    </a:lnB>
+                    <a:solidFill>
+                      <a:srgbClr val="D8DEDC">
+                        <a:alpha val="20000"/>
+                      </a:srgbClr>
+                    </a:solidFill>
+                  </a:tcPr>
+                </a:tc>
+                <a:tc>
+                  <a:txBody>
+                    <a:bodyPr/>
+                    <a:lstStyle/>
+                    <a:p>
+                      <a:pPr algn="ctr" fontAlgn="b"/>
+                      <a:r>
+                        <a:rPr lang="pt-BR" sz="1400" u="none" strike="noStrike">
+                          <a:solidFill>
+                            <a:schemeClr val="tx1">
+                              <a:lumMod val="75000"/>
+                              <a:lumOff val="25000"/>
+                            </a:schemeClr>
+                          </a:solidFill>
+                          <a:effectLst/>
+                        </a:rPr>
+                        <a:t>85,0%</a:t>
+                      </a:r>
+                      <a:endParaRPr lang="pt-BR" sz="1400" b="0" i="0" u="none" strike="noStrike">
+                        <a:solidFill>
+                          <a:schemeClr val="tx1">
+                            <a:lumMod val="75000"/>
+                            <a:lumOff val="25000"/>
+                          </a:schemeClr>
+                        </a:solidFill>
+                        <a:effectLst/>
+                        <a:latin typeface="Calibri" panose="020F0502020204030204" pitchFamily="34" charset="0"/>
+                      </a:endParaRPr>
+                    </a:p>
+                  </a:txBody>
+                  <a:tcPr marL="167721" marR="15913" marT="83860" marB="83860" anchor="b">
+                    <a:lnL w="9525" cap="flat" cmpd="sng" algn="ctr">
+                      <a:solidFill>
+                        <a:srgbClr val="D8DCDC"/>
+                      </a:solidFill>
+                      <a:prstDash val="solid"/>
+                    </a:lnL>
+                    <a:lnR w="9525" cap="flat" cmpd="sng" algn="ctr">
+                      <a:solidFill>
+                        <a:srgbClr val="D8DCDC"/>
+                      </a:solidFill>
+                      <a:prstDash val="solid"/>
+                    </a:lnR>
+                    <a:lnT w="9525" cap="flat" cmpd="sng" algn="ctr">
+                      <a:solidFill>
+                        <a:srgbClr val="D8DCDC"/>
+                      </a:solidFill>
+                      <a:prstDash val="solid"/>
+                    </a:lnT>
+                    <a:lnB w="9525" cap="flat" cmpd="sng" algn="ctr">
+                      <a:solidFill>
+                        <a:srgbClr val="D8DCDC"/>
+                      </a:solidFill>
+                      <a:prstDash val="solid"/>
+                    </a:lnB>
+                    <a:solidFill>
+                      <a:srgbClr val="D8DEDC">
+                        <a:alpha val="20000"/>
+                      </a:srgbClr>
+                    </a:solidFill>
+                  </a:tcPr>
+                </a:tc>
+                <a:tc>
+                  <a:txBody>
+                    <a:bodyPr/>
+                    <a:lstStyle/>
+                    <a:p>
+                      <a:pPr algn="ctr" fontAlgn="b"/>
+                      <a:r>
+                        <a:rPr lang="pt-BR" sz="1400" u="none" strike="noStrike">
+                          <a:solidFill>
+                            <a:schemeClr val="tx1">
+                              <a:lumMod val="75000"/>
+                              <a:lumOff val="25000"/>
+                            </a:schemeClr>
+                          </a:solidFill>
+                          <a:effectLst/>
+                        </a:rPr>
+                        <a:t>80,0%</a:t>
+                      </a:r>
+                      <a:endParaRPr lang="pt-BR" sz="1400" b="0" i="0" u="none" strike="noStrike">
+                        <a:solidFill>
+                          <a:schemeClr val="tx1">
+                            <a:lumMod val="75000"/>
+                            <a:lumOff val="25000"/>
+                          </a:schemeClr>
+                        </a:solidFill>
+                        <a:effectLst/>
+                        <a:latin typeface="Calibri" panose="020F0502020204030204" pitchFamily="34" charset="0"/>
+                      </a:endParaRPr>
+                    </a:p>
+                  </a:txBody>
+                  <a:tcPr marL="167721" marR="15913" marT="83860" marB="83860" anchor="b">
+                    <a:lnL w="9525" cap="flat" cmpd="sng" algn="ctr">
+                      <a:solidFill>
+                        <a:srgbClr val="D8DCDC"/>
+                      </a:solidFill>
+                      <a:prstDash val="solid"/>
+                    </a:lnL>
+                    <a:lnR w="9525" cap="flat" cmpd="sng" algn="ctr">
+                      <a:solidFill>
+                        <a:srgbClr val="D8DCDC"/>
+                      </a:solidFill>
+                      <a:prstDash val="solid"/>
+                    </a:lnR>
+                    <a:lnT w="9525" cap="flat" cmpd="sng" algn="ctr">
+                      <a:solidFill>
+                        <a:srgbClr val="D8DCDC"/>
+                      </a:solidFill>
+                      <a:prstDash val="solid"/>
+                    </a:lnT>
+                    <a:lnB w="9525" cap="flat" cmpd="sng" algn="ctr">
+                      <a:solidFill>
+                        <a:srgbClr val="D8DCDC"/>
+                      </a:solidFill>
+                      <a:prstDash val="solid"/>
+                    </a:lnB>
+                    <a:solidFill>
+                      <a:srgbClr val="D8DEDC">
+                        <a:alpha val="20000"/>
+                      </a:srgbClr>
+                    </a:solidFill>
+                  </a:tcPr>
+                </a:tc>
+                <a:extLst>
+                  <a:ext uri="{0D108BD9-81ED-4DB2-BD59-A6C34878D82A}">
+                    <a16:rowId xmlns:a16="http://schemas.microsoft.com/office/drawing/2014/main" val="1441242549"/>
+                  </a:ext>
+                </a:extLst>
+              </a:tr>
+              <a:tr h="410916">
+                <a:tc>
+                  <a:txBody>
+                    <a:bodyPr/>
+                    <a:lstStyle/>
+                    <a:p>
+                      <a:pPr algn="ctr" fontAlgn="b"/>
+                      <a:r>
+                        <a:rPr lang="pt-BR" sz="1400" u="none" strike="noStrike">
+                          <a:solidFill>
+                            <a:schemeClr val="tx1">
+                              <a:lumMod val="75000"/>
+                              <a:lumOff val="25000"/>
+                            </a:schemeClr>
+                          </a:solidFill>
+                          <a:effectLst/>
+                        </a:rPr>
+                        <a:t>240</a:t>
+                      </a:r>
+                      <a:endParaRPr lang="pt-BR" sz="1400" b="0" i="0" u="none" strike="noStrike">
+                        <a:solidFill>
+                          <a:schemeClr val="tx1">
+                            <a:lumMod val="75000"/>
+                            <a:lumOff val="25000"/>
+                          </a:schemeClr>
+                        </a:solidFill>
+                        <a:effectLst/>
+                        <a:latin typeface="Calibri" panose="020F0502020204030204" pitchFamily="34" charset="0"/>
+                      </a:endParaRPr>
+                    </a:p>
+                  </a:txBody>
+                  <a:tcPr marL="167721" marR="15913" marT="83860" marB="83860" anchor="b">
+                    <a:lnL w="9525" cap="flat" cmpd="sng" algn="ctr">
+                      <a:solidFill>
+                        <a:srgbClr val="D8DEDC"/>
+                      </a:solidFill>
+                      <a:prstDash val="solid"/>
+                    </a:lnL>
+                    <a:lnR w="9525" cap="flat" cmpd="sng" algn="ctr">
+                      <a:solidFill>
+                        <a:srgbClr val="D8DEDC"/>
+                      </a:solidFill>
+                      <a:prstDash val="solid"/>
+                    </a:lnR>
+                    <a:lnT w="9525" cap="flat" cmpd="sng" algn="ctr">
+                      <a:solidFill>
+                        <a:srgbClr val="D8DCDC"/>
+                      </a:solidFill>
+                      <a:prstDash val="solid"/>
+                    </a:lnT>
+                    <a:lnB w="9525" cap="flat" cmpd="sng" algn="ctr">
+                      <a:solidFill>
+                        <a:srgbClr val="D8DCDC"/>
+                      </a:solidFill>
+                      <a:prstDash val="solid"/>
+                    </a:lnB>
+                    <a:noFill/>
+                  </a:tcPr>
+                </a:tc>
+                <a:tc>
+                  <a:txBody>
+                    <a:bodyPr/>
+                    <a:lstStyle/>
+                    <a:p>
+                      <a:pPr algn="ctr" fontAlgn="b"/>
+                      <a:r>
+                        <a:rPr lang="pt-BR" sz="1400" u="none" strike="noStrike">
+                          <a:solidFill>
+                            <a:schemeClr val="tx1">
+                              <a:lumMod val="75000"/>
+                              <a:lumOff val="25000"/>
+                            </a:schemeClr>
+                          </a:solidFill>
+                          <a:effectLst/>
+                        </a:rPr>
+                        <a:t>40</a:t>
+                      </a:r>
+                      <a:endParaRPr lang="pt-BR" sz="1400" b="0" i="0" u="none" strike="noStrike">
+                        <a:solidFill>
+                          <a:schemeClr val="tx1">
+                            <a:lumMod val="75000"/>
+                            <a:lumOff val="25000"/>
+                          </a:schemeClr>
+                        </a:solidFill>
+                        <a:effectLst/>
+                        <a:latin typeface="Calibri" panose="020F0502020204030204" pitchFamily="34" charset="0"/>
+                      </a:endParaRPr>
+                    </a:p>
+                  </a:txBody>
+                  <a:tcPr marL="167721" marR="15913" marT="83860" marB="83860" anchor="b">
+                    <a:lnL w="9525" cap="flat" cmpd="sng" algn="ctr">
+                      <a:solidFill>
+                        <a:srgbClr val="D8DEDC"/>
+                      </a:solidFill>
+                      <a:prstDash val="solid"/>
+                    </a:lnL>
+                    <a:lnR w="9525" cap="flat" cmpd="sng" algn="ctr">
+                      <a:solidFill>
+                        <a:srgbClr val="D8DEDC"/>
+                      </a:solidFill>
+                      <a:prstDash val="solid"/>
+                    </a:lnR>
+                    <a:lnT w="9525" cap="flat" cmpd="sng" algn="ctr">
+                      <a:solidFill>
+                        <a:srgbClr val="D8DCDC"/>
+                      </a:solidFill>
+                      <a:prstDash val="solid"/>
+                    </a:lnT>
+                    <a:lnB w="9525" cap="flat" cmpd="sng" algn="ctr">
+                      <a:solidFill>
+                        <a:srgbClr val="D8DCDC"/>
+                      </a:solidFill>
+                      <a:prstDash val="solid"/>
+                    </a:lnB>
+                    <a:noFill/>
+                  </a:tcPr>
+                </a:tc>
+                <a:tc>
+                  <a:txBody>
+                    <a:bodyPr/>
+                    <a:lstStyle/>
+                    <a:p>
+                      <a:pPr algn="ctr" fontAlgn="b"/>
+                      <a:r>
+                        <a:rPr lang="pt-BR" sz="1400" u="none" strike="noStrike">
+                          <a:solidFill>
+                            <a:schemeClr val="tx1">
+                              <a:lumMod val="75000"/>
+                              <a:lumOff val="25000"/>
+                            </a:schemeClr>
+                          </a:solidFill>
+                          <a:effectLst/>
+                        </a:rPr>
+                        <a:t>82,5%</a:t>
+                      </a:r>
+                      <a:endParaRPr lang="pt-BR" sz="1400" b="0" i="0" u="none" strike="noStrike">
+                        <a:solidFill>
+                          <a:schemeClr val="tx1">
+                            <a:lumMod val="75000"/>
+                            <a:lumOff val="25000"/>
+                          </a:schemeClr>
+                        </a:solidFill>
+                        <a:effectLst/>
+                        <a:latin typeface="Calibri" panose="020F0502020204030204" pitchFamily="34" charset="0"/>
+                      </a:endParaRPr>
+                    </a:p>
+                  </a:txBody>
+                  <a:tcPr marL="167721" marR="15913" marT="83860" marB="83860" anchor="b">
+                    <a:lnL w="9525" cap="flat" cmpd="sng" algn="ctr">
+                      <a:solidFill>
+                        <a:srgbClr val="D8DEDC"/>
+                      </a:solidFill>
+                      <a:prstDash val="solid"/>
+                    </a:lnL>
+                    <a:lnR w="9525" cap="flat" cmpd="sng" algn="ctr">
+                      <a:solidFill>
+                        <a:srgbClr val="D8DEDC"/>
+                      </a:solidFill>
+                      <a:prstDash val="solid"/>
+                    </a:lnR>
+                    <a:lnT w="9525" cap="flat" cmpd="sng" algn="ctr">
+                      <a:solidFill>
+                        <a:srgbClr val="D8DCDC"/>
+                      </a:solidFill>
+                      <a:prstDash val="solid"/>
+                    </a:lnT>
+                    <a:lnB w="9525" cap="flat" cmpd="sng" algn="ctr">
+                      <a:solidFill>
+                        <a:srgbClr val="D8DCDC"/>
+                      </a:solidFill>
+                      <a:prstDash val="solid"/>
+                    </a:lnB>
+                    <a:noFill/>
+                  </a:tcPr>
+                </a:tc>
+                <a:tc>
+                  <a:txBody>
+                    <a:bodyPr/>
+                    <a:lstStyle/>
+                    <a:p>
+                      <a:pPr algn="ctr" fontAlgn="b"/>
+                      <a:r>
+                        <a:rPr lang="pt-BR" sz="1400" u="none" strike="noStrike">
+                          <a:solidFill>
+                            <a:schemeClr val="tx1">
+                              <a:lumMod val="75000"/>
+                              <a:lumOff val="25000"/>
+                            </a:schemeClr>
+                          </a:solidFill>
+                          <a:effectLst/>
+                        </a:rPr>
+                        <a:t>82,5%</a:t>
+                      </a:r>
+                      <a:endParaRPr lang="pt-BR" sz="1400" b="0" i="0" u="none" strike="noStrike">
+                        <a:solidFill>
+                          <a:schemeClr val="tx1">
+                            <a:lumMod val="75000"/>
+                            <a:lumOff val="25000"/>
+                          </a:schemeClr>
+                        </a:solidFill>
+                        <a:effectLst/>
+                        <a:latin typeface="Calibri" panose="020F0502020204030204" pitchFamily="34" charset="0"/>
+                      </a:endParaRPr>
+                    </a:p>
+                  </a:txBody>
+                  <a:tcPr marL="167721" marR="15913" marT="83860" marB="83860" anchor="b">
+                    <a:lnL w="9525" cap="flat" cmpd="sng" algn="ctr">
+                      <a:solidFill>
+                        <a:srgbClr val="D8DEDC"/>
+                      </a:solidFill>
+                      <a:prstDash val="solid"/>
+                    </a:lnL>
+                    <a:lnR w="9525" cap="flat" cmpd="sng" algn="ctr">
+                      <a:solidFill>
+                        <a:srgbClr val="D8DEDC"/>
+                      </a:solidFill>
+                      <a:prstDash val="solid"/>
+                    </a:lnR>
+                    <a:lnT w="9525" cap="flat" cmpd="sng" algn="ctr">
+                      <a:solidFill>
+                        <a:srgbClr val="D8DCDC"/>
+                      </a:solidFill>
+                      <a:prstDash val="solid"/>
+                    </a:lnT>
+                    <a:lnB w="9525" cap="flat" cmpd="sng" algn="ctr">
+                      <a:solidFill>
+                        <a:srgbClr val="D8DCDC"/>
+                      </a:solidFill>
+                      <a:prstDash val="solid"/>
+                    </a:lnB>
+                    <a:noFill/>
+                  </a:tcPr>
+                </a:tc>
+                <a:tc>
+                  <a:txBody>
+                    <a:bodyPr/>
+                    <a:lstStyle/>
+                    <a:p>
+                      <a:pPr algn="ctr" fontAlgn="b"/>
+                      <a:r>
+                        <a:rPr lang="pt-BR" sz="1400" u="none" strike="noStrike">
+                          <a:solidFill>
+                            <a:schemeClr val="tx1">
+                              <a:lumMod val="75000"/>
+                              <a:lumOff val="25000"/>
+                            </a:schemeClr>
+                          </a:solidFill>
+                          <a:effectLst/>
+                        </a:rPr>
+                        <a:t>80,0%</a:t>
+                      </a:r>
+                      <a:endParaRPr lang="pt-BR" sz="1400" b="0" i="0" u="none" strike="noStrike">
+                        <a:solidFill>
+                          <a:schemeClr val="tx1">
+                            <a:lumMod val="75000"/>
+                            <a:lumOff val="25000"/>
+                          </a:schemeClr>
+                        </a:solidFill>
+                        <a:effectLst/>
+                        <a:latin typeface="Calibri" panose="020F0502020204030204" pitchFamily="34" charset="0"/>
+                      </a:endParaRPr>
+                    </a:p>
+                  </a:txBody>
+                  <a:tcPr marL="167721" marR="15913" marT="83860" marB="83860" anchor="b">
+                    <a:lnL w="9525" cap="flat" cmpd="sng" algn="ctr">
+                      <a:solidFill>
+                        <a:srgbClr val="D8DEDC"/>
+                      </a:solidFill>
+                      <a:prstDash val="solid"/>
+                    </a:lnL>
+                    <a:lnR w="9525" cap="flat" cmpd="sng" algn="ctr">
+                      <a:solidFill>
+                        <a:srgbClr val="D8DEDC"/>
+                      </a:solidFill>
+                      <a:prstDash val="solid"/>
+                    </a:lnR>
+                    <a:lnT w="9525" cap="flat" cmpd="sng" algn="ctr">
+                      <a:solidFill>
+                        <a:srgbClr val="D8DCDC"/>
+                      </a:solidFill>
+                      <a:prstDash val="solid"/>
+                    </a:lnT>
+                    <a:lnB w="9525" cap="flat" cmpd="sng" algn="ctr">
+                      <a:solidFill>
+                        <a:srgbClr val="D8DCDC"/>
+                      </a:solidFill>
+                      <a:prstDash val="solid"/>
+                    </a:lnB>
+                    <a:noFill/>
+                  </a:tcPr>
+                </a:tc>
+                <a:extLst>
+                  <a:ext uri="{0D108BD9-81ED-4DB2-BD59-A6C34878D82A}">
+                    <a16:rowId xmlns:a16="http://schemas.microsoft.com/office/drawing/2014/main" val="1160401593"/>
+                  </a:ext>
+                </a:extLst>
+              </a:tr>
+              <a:tr h="410916">
+                <a:tc>
+                  <a:txBody>
+                    <a:bodyPr/>
+                    <a:lstStyle/>
+                    <a:p>
+                      <a:pPr algn="ctr" fontAlgn="b"/>
+                      <a:r>
+                        <a:rPr lang="pt-BR" sz="1400" u="none" strike="noStrike">
+                          <a:solidFill>
+                            <a:schemeClr val="tx1">
+                              <a:lumMod val="75000"/>
+                              <a:lumOff val="25000"/>
+                            </a:schemeClr>
+                          </a:solidFill>
+                          <a:effectLst/>
+                        </a:rPr>
+                        <a:t>280</a:t>
+                      </a:r>
+                      <a:endParaRPr lang="pt-BR" sz="1400" b="0" i="0" u="none" strike="noStrike">
+                        <a:solidFill>
+                          <a:schemeClr val="tx1">
+                            <a:lumMod val="75000"/>
+                            <a:lumOff val="25000"/>
+                          </a:schemeClr>
+                        </a:solidFill>
+                        <a:effectLst/>
+                        <a:latin typeface="Calibri" panose="020F0502020204030204" pitchFamily="34" charset="0"/>
+                      </a:endParaRPr>
+                    </a:p>
+                  </a:txBody>
+                  <a:tcPr marL="167721" marR="15913" marT="83860" marB="83860" anchor="b">
+                    <a:lnL w="9525" cap="flat" cmpd="sng" algn="ctr">
+                      <a:solidFill>
+                        <a:srgbClr val="D8DCDC"/>
+                      </a:solidFill>
+                      <a:prstDash val="solid"/>
+                    </a:lnL>
+                    <a:lnR w="9525" cap="flat" cmpd="sng" algn="ctr">
+                      <a:solidFill>
+                        <a:srgbClr val="D8DCDC"/>
+                      </a:solidFill>
+                      <a:prstDash val="solid"/>
+                    </a:lnR>
+                    <a:lnT w="9525" cap="flat" cmpd="sng" algn="ctr">
+                      <a:solidFill>
+                        <a:srgbClr val="D8DCDC"/>
+                      </a:solidFill>
+                      <a:prstDash val="solid"/>
+                    </a:lnT>
+                    <a:lnB w="9525" cap="flat" cmpd="sng" algn="ctr">
+                      <a:solidFill>
+                        <a:srgbClr val="D8DCDC"/>
+                      </a:solidFill>
+                      <a:prstDash val="solid"/>
+                    </a:lnB>
+                    <a:solidFill>
+                      <a:srgbClr val="D8DEDC">
+                        <a:alpha val="20000"/>
+                      </a:srgbClr>
+                    </a:solidFill>
+                  </a:tcPr>
+                </a:tc>
+                <a:tc>
+                  <a:txBody>
+                    <a:bodyPr/>
+                    <a:lstStyle/>
+                    <a:p>
+                      <a:pPr algn="ctr" fontAlgn="b"/>
+                      <a:r>
+                        <a:rPr lang="pt-BR" sz="1400" u="none" strike="noStrike">
+                          <a:solidFill>
+                            <a:schemeClr val="tx1">
+                              <a:lumMod val="75000"/>
+                              <a:lumOff val="25000"/>
+                            </a:schemeClr>
+                          </a:solidFill>
+                          <a:effectLst/>
+                        </a:rPr>
+                        <a:t>40</a:t>
+                      </a:r>
+                      <a:endParaRPr lang="pt-BR" sz="1400" b="0" i="0" u="none" strike="noStrike">
+                        <a:solidFill>
+                          <a:schemeClr val="tx1">
+                            <a:lumMod val="75000"/>
+                            <a:lumOff val="25000"/>
+                          </a:schemeClr>
+                        </a:solidFill>
+                        <a:effectLst/>
+                        <a:latin typeface="Calibri" panose="020F0502020204030204" pitchFamily="34" charset="0"/>
+                      </a:endParaRPr>
+                    </a:p>
+                  </a:txBody>
+                  <a:tcPr marL="167721" marR="15913" marT="83860" marB="83860" anchor="b">
+                    <a:lnL w="9525" cap="flat" cmpd="sng" algn="ctr">
+                      <a:solidFill>
+                        <a:srgbClr val="D8DCDC"/>
+                      </a:solidFill>
+                      <a:prstDash val="solid"/>
+                    </a:lnL>
+                    <a:lnR w="9525" cap="flat" cmpd="sng" algn="ctr">
+                      <a:solidFill>
+                        <a:srgbClr val="D8DCDC"/>
+                      </a:solidFill>
+                      <a:prstDash val="solid"/>
+                    </a:lnR>
+                    <a:lnT w="9525" cap="flat" cmpd="sng" algn="ctr">
+                      <a:solidFill>
+                        <a:srgbClr val="D8DCDC"/>
+                      </a:solidFill>
+                      <a:prstDash val="solid"/>
+                    </a:lnT>
+                    <a:lnB w="9525" cap="flat" cmpd="sng" algn="ctr">
+                      <a:solidFill>
+                        <a:srgbClr val="D8DCDC"/>
+                      </a:solidFill>
+                      <a:prstDash val="solid"/>
+                    </a:lnB>
+                    <a:solidFill>
+                      <a:srgbClr val="D8DEDC">
+                        <a:alpha val="20000"/>
+                      </a:srgbClr>
+                    </a:solidFill>
+                  </a:tcPr>
+                </a:tc>
+                <a:tc>
+                  <a:txBody>
+                    <a:bodyPr/>
+                    <a:lstStyle/>
+                    <a:p>
+                      <a:pPr algn="ctr" fontAlgn="b"/>
+                      <a:r>
+                        <a:rPr lang="pt-BR" sz="1400" u="none" strike="noStrike">
+                          <a:solidFill>
+                            <a:schemeClr val="tx1">
+                              <a:lumMod val="75000"/>
+                              <a:lumOff val="25000"/>
+                            </a:schemeClr>
+                          </a:solidFill>
+                          <a:effectLst/>
+                        </a:rPr>
+                        <a:t>82,5%</a:t>
+                      </a:r>
+                      <a:endParaRPr lang="pt-BR" sz="1400" b="0" i="0" u="none" strike="noStrike">
+                        <a:solidFill>
+                          <a:schemeClr val="tx1">
+                            <a:lumMod val="75000"/>
+                            <a:lumOff val="25000"/>
+                          </a:schemeClr>
+                        </a:solidFill>
+                        <a:effectLst/>
+                        <a:latin typeface="Calibri" panose="020F0502020204030204" pitchFamily="34" charset="0"/>
+                      </a:endParaRPr>
+                    </a:p>
+                  </a:txBody>
+                  <a:tcPr marL="167721" marR="15913" marT="83860" marB="83860" anchor="b">
+                    <a:lnL w="9525" cap="flat" cmpd="sng" algn="ctr">
+                      <a:solidFill>
+                        <a:srgbClr val="D8DCDC"/>
+                      </a:solidFill>
+                      <a:prstDash val="solid"/>
+                    </a:lnL>
+                    <a:lnR w="9525" cap="flat" cmpd="sng" algn="ctr">
+                      <a:solidFill>
+                        <a:srgbClr val="D8DCDC"/>
+                      </a:solidFill>
+                      <a:prstDash val="solid"/>
+                    </a:lnR>
+                    <a:lnT w="9525" cap="flat" cmpd="sng" algn="ctr">
+                      <a:solidFill>
+                        <a:srgbClr val="D8DCDC"/>
+                      </a:solidFill>
+                      <a:prstDash val="solid"/>
+                    </a:lnT>
+                    <a:lnB w="9525" cap="flat" cmpd="sng" algn="ctr">
+                      <a:solidFill>
+                        <a:srgbClr val="D8DCDC"/>
+                      </a:solidFill>
+                      <a:prstDash val="solid"/>
+                    </a:lnB>
+                    <a:solidFill>
+                      <a:srgbClr val="D8DEDC">
+                        <a:alpha val="20000"/>
+                      </a:srgbClr>
+                    </a:solidFill>
+                  </a:tcPr>
+                </a:tc>
+                <a:tc>
+                  <a:txBody>
+                    <a:bodyPr/>
+                    <a:lstStyle/>
+                    <a:p>
+                      <a:pPr algn="ctr" fontAlgn="b"/>
+                      <a:r>
+                        <a:rPr lang="pt-BR" sz="1400" u="none" strike="noStrike">
+                          <a:solidFill>
+                            <a:schemeClr val="tx1">
+                              <a:lumMod val="75000"/>
+                              <a:lumOff val="25000"/>
+                            </a:schemeClr>
+                          </a:solidFill>
+                          <a:effectLst/>
+                        </a:rPr>
+                        <a:t>77,5%</a:t>
+                      </a:r>
+                      <a:endParaRPr lang="pt-BR" sz="1400" b="0" i="0" u="none" strike="noStrike">
+                        <a:solidFill>
+                          <a:schemeClr val="tx1">
+                            <a:lumMod val="75000"/>
+                            <a:lumOff val="25000"/>
+                          </a:schemeClr>
+                        </a:solidFill>
+                        <a:effectLst/>
+                        <a:latin typeface="Calibri" panose="020F0502020204030204" pitchFamily="34" charset="0"/>
+                      </a:endParaRPr>
+                    </a:p>
+                  </a:txBody>
+                  <a:tcPr marL="167721" marR="15913" marT="83860" marB="83860" anchor="b">
+                    <a:lnL w="9525" cap="flat" cmpd="sng" algn="ctr">
+                      <a:solidFill>
+                        <a:srgbClr val="D8DCDC"/>
+                      </a:solidFill>
+                      <a:prstDash val="solid"/>
+                    </a:lnL>
+                    <a:lnR w="9525" cap="flat" cmpd="sng" algn="ctr">
+                      <a:solidFill>
+                        <a:srgbClr val="D8DCDC"/>
+                      </a:solidFill>
+                      <a:prstDash val="solid"/>
+                    </a:lnR>
+                    <a:lnT w="9525" cap="flat" cmpd="sng" algn="ctr">
+                      <a:solidFill>
+                        <a:srgbClr val="D8DCDC"/>
+                      </a:solidFill>
+                      <a:prstDash val="solid"/>
+                    </a:lnT>
+                    <a:lnB w="9525" cap="flat" cmpd="sng" algn="ctr">
+                      <a:solidFill>
+                        <a:srgbClr val="D8DCDC"/>
+                      </a:solidFill>
+                      <a:prstDash val="solid"/>
+                    </a:lnB>
+                    <a:solidFill>
+                      <a:srgbClr val="D8DEDC">
+                        <a:alpha val="20000"/>
+                      </a:srgbClr>
+                    </a:solidFill>
+                  </a:tcPr>
+                </a:tc>
+                <a:tc>
+                  <a:txBody>
+                    <a:bodyPr/>
+                    <a:lstStyle/>
+                    <a:p>
+                      <a:pPr algn="ctr" fontAlgn="b"/>
+                      <a:r>
+                        <a:rPr lang="pt-BR" sz="1400" u="none" strike="noStrike">
+                          <a:solidFill>
+                            <a:schemeClr val="tx1">
+                              <a:lumMod val="75000"/>
+                              <a:lumOff val="25000"/>
+                            </a:schemeClr>
+                          </a:solidFill>
+                          <a:effectLst/>
+                        </a:rPr>
+                        <a:t>80,0%</a:t>
+                      </a:r>
+                      <a:endParaRPr lang="pt-BR" sz="1400" b="0" i="0" u="none" strike="noStrike">
+                        <a:solidFill>
+                          <a:schemeClr val="tx1">
+                            <a:lumMod val="75000"/>
+                            <a:lumOff val="25000"/>
+                          </a:schemeClr>
+                        </a:solidFill>
+                        <a:effectLst/>
+                        <a:latin typeface="Calibri" panose="020F0502020204030204" pitchFamily="34" charset="0"/>
+                      </a:endParaRPr>
+                    </a:p>
+                  </a:txBody>
+                  <a:tcPr marL="167721" marR="15913" marT="83860" marB="83860" anchor="b">
+                    <a:lnL w="9525" cap="flat" cmpd="sng" algn="ctr">
+                      <a:solidFill>
+                        <a:srgbClr val="D8DCDC"/>
+                      </a:solidFill>
+                      <a:prstDash val="solid"/>
+                    </a:lnL>
+                    <a:lnR w="9525" cap="flat" cmpd="sng" algn="ctr">
+                      <a:solidFill>
+                        <a:srgbClr val="D8DCDC"/>
+                      </a:solidFill>
+                      <a:prstDash val="solid"/>
+                    </a:lnR>
+                    <a:lnT w="9525" cap="flat" cmpd="sng" algn="ctr">
+                      <a:solidFill>
+                        <a:srgbClr val="D8DCDC"/>
+                      </a:solidFill>
+                      <a:prstDash val="solid"/>
+                    </a:lnT>
+                    <a:lnB w="9525" cap="flat" cmpd="sng" algn="ctr">
+                      <a:solidFill>
+                        <a:srgbClr val="D8DCDC"/>
+                      </a:solidFill>
+                      <a:prstDash val="solid"/>
+                    </a:lnB>
+                    <a:solidFill>
+                      <a:srgbClr val="D8DEDC">
+                        <a:alpha val="20000"/>
+                      </a:srgbClr>
+                    </a:solidFill>
+                  </a:tcPr>
+                </a:tc>
+                <a:extLst>
+                  <a:ext uri="{0D108BD9-81ED-4DB2-BD59-A6C34878D82A}">
+                    <a16:rowId xmlns:a16="http://schemas.microsoft.com/office/drawing/2014/main" val="1736167928"/>
+                  </a:ext>
+                </a:extLst>
+              </a:tr>
+              <a:tr h="410916">
+                <a:tc>
+                  <a:txBody>
+                    <a:bodyPr/>
+                    <a:lstStyle/>
+                    <a:p>
+                      <a:pPr algn="ctr" fontAlgn="b"/>
+                      <a:r>
+                        <a:rPr lang="pt-BR" sz="1400" u="none" strike="noStrike">
+                          <a:solidFill>
+                            <a:schemeClr val="tx1">
+                              <a:lumMod val="75000"/>
+                              <a:lumOff val="25000"/>
+                            </a:schemeClr>
+                          </a:solidFill>
+                          <a:effectLst/>
+                        </a:rPr>
+                        <a:t>320</a:t>
+                      </a:r>
+                      <a:endParaRPr lang="pt-BR" sz="1400" b="0" i="0" u="none" strike="noStrike">
+                        <a:solidFill>
+                          <a:schemeClr val="tx1">
+                            <a:lumMod val="75000"/>
+                            <a:lumOff val="25000"/>
+                          </a:schemeClr>
+                        </a:solidFill>
+                        <a:effectLst/>
+                        <a:latin typeface="Calibri" panose="020F0502020204030204" pitchFamily="34" charset="0"/>
+                      </a:endParaRPr>
+                    </a:p>
+                  </a:txBody>
+                  <a:tcPr marL="167721" marR="15913" marT="83860" marB="83860" anchor="b">
+                    <a:lnL w="9525" cap="flat" cmpd="sng" algn="ctr">
+                      <a:solidFill>
+                        <a:srgbClr val="D8DEDC"/>
+                      </a:solidFill>
+                      <a:prstDash val="solid"/>
+                    </a:lnL>
+                    <a:lnR w="9525" cap="flat" cmpd="sng" algn="ctr">
+                      <a:solidFill>
+                        <a:srgbClr val="D8DEDC"/>
+                      </a:solidFill>
+                      <a:prstDash val="solid"/>
+                    </a:lnR>
+                    <a:lnT w="9525" cap="flat" cmpd="sng" algn="ctr">
+                      <a:solidFill>
+                        <a:srgbClr val="D8DCDC"/>
+                      </a:solidFill>
+                      <a:prstDash val="solid"/>
+                    </a:lnT>
+                    <a:lnB w="9525" cap="flat" cmpd="sng" algn="ctr">
+                      <a:solidFill>
+                        <a:srgbClr val="D8DCDC"/>
+                      </a:solidFill>
+                      <a:prstDash val="solid"/>
+                    </a:lnB>
+                    <a:noFill/>
+                  </a:tcPr>
+                </a:tc>
+                <a:tc>
+                  <a:txBody>
+                    <a:bodyPr/>
+                    <a:lstStyle/>
+                    <a:p>
+                      <a:pPr algn="ctr" fontAlgn="b"/>
+                      <a:r>
+                        <a:rPr lang="pt-BR" sz="1400" u="none" strike="noStrike">
+                          <a:solidFill>
+                            <a:schemeClr val="tx1">
+                              <a:lumMod val="75000"/>
+                              <a:lumOff val="25000"/>
+                            </a:schemeClr>
+                          </a:solidFill>
+                          <a:effectLst/>
+                        </a:rPr>
+                        <a:t>40</a:t>
+                      </a:r>
+                      <a:endParaRPr lang="pt-BR" sz="1400" b="0" i="0" u="none" strike="noStrike">
+                        <a:solidFill>
+                          <a:schemeClr val="tx1">
+                            <a:lumMod val="75000"/>
+                            <a:lumOff val="25000"/>
+                          </a:schemeClr>
+                        </a:solidFill>
+                        <a:effectLst/>
+                        <a:latin typeface="Calibri" panose="020F0502020204030204" pitchFamily="34" charset="0"/>
+                      </a:endParaRPr>
+                    </a:p>
+                  </a:txBody>
+                  <a:tcPr marL="167721" marR="15913" marT="83860" marB="83860" anchor="b">
+                    <a:lnL w="9525" cap="flat" cmpd="sng" algn="ctr">
+                      <a:solidFill>
+                        <a:srgbClr val="D8DEDC"/>
+                      </a:solidFill>
+                      <a:prstDash val="solid"/>
+                    </a:lnL>
+                    <a:lnR w="9525" cap="flat" cmpd="sng" algn="ctr">
+                      <a:solidFill>
+                        <a:srgbClr val="D8DEDC"/>
+                      </a:solidFill>
+                      <a:prstDash val="solid"/>
+                    </a:lnR>
+                    <a:lnT w="9525" cap="flat" cmpd="sng" algn="ctr">
+                      <a:solidFill>
+                        <a:srgbClr val="D8DCDC"/>
+                      </a:solidFill>
+                      <a:prstDash val="solid"/>
+                    </a:lnT>
+                    <a:lnB w="9525" cap="flat" cmpd="sng" algn="ctr">
+                      <a:solidFill>
+                        <a:srgbClr val="D8DCDC"/>
+                      </a:solidFill>
+                      <a:prstDash val="solid"/>
+                    </a:lnB>
+                    <a:noFill/>
+                  </a:tcPr>
+                </a:tc>
+                <a:tc>
+                  <a:txBody>
+                    <a:bodyPr/>
+                    <a:lstStyle/>
+                    <a:p>
+                      <a:pPr algn="ctr" fontAlgn="b"/>
+                      <a:r>
+                        <a:rPr lang="pt-BR" sz="1400" u="none" strike="noStrike">
+                          <a:solidFill>
+                            <a:schemeClr val="tx1">
+                              <a:lumMod val="75000"/>
+                              <a:lumOff val="25000"/>
+                            </a:schemeClr>
+                          </a:solidFill>
+                          <a:effectLst/>
+                        </a:rPr>
+                        <a:t>90,0%</a:t>
+                      </a:r>
+                      <a:endParaRPr lang="pt-BR" sz="1400" b="0" i="0" u="none" strike="noStrike">
+                        <a:solidFill>
+                          <a:schemeClr val="tx1">
+                            <a:lumMod val="75000"/>
+                            <a:lumOff val="25000"/>
+                          </a:schemeClr>
+                        </a:solidFill>
+                        <a:effectLst/>
+                        <a:latin typeface="Calibri" panose="020F0502020204030204" pitchFamily="34" charset="0"/>
+                      </a:endParaRPr>
+                    </a:p>
+                  </a:txBody>
+                  <a:tcPr marL="167721" marR="15913" marT="83860" marB="83860" anchor="b">
+                    <a:lnL w="9525" cap="flat" cmpd="sng" algn="ctr">
+                      <a:solidFill>
+                        <a:srgbClr val="D8DEDC"/>
+                      </a:solidFill>
+                      <a:prstDash val="solid"/>
+                    </a:lnL>
+                    <a:lnR w="9525" cap="flat" cmpd="sng" algn="ctr">
+                      <a:solidFill>
+                        <a:srgbClr val="D8DEDC"/>
+                      </a:solidFill>
+                      <a:prstDash val="solid"/>
+                    </a:lnR>
+                    <a:lnT w="9525" cap="flat" cmpd="sng" algn="ctr">
+                      <a:solidFill>
+                        <a:srgbClr val="D8DCDC"/>
+                      </a:solidFill>
+                      <a:prstDash val="solid"/>
+                    </a:lnT>
+                    <a:lnB w="9525" cap="flat" cmpd="sng" algn="ctr">
+                      <a:solidFill>
+                        <a:srgbClr val="D8DCDC"/>
+                      </a:solidFill>
+                      <a:prstDash val="solid"/>
+                    </a:lnB>
+                    <a:noFill/>
+                  </a:tcPr>
+                </a:tc>
+                <a:tc>
+                  <a:txBody>
+                    <a:bodyPr/>
+                    <a:lstStyle/>
+                    <a:p>
+                      <a:pPr algn="ctr" fontAlgn="b"/>
+                      <a:r>
+                        <a:rPr lang="pt-BR" sz="1400" u="none" strike="noStrike">
+                          <a:solidFill>
+                            <a:schemeClr val="tx1">
+                              <a:lumMod val="75000"/>
+                              <a:lumOff val="25000"/>
+                            </a:schemeClr>
+                          </a:solidFill>
+                          <a:effectLst/>
+                        </a:rPr>
+                        <a:t>92,5%</a:t>
+                      </a:r>
+                      <a:endParaRPr lang="pt-BR" sz="1400" b="0" i="0" u="none" strike="noStrike">
+                        <a:solidFill>
+                          <a:schemeClr val="tx1">
+                            <a:lumMod val="75000"/>
+                            <a:lumOff val="25000"/>
+                          </a:schemeClr>
+                        </a:solidFill>
+                        <a:effectLst/>
+                        <a:latin typeface="Calibri" panose="020F0502020204030204" pitchFamily="34" charset="0"/>
+                      </a:endParaRPr>
+                    </a:p>
+                  </a:txBody>
+                  <a:tcPr marL="167721" marR="15913" marT="83860" marB="83860" anchor="b">
+                    <a:lnL w="9525" cap="flat" cmpd="sng" algn="ctr">
+                      <a:solidFill>
+                        <a:srgbClr val="D8DEDC"/>
+                      </a:solidFill>
+                      <a:prstDash val="solid"/>
+                    </a:lnL>
+                    <a:lnR w="9525" cap="flat" cmpd="sng" algn="ctr">
+                      <a:solidFill>
+                        <a:srgbClr val="D8DEDC"/>
+                      </a:solidFill>
+                      <a:prstDash val="solid"/>
+                    </a:lnR>
+                    <a:lnT w="9525" cap="flat" cmpd="sng" algn="ctr">
+                      <a:solidFill>
+                        <a:srgbClr val="D8DCDC"/>
+                      </a:solidFill>
+                      <a:prstDash val="solid"/>
+                    </a:lnT>
+                    <a:lnB w="9525" cap="flat" cmpd="sng" algn="ctr">
+                      <a:solidFill>
+                        <a:srgbClr val="D8DCDC"/>
+                      </a:solidFill>
+                      <a:prstDash val="solid"/>
+                    </a:lnB>
+                    <a:noFill/>
+                  </a:tcPr>
+                </a:tc>
+                <a:tc>
+                  <a:txBody>
+                    <a:bodyPr/>
+                    <a:lstStyle/>
+                    <a:p>
+                      <a:pPr algn="ctr" fontAlgn="b"/>
+                      <a:r>
+                        <a:rPr lang="pt-BR" sz="1400" u="none" strike="noStrike">
+                          <a:solidFill>
+                            <a:schemeClr val="tx1">
+                              <a:lumMod val="75000"/>
+                              <a:lumOff val="25000"/>
+                            </a:schemeClr>
+                          </a:solidFill>
+                          <a:effectLst/>
+                        </a:rPr>
+                        <a:t>90,0%</a:t>
+                      </a:r>
+                      <a:endParaRPr lang="pt-BR" sz="1400" b="0" i="0" u="none" strike="noStrike">
+                        <a:solidFill>
+                          <a:schemeClr val="tx1">
+                            <a:lumMod val="75000"/>
+                            <a:lumOff val="25000"/>
+                          </a:schemeClr>
+                        </a:solidFill>
+                        <a:effectLst/>
+                        <a:latin typeface="Calibri" panose="020F0502020204030204" pitchFamily="34" charset="0"/>
+                      </a:endParaRPr>
+                    </a:p>
+                  </a:txBody>
+                  <a:tcPr marL="167721" marR="15913" marT="83860" marB="83860" anchor="b">
+                    <a:lnL w="9525" cap="flat" cmpd="sng" algn="ctr">
+                      <a:solidFill>
+                        <a:srgbClr val="D8DEDC"/>
+                      </a:solidFill>
+                      <a:prstDash val="solid"/>
+                    </a:lnL>
+                    <a:lnR w="9525" cap="flat" cmpd="sng" algn="ctr">
+                      <a:solidFill>
+                        <a:srgbClr val="D8DEDC"/>
+                      </a:solidFill>
+                      <a:prstDash val="solid"/>
+                    </a:lnR>
+                    <a:lnT w="9525" cap="flat" cmpd="sng" algn="ctr">
+                      <a:solidFill>
+                        <a:srgbClr val="D8DCDC"/>
+                      </a:solidFill>
+                      <a:prstDash val="solid"/>
+                    </a:lnT>
+                    <a:lnB w="9525" cap="flat" cmpd="sng" algn="ctr">
+                      <a:solidFill>
+                        <a:srgbClr val="D8DCDC"/>
+                      </a:solidFill>
+                      <a:prstDash val="solid"/>
+                    </a:lnB>
+                    <a:noFill/>
+                  </a:tcPr>
+                </a:tc>
+                <a:extLst>
+                  <a:ext uri="{0D108BD9-81ED-4DB2-BD59-A6C34878D82A}">
+                    <a16:rowId xmlns:a16="http://schemas.microsoft.com/office/drawing/2014/main" val="733849135"/>
+                  </a:ext>
+                </a:extLst>
+              </a:tr>
+              <a:tr h="410916">
+                <a:tc>
+                  <a:txBody>
+                    <a:bodyPr/>
+                    <a:lstStyle/>
+                    <a:p>
+                      <a:pPr algn="ctr" fontAlgn="b"/>
+                      <a:r>
+                        <a:rPr lang="pt-BR" sz="1400" u="none" strike="noStrike">
+                          <a:solidFill>
+                            <a:schemeClr val="tx1">
+                              <a:lumMod val="75000"/>
+                              <a:lumOff val="25000"/>
+                            </a:schemeClr>
+                          </a:solidFill>
+                          <a:effectLst/>
+                        </a:rPr>
+                        <a:t>360</a:t>
+                      </a:r>
+                      <a:endParaRPr lang="pt-BR" sz="1400" b="0" i="0" u="none" strike="noStrike">
+                        <a:solidFill>
+                          <a:schemeClr val="tx1">
+                            <a:lumMod val="75000"/>
+                            <a:lumOff val="25000"/>
+                          </a:schemeClr>
+                        </a:solidFill>
+                        <a:effectLst/>
+                        <a:latin typeface="Calibri" panose="020F0502020204030204" pitchFamily="34" charset="0"/>
+                      </a:endParaRPr>
+                    </a:p>
+                  </a:txBody>
+                  <a:tcPr marL="167721" marR="15913" marT="83860" marB="83860" anchor="b">
+                    <a:lnL w="9525" cap="flat" cmpd="sng" algn="ctr">
+                      <a:solidFill>
+                        <a:srgbClr val="D8DCDC"/>
+                      </a:solidFill>
+                      <a:prstDash val="solid"/>
+                    </a:lnL>
+                    <a:lnR w="9525" cap="flat" cmpd="sng" algn="ctr">
+                      <a:solidFill>
+                        <a:srgbClr val="D8DCDC"/>
+                      </a:solidFill>
+                      <a:prstDash val="solid"/>
+                    </a:lnR>
+                    <a:lnT w="9525" cap="flat" cmpd="sng" algn="ctr">
+                      <a:solidFill>
+                        <a:srgbClr val="D8DCDC"/>
+                      </a:solidFill>
+                      <a:prstDash val="solid"/>
+                    </a:lnT>
+                    <a:lnB w="9525" cap="flat" cmpd="sng" algn="ctr">
+                      <a:solidFill>
+                        <a:srgbClr val="D8DCDC"/>
+                      </a:solidFill>
+                      <a:prstDash val="solid"/>
+                    </a:lnB>
+                    <a:solidFill>
+                      <a:srgbClr val="D8DEDC">
+                        <a:alpha val="20000"/>
+                      </a:srgbClr>
+                    </a:solidFill>
+                  </a:tcPr>
+                </a:tc>
+                <a:tc>
+                  <a:txBody>
+                    <a:bodyPr/>
+                    <a:lstStyle/>
+                    <a:p>
+                      <a:pPr algn="ctr" fontAlgn="b"/>
+                      <a:r>
+                        <a:rPr lang="pt-BR" sz="1400" u="none" strike="noStrike">
+                          <a:solidFill>
+                            <a:schemeClr val="tx1">
+                              <a:lumMod val="75000"/>
+                              <a:lumOff val="25000"/>
+                            </a:schemeClr>
+                          </a:solidFill>
+                          <a:effectLst/>
+                        </a:rPr>
+                        <a:t>40</a:t>
+                      </a:r>
+                      <a:endParaRPr lang="pt-BR" sz="1400" b="0" i="0" u="none" strike="noStrike">
+                        <a:solidFill>
+                          <a:schemeClr val="tx1">
+                            <a:lumMod val="75000"/>
+                            <a:lumOff val="25000"/>
+                          </a:schemeClr>
+                        </a:solidFill>
+                        <a:effectLst/>
+                        <a:latin typeface="Calibri" panose="020F0502020204030204" pitchFamily="34" charset="0"/>
+                      </a:endParaRPr>
+                    </a:p>
+                  </a:txBody>
+                  <a:tcPr marL="167721" marR="15913" marT="83860" marB="83860" anchor="b">
+                    <a:lnL w="9525" cap="flat" cmpd="sng" algn="ctr">
+                      <a:solidFill>
+                        <a:srgbClr val="D8DCDC"/>
+                      </a:solidFill>
+                      <a:prstDash val="solid"/>
+                    </a:lnL>
+                    <a:lnR w="9525" cap="flat" cmpd="sng" algn="ctr">
+                      <a:solidFill>
+                        <a:srgbClr val="D8DCDC"/>
+                      </a:solidFill>
+                      <a:prstDash val="solid"/>
+                    </a:lnR>
+                    <a:lnT w="9525" cap="flat" cmpd="sng" algn="ctr">
+                      <a:solidFill>
+                        <a:srgbClr val="D8DCDC"/>
+                      </a:solidFill>
+                      <a:prstDash val="solid"/>
+                    </a:lnT>
+                    <a:lnB w="9525" cap="flat" cmpd="sng" algn="ctr">
+                      <a:solidFill>
+                        <a:srgbClr val="D8DCDC"/>
+                      </a:solidFill>
+                      <a:prstDash val="solid"/>
+                    </a:lnB>
+                    <a:solidFill>
+                      <a:srgbClr val="D8DEDC">
+                        <a:alpha val="20000"/>
+                      </a:srgbClr>
+                    </a:solidFill>
+                  </a:tcPr>
+                </a:tc>
+                <a:tc>
+                  <a:txBody>
+                    <a:bodyPr/>
+                    <a:lstStyle/>
+                    <a:p>
+                      <a:pPr algn="ctr" fontAlgn="b"/>
+                      <a:r>
+                        <a:rPr lang="pt-BR" sz="1400" u="none" strike="noStrike">
+                          <a:solidFill>
+                            <a:schemeClr val="tx1">
+                              <a:lumMod val="75000"/>
+                              <a:lumOff val="25000"/>
+                            </a:schemeClr>
+                          </a:solidFill>
+                          <a:effectLst/>
+                        </a:rPr>
+                        <a:t>85,0%</a:t>
+                      </a:r>
+                      <a:endParaRPr lang="pt-BR" sz="1400" b="0" i="0" u="none" strike="noStrike">
+                        <a:solidFill>
+                          <a:schemeClr val="tx1">
+                            <a:lumMod val="75000"/>
+                            <a:lumOff val="25000"/>
+                          </a:schemeClr>
+                        </a:solidFill>
+                        <a:effectLst/>
+                        <a:latin typeface="Calibri" panose="020F0502020204030204" pitchFamily="34" charset="0"/>
+                      </a:endParaRPr>
+                    </a:p>
+                  </a:txBody>
+                  <a:tcPr marL="167721" marR="15913" marT="83860" marB="83860" anchor="b">
+                    <a:lnL w="9525" cap="flat" cmpd="sng" algn="ctr">
+                      <a:solidFill>
+                        <a:srgbClr val="D8DCDC"/>
+                      </a:solidFill>
+                      <a:prstDash val="solid"/>
+                    </a:lnL>
+                    <a:lnR w="9525" cap="flat" cmpd="sng" algn="ctr">
+                      <a:solidFill>
+                        <a:srgbClr val="D8DCDC"/>
+                      </a:solidFill>
+                      <a:prstDash val="solid"/>
+                    </a:lnR>
+                    <a:lnT w="9525" cap="flat" cmpd="sng" algn="ctr">
+                      <a:solidFill>
+                        <a:srgbClr val="D8DCDC"/>
+                      </a:solidFill>
+                      <a:prstDash val="solid"/>
+                    </a:lnT>
+                    <a:lnB w="9525" cap="flat" cmpd="sng" algn="ctr">
+                      <a:solidFill>
+                        <a:srgbClr val="D8DCDC"/>
+                      </a:solidFill>
+                      <a:prstDash val="solid"/>
+                    </a:lnB>
+                    <a:solidFill>
+                      <a:srgbClr val="D8DEDC">
+                        <a:alpha val="20000"/>
+                      </a:srgbClr>
+                    </a:solidFill>
+                  </a:tcPr>
+                </a:tc>
+                <a:tc>
+                  <a:txBody>
+                    <a:bodyPr/>
+                    <a:lstStyle/>
+                    <a:p>
+                      <a:pPr algn="ctr" fontAlgn="b"/>
+                      <a:r>
+                        <a:rPr lang="pt-BR" sz="1400" u="none" strike="noStrike">
+                          <a:solidFill>
+                            <a:schemeClr val="tx1">
+                              <a:lumMod val="75000"/>
+                              <a:lumOff val="25000"/>
+                            </a:schemeClr>
+                          </a:solidFill>
+                          <a:effectLst/>
+                        </a:rPr>
+                        <a:t>87,5%</a:t>
+                      </a:r>
+                      <a:endParaRPr lang="pt-BR" sz="1400" b="0" i="0" u="none" strike="noStrike">
+                        <a:solidFill>
+                          <a:schemeClr val="tx1">
+                            <a:lumMod val="75000"/>
+                            <a:lumOff val="25000"/>
+                          </a:schemeClr>
+                        </a:solidFill>
+                        <a:effectLst/>
+                        <a:latin typeface="Calibri" panose="020F0502020204030204" pitchFamily="34" charset="0"/>
+                      </a:endParaRPr>
+                    </a:p>
+                  </a:txBody>
+                  <a:tcPr marL="167721" marR="15913" marT="83860" marB="83860" anchor="b">
+                    <a:lnL w="9525" cap="flat" cmpd="sng" algn="ctr">
+                      <a:solidFill>
+                        <a:srgbClr val="D8DCDC"/>
+                      </a:solidFill>
+                      <a:prstDash val="solid"/>
+                    </a:lnL>
+                    <a:lnR w="9525" cap="flat" cmpd="sng" algn="ctr">
+                      <a:solidFill>
+                        <a:srgbClr val="D8DCDC"/>
+                      </a:solidFill>
+                      <a:prstDash val="solid"/>
+                    </a:lnR>
+                    <a:lnT w="9525" cap="flat" cmpd="sng" algn="ctr">
+                      <a:solidFill>
+                        <a:srgbClr val="D8DCDC"/>
+                      </a:solidFill>
+                      <a:prstDash val="solid"/>
+                    </a:lnT>
+                    <a:lnB w="9525" cap="flat" cmpd="sng" algn="ctr">
+                      <a:solidFill>
+                        <a:srgbClr val="D8DCDC"/>
+                      </a:solidFill>
+                      <a:prstDash val="solid"/>
+                    </a:lnB>
+                    <a:solidFill>
+                      <a:srgbClr val="D8DEDC">
+                        <a:alpha val="20000"/>
+                      </a:srgbClr>
+                    </a:solidFill>
+                  </a:tcPr>
+                </a:tc>
+                <a:tc>
+                  <a:txBody>
+                    <a:bodyPr/>
+                    <a:lstStyle/>
+                    <a:p>
+                      <a:pPr algn="ctr" fontAlgn="b"/>
+                      <a:r>
+                        <a:rPr lang="pt-BR" sz="1400" u="none" strike="noStrike">
+                          <a:solidFill>
+                            <a:schemeClr val="tx1">
+                              <a:lumMod val="75000"/>
+                              <a:lumOff val="25000"/>
+                            </a:schemeClr>
+                          </a:solidFill>
+                          <a:effectLst/>
+                        </a:rPr>
+                        <a:t>85,0%</a:t>
+                      </a:r>
+                      <a:endParaRPr lang="pt-BR" sz="1400" b="0" i="0" u="none" strike="noStrike">
+                        <a:solidFill>
+                          <a:schemeClr val="tx1">
+                            <a:lumMod val="75000"/>
+                            <a:lumOff val="25000"/>
+                          </a:schemeClr>
+                        </a:solidFill>
+                        <a:effectLst/>
+                        <a:latin typeface="Calibri" panose="020F0502020204030204" pitchFamily="34" charset="0"/>
+                      </a:endParaRPr>
+                    </a:p>
+                  </a:txBody>
+                  <a:tcPr marL="167721" marR="15913" marT="83860" marB="83860" anchor="b">
+                    <a:lnL w="9525" cap="flat" cmpd="sng" algn="ctr">
+                      <a:solidFill>
+                        <a:srgbClr val="D8DCDC"/>
+                      </a:solidFill>
+                      <a:prstDash val="solid"/>
+                    </a:lnL>
+                    <a:lnR w="9525" cap="flat" cmpd="sng" algn="ctr">
+                      <a:solidFill>
+                        <a:srgbClr val="D8DCDC"/>
+                      </a:solidFill>
+                      <a:prstDash val="solid"/>
+                    </a:lnR>
+                    <a:lnT w="9525" cap="flat" cmpd="sng" algn="ctr">
+                      <a:solidFill>
+                        <a:srgbClr val="D8DCDC"/>
+                      </a:solidFill>
+                      <a:prstDash val="solid"/>
+                    </a:lnT>
+                    <a:lnB w="9525" cap="flat" cmpd="sng" algn="ctr">
+                      <a:solidFill>
+                        <a:srgbClr val="D8DCDC"/>
+                      </a:solidFill>
+                      <a:prstDash val="solid"/>
+                    </a:lnB>
+                    <a:solidFill>
+                      <a:srgbClr val="D8DEDC">
+                        <a:alpha val="20000"/>
+                      </a:srgbClr>
+                    </a:solidFill>
+                  </a:tcPr>
+                </a:tc>
+                <a:extLst>
+                  <a:ext uri="{0D108BD9-81ED-4DB2-BD59-A6C34878D82A}">
+                    <a16:rowId xmlns:a16="http://schemas.microsoft.com/office/drawing/2014/main" val="413770654"/>
+                  </a:ext>
+                </a:extLst>
+              </a:tr>
+              <a:tr h="410916">
+                <a:tc>
+                  <a:txBody>
+                    <a:bodyPr/>
+                    <a:lstStyle/>
+                    <a:p>
+                      <a:pPr algn="ctr" fontAlgn="b"/>
+                      <a:r>
+                        <a:rPr lang="pt-BR" sz="1400" u="none" strike="noStrike">
+                          <a:solidFill>
+                            <a:schemeClr val="tx1">
+                              <a:lumMod val="75000"/>
+                              <a:lumOff val="25000"/>
+                            </a:schemeClr>
+                          </a:solidFill>
+                          <a:effectLst/>
+                        </a:rPr>
+                        <a:t>400</a:t>
+                      </a:r>
+                      <a:endParaRPr lang="pt-BR" sz="1400" b="0" i="0" u="none" strike="noStrike">
+                        <a:solidFill>
+                          <a:schemeClr val="tx1">
+                            <a:lumMod val="75000"/>
+                            <a:lumOff val="25000"/>
+                          </a:schemeClr>
+                        </a:solidFill>
+                        <a:effectLst/>
+                        <a:latin typeface="Calibri" panose="020F0502020204030204" pitchFamily="34" charset="0"/>
+                      </a:endParaRPr>
+                    </a:p>
+                  </a:txBody>
+                  <a:tcPr marL="167721" marR="15913" marT="83860" marB="83860" anchor="b">
+                    <a:lnL w="9525" cap="flat" cmpd="sng" algn="ctr">
+                      <a:solidFill>
+                        <a:srgbClr val="D8DEDC"/>
+                      </a:solidFill>
+                      <a:prstDash val="solid"/>
+                    </a:lnL>
+                    <a:lnR w="9525" cap="flat" cmpd="sng" algn="ctr">
+                      <a:solidFill>
+                        <a:srgbClr val="D8DEDC"/>
+                      </a:solidFill>
+                      <a:prstDash val="solid"/>
+                    </a:lnR>
+                    <a:lnT w="9525" cap="flat" cmpd="sng" algn="ctr">
+                      <a:solidFill>
+                        <a:srgbClr val="D8DCDC"/>
+                      </a:solidFill>
+                      <a:prstDash val="solid"/>
+                    </a:lnT>
+                    <a:lnB w="9525" cap="flat" cmpd="sng" algn="ctr">
+                      <a:solidFill>
+                        <a:srgbClr val="D8DCDC"/>
+                      </a:solidFill>
+                      <a:prstDash val="solid"/>
+                    </a:lnB>
+                    <a:noFill/>
+                  </a:tcPr>
+                </a:tc>
+                <a:tc>
+                  <a:txBody>
+                    <a:bodyPr/>
+                    <a:lstStyle/>
+                    <a:p>
+                      <a:pPr algn="ctr" fontAlgn="b"/>
+                      <a:r>
+                        <a:rPr lang="pt-BR" sz="1400" u="none" strike="noStrike">
+                          <a:solidFill>
+                            <a:schemeClr val="tx1">
+                              <a:lumMod val="75000"/>
+                              <a:lumOff val="25000"/>
+                            </a:schemeClr>
+                          </a:solidFill>
+                          <a:effectLst/>
+                        </a:rPr>
+                        <a:t>40</a:t>
+                      </a:r>
+                      <a:endParaRPr lang="pt-BR" sz="1400" b="0" i="0" u="none" strike="noStrike">
+                        <a:solidFill>
+                          <a:schemeClr val="tx1">
+                            <a:lumMod val="75000"/>
+                            <a:lumOff val="25000"/>
+                          </a:schemeClr>
+                        </a:solidFill>
+                        <a:effectLst/>
+                        <a:latin typeface="Calibri" panose="020F0502020204030204" pitchFamily="34" charset="0"/>
+                      </a:endParaRPr>
+                    </a:p>
+                  </a:txBody>
+                  <a:tcPr marL="167721" marR="15913" marT="83860" marB="83860" anchor="b">
+                    <a:lnL w="9525" cap="flat" cmpd="sng" algn="ctr">
+                      <a:solidFill>
+                        <a:srgbClr val="D8DEDC"/>
+                      </a:solidFill>
+                      <a:prstDash val="solid"/>
+                    </a:lnL>
+                    <a:lnR w="9525" cap="flat" cmpd="sng" algn="ctr">
+                      <a:solidFill>
+                        <a:srgbClr val="D8DEDC"/>
+                      </a:solidFill>
+                      <a:prstDash val="solid"/>
+                    </a:lnR>
+                    <a:lnT w="9525" cap="flat" cmpd="sng" algn="ctr">
+                      <a:solidFill>
+                        <a:srgbClr val="D8DCDC"/>
+                      </a:solidFill>
+                      <a:prstDash val="solid"/>
+                    </a:lnT>
+                    <a:lnB w="9525" cap="flat" cmpd="sng" algn="ctr">
+                      <a:solidFill>
+                        <a:srgbClr val="D8DCDC"/>
+                      </a:solidFill>
+                      <a:prstDash val="solid"/>
+                    </a:lnB>
+                    <a:noFill/>
+                  </a:tcPr>
+                </a:tc>
+                <a:tc>
+                  <a:txBody>
+                    <a:bodyPr/>
+                    <a:lstStyle/>
+                    <a:p>
+                      <a:pPr algn="ctr" fontAlgn="b"/>
+                      <a:r>
+                        <a:rPr lang="pt-BR" sz="1400" u="none" strike="noStrike">
+                          <a:solidFill>
+                            <a:schemeClr val="tx1">
+                              <a:lumMod val="75000"/>
+                              <a:lumOff val="25000"/>
+                            </a:schemeClr>
+                          </a:solidFill>
+                          <a:effectLst/>
+                        </a:rPr>
+                        <a:t>90,0%</a:t>
+                      </a:r>
+                      <a:endParaRPr lang="pt-BR" sz="1400" b="0" i="0" u="none" strike="noStrike">
+                        <a:solidFill>
+                          <a:schemeClr val="tx1">
+                            <a:lumMod val="75000"/>
+                            <a:lumOff val="25000"/>
+                          </a:schemeClr>
+                        </a:solidFill>
+                        <a:effectLst/>
+                        <a:latin typeface="Calibri" panose="020F0502020204030204" pitchFamily="34" charset="0"/>
+                      </a:endParaRPr>
+                    </a:p>
+                  </a:txBody>
+                  <a:tcPr marL="167721" marR="15913" marT="83860" marB="83860" anchor="b">
+                    <a:lnL w="9525" cap="flat" cmpd="sng" algn="ctr">
+                      <a:solidFill>
+                        <a:srgbClr val="D8DEDC"/>
+                      </a:solidFill>
+                      <a:prstDash val="solid"/>
+                    </a:lnL>
+                    <a:lnR w="9525" cap="flat" cmpd="sng" algn="ctr">
+                      <a:solidFill>
+                        <a:srgbClr val="D8DEDC"/>
+                      </a:solidFill>
+                      <a:prstDash val="solid"/>
+                    </a:lnR>
+                    <a:lnT w="9525" cap="flat" cmpd="sng" algn="ctr">
+                      <a:solidFill>
+                        <a:srgbClr val="D8DCDC"/>
+                      </a:solidFill>
+                      <a:prstDash val="solid"/>
+                    </a:lnT>
+                    <a:lnB w="9525" cap="flat" cmpd="sng" algn="ctr">
+                      <a:solidFill>
+                        <a:srgbClr val="D8DCDC"/>
+                      </a:solidFill>
+                      <a:prstDash val="solid"/>
+                    </a:lnB>
+                    <a:noFill/>
+                  </a:tcPr>
+                </a:tc>
+                <a:tc>
+                  <a:txBody>
+                    <a:bodyPr/>
+                    <a:lstStyle/>
+                    <a:p>
+                      <a:pPr algn="ctr" fontAlgn="b"/>
+                      <a:r>
+                        <a:rPr lang="pt-BR" sz="1400" u="none" strike="noStrike">
+                          <a:solidFill>
+                            <a:schemeClr val="tx1">
+                              <a:lumMod val="75000"/>
+                              <a:lumOff val="25000"/>
+                            </a:schemeClr>
+                          </a:solidFill>
+                          <a:effectLst/>
+                        </a:rPr>
+                        <a:t>90,0%</a:t>
+                      </a:r>
+                      <a:endParaRPr lang="pt-BR" sz="1400" b="0" i="0" u="none" strike="noStrike">
+                        <a:solidFill>
+                          <a:schemeClr val="tx1">
+                            <a:lumMod val="75000"/>
+                            <a:lumOff val="25000"/>
+                          </a:schemeClr>
+                        </a:solidFill>
+                        <a:effectLst/>
+                        <a:latin typeface="Calibri" panose="020F0502020204030204" pitchFamily="34" charset="0"/>
+                      </a:endParaRPr>
+                    </a:p>
+                  </a:txBody>
+                  <a:tcPr marL="167721" marR="15913" marT="83860" marB="83860" anchor="b">
+                    <a:lnL w="9525" cap="flat" cmpd="sng" algn="ctr">
+                      <a:solidFill>
+                        <a:srgbClr val="D8DEDC"/>
+                      </a:solidFill>
+                      <a:prstDash val="solid"/>
+                    </a:lnL>
+                    <a:lnR w="9525" cap="flat" cmpd="sng" algn="ctr">
+                      <a:solidFill>
+                        <a:srgbClr val="D8DEDC"/>
+                      </a:solidFill>
+                      <a:prstDash val="solid"/>
+                    </a:lnR>
+                    <a:lnT w="9525" cap="flat" cmpd="sng" algn="ctr">
+                      <a:solidFill>
+                        <a:srgbClr val="D8DCDC"/>
+                      </a:solidFill>
+                      <a:prstDash val="solid"/>
+                    </a:lnT>
+                    <a:lnB w="9525" cap="flat" cmpd="sng" algn="ctr">
+                      <a:solidFill>
+                        <a:srgbClr val="D8DCDC"/>
+                      </a:solidFill>
+                      <a:prstDash val="solid"/>
+                    </a:lnB>
+                    <a:noFill/>
+                  </a:tcPr>
+                </a:tc>
+                <a:tc>
+                  <a:txBody>
+                    <a:bodyPr/>
+                    <a:lstStyle/>
+                    <a:p>
+                      <a:pPr algn="ctr" fontAlgn="b"/>
+                      <a:r>
+                        <a:rPr lang="pt-BR" sz="1400" u="none" strike="noStrike">
+                          <a:solidFill>
+                            <a:schemeClr val="tx1">
+                              <a:lumMod val="75000"/>
+                              <a:lumOff val="25000"/>
+                            </a:schemeClr>
+                          </a:solidFill>
+                          <a:effectLst/>
+                        </a:rPr>
+                        <a:t>87,5%</a:t>
+                      </a:r>
+                      <a:endParaRPr lang="pt-BR" sz="1400" b="0" i="0" u="none" strike="noStrike">
+                        <a:solidFill>
+                          <a:schemeClr val="tx1">
+                            <a:lumMod val="75000"/>
+                            <a:lumOff val="25000"/>
+                          </a:schemeClr>
+                        </a:solidFill>
+                        <a:effectLst/>
+                        <a:latin typeface="Calibri" panose="020F0502020204030204" pitchFamily="34" charset="0"/>
+                      </a:endParaRPr>
+                    </a:p>
+                  </a:txBody>
+                  <a:tcPr marL="167721" marR="15913" marT="83860" marB="83860" anchor="b">
+                    <a:lnL w="9525" cap="flat" cmpd="sng" algn="ctr">
+                      <a:solidFill>
+                        <a:srgbClr val="D8DEDC"/>
+                      </a:solidFill>
+                      <a:prstDash val="solid"/>
+                    </a:lnL>
+                    <a:lnR w="9525" cap="flat" cmpd="sng" algn="ctr">
+                      <a:solidFill>
+                        <a:srgbClr val="D8DEDC"/>
+                      </a:solidFill>
+                      <a:prstDash val="solid"/>
+                    </a:lnR>
+                    <a:lnT w="9525" cap="flat" cmpd="sng" algn="ctr">
+                      <a:solidFill>
+                        <a:srgbClr val="D8DCDC"/>
+                      </a:solidFill>
+                      <a:prstDash val="solid"/>
+                    </a:lnT>
+                    <a:lnB w="9525" cap="flat" cmpd="sng" algn="ctr">
+                      <a:solidFill>
+                        <a:srgbClr val="D8DCDC"/>
+                      </a:solidFill>
+                      <a:prstDash val="solid"/>
+                    </a:lnB>
+                    <a:noFill/>
+                  </a:tcPr>
+                </a:tc>
+                <a:extLst>
+                  <a:ext uri="{0D108BD9-81ED-4DB2-BD59-A6C34878D82A}">
+                    <a16:rowId xmlns:a16="http://schemas.microsoft.com/office/drawing/2014/main" val="546305694"/>
+                  </a:ext>
+                </a:extLst>
+              </a:tr>
+              <a:tr h="410916">
+                <a:tc>
+                  <a:txBody>
+                    <a:bodyPr/>
+                    <a:lstStyle/>
+                    <a:p>
+                      <a:pPr algn="ctr" fontAlgn="b"/>
+                      <a:r>
+                        <a:rPr lang="pt-BR" sz="1400" u="none" strike="noStrike">
+                          <a:solidFill>
+                            <a:schemeClr val="tx1">
+                              <a:lumMod val="75000"/>
+                              <a:lumOff val="25000"/>
+                            </a:schemeClr>
+                          </a:solidFill>
+                          <a:effectLst/>
+                        </a:rPr>
+                        <a:t>440</a:t>
+                      </a:r>
+                      <a:endParaRPr lang="pt-BR" sz="1400" b="0" i="0" u="none" strike="noStrike">
+                        <a:solidFill>
+                          <a:schemeClr val="tx1">
+                            <a:lumMod val="75000"/>
+                            <a:lumOff val="25000"/>
+                          </a:schemeClr>
+                        </a:solidFill>
+                        <a:effectLst/>
+                        <a:latin typeface="Calibri" panose="020F0502020204030204" pitchFamily="34" charset="0"/>
+                      </a:endParaRPr>
+                    </a:p>
+                  </a:txBody>
+                  <a:tcPr marL="167721" marR="15913" marT="83860" marB="83860" anchor="b">
+                    <a:lnL w="9525" cap="flat" cmpd="sng" algn="ctr">
+                      <a:solidFill>
+                        <a:srgbClr val="D8DCDC"/>
+                      </a:solidFill>
+                      <a:prstDash val="solid"/>
+                    </a:lnL>
+                    <a:lnR w="9525" cap="flat" cmpd="sng" algn="ctr">
+                      <a:solidFill>
+                        <a:srgbClr val="D8DCDC"/>
+                      </a:solidFill>
+                      <a:prstDash val="solid"/>
+                    </a:lnR>
+                    <a:lnT w="9525" cap="flat" cmpd="sng" algn="ctr">
+                      <a:solidFill>
+                        <a:srgbClr val="D8DCDC"/>
+                      </a:solidFill>
+                      <a:prstDash val="solid"/>
+                    </a:lnT>
+                    <a:lnB w="9525" cap="flat" cmpd="sng" algn="ctr">
+                      <a:solidFill>
+                        <a:srgbClr val="D8DCDC"/>
+                      </a:solidFill>
+                      <a:prstDash val="solid"/>
+                    </a:lnB>
+                    <a:solidFill>
+                      <a:srgbClr val="D8DEDC">
+                        <a:alpha val="20000"/>
+                      </a:srgbClr>
+                    </a:solidFill>
+                  </a:tcPr>
+                </a:tc>
+                <a:tc>
+                  <a:txBody>
+                    <a:bodyPr/>
+                    <a:lstStyle/>
+                    <a:p>
+                      <a:pPr algn="ctr" fontAlgn="b"/>
+                      <a:r>
+                        <a:rPr lang="pt-BR" sz="1400" u="none" strike="noStrike">
+                          <a:solidFill>
+                            <a:schemeClr val="tx1">
+                              <a:lumMod val="75000"/>
+                              <a:lumOff val="25000"/>
+                            </a:schemeClr>
+                          </a:solidFill>
+                          <a:effectLst/>
+                        </a:rPr>
+                        <a:t>40</a:t>
+                      </a:r>
+                      <a:endParaRPr lang="pt-BR" sz="1400" b="0" i="0" u="none" strike="noStrike">
+                        <a:solidFill>
+                          <a:schemeClr val="tx1">
+                            <a:lumMod val="75000"/>
+                            <a:lumOff val="25000"/>
+                          </a:schemeClr>
+                        </a:solidFill>
+                        <a:effectLst/>
+                        <a:latin typeface="Calibri" panose="020F0502020204030204" pitchFamily="34" charset="0"/>
+                      </a:endParaRPr>
+                    </a:p>
+                  </a:txBody>
+                  <a:tcPr marL="167721" marR="15913" marT="83860" marB="83860" anchor="b">
+                    <a:lnL w="9525" cap="flat" cmpd="sng" algn="ctr">
+                      <a:solidFill>
+                        <a:srgbClr val="D8DCDC"/>
+                      </a:solidFill>
+                      <a:prstDash val="solid"/>
+                    </a:lnL>
+                    <a:lnR w="9525" cap="flat" cmpd="sng" algn="ctr">
+                      <a:solidFill>
+                        <a:srgbClr val="D8DCDC"/>
+                      </a:solidFill>
+                      <a:prstDash val="solid"/>
+                    </a:lnR>
+                    <a:lnT w="9525" cap="flat" cmpd="sng" algn="ctr">
+                      <a:solidFill>
+                        <a:srgbClr val="D8DCDC"/>
+                      </a:solidFill>
+                      <a:prstDash val="solid"/>
+                    </a:lnT>
+                    <a:lnB w="9525" cap="flat" cmpd="sng" algn="ctr">
+                      <a:solidFill>
+                        <a:srgbClr val="D8DCDC"/>
+                      </a:solidFill>
+                      <a:prstDash val="solid"/>
+                    </a:lnB>
+                    <a:solidFill>
+                      <a:srgbClr val="D8DEDC">
+                        <a:alpha val="20000"/>
+                      </a:srgbClr>
+                    </a:solidFill>
+                  </a:tcPr>
+                </a:tc>
+                <a:tc>
+                  <a:txBody>
+                    <a:bodyPr/>
+                    <a:lstStyle/>
+                    <a:p>
+                      <a:pPr algn="ctr" fontAlgn="b"/>
+                      <a:r>
+                        <a:rPr lang="pt-BR" sz="1400" u="none" strike="noStrike">
+                          <a:solidFill>
+                            <a:schemeClr val="tx1">
+                              <a:lumMod val="75000"/>
+                              <a:lumOff val="25000"/>
+                            </a:schemeClr>
+                          </a:solidFill>
+                          <a:effectLst/>
+                        </a:rPr>
+                        <a:t>90,0%</a:t>
+                      </a:r>
+                      <a:endParaRPr lang="pt-BR" sz="1400" b="0" i="0" u="none" strike="noStrike">
+                        <a:solidFill>
+                          <a:schemeClr val="tx1">
+                            <a:lumMod val="75000"/>
+                            <a:lumOff val="25000"/>
+                          </a:schemeClr>
+                        </a:solidFill>
+                        <a:effectLst/>
+                        <a:latin typeface="Calibri" panose="020F0502020204030204" pitchFamily="34" charset="0"/>
+                      </a:endParaRPr>
+                    </a:p>
+                  </a:txBody>
+                  <a:tcPr marL="167721" marR="15913" marT="83860" marB="83860" anchor="b">
+                    <a:lnL w="9525" cap="flat" cmpd="sng" algn="ctr">
+                      <a:solidFill>
+                        <a:srgbClr val="D8DCDC"/>
+                      </a:solidFill>
+                      <a:prstDash val="solid"/>
+                    </a:lnL>
+                    <a:lnR w="9525" cap="flat" cmpd="sng" algn="ctr">
+                      <a:solidFill>
+                        <a:srgbClr val="D8DCDC"/>
+                      </a:solidFill>
+                      <a:prstDash val="solid"/>
+                    </a:lnR>
+                    <a:lnT w="9525" cap="flat" cmpd="sng" algn="ctr">
+                      <a:solidFill>
+                        <a:srgbClr val="D8DCDC"/>
+                      </a:solidFill>
+                      <a:prstDash val="solid"/>
+                    </a:lnT>
+                    <a:lnB w="9525" cap="flat" cmpd="sng" algn="ctr">
+                      <a:solidFill>
+                        <a:srgbClr val="D8DCDC"/>
+                      </a:solidFill>
+                      <a:prstDash val="solid"/>
+                    </a:lnB>
+                    <a:solidFill>
+                      <a:srgbClr val="D8DEDC">
+                        <a:alpha val="20000"/>
+                      </a:srgbClr>
+                    </a:solidFill>
+                  </a:tcPr>
+                </a:tc>
+                <a:tc>
+                  <a:txBody>
+                    <a:bodyPr/>
+                    <a:lstStyle/>
+                    <a:p>
+                      <a:pPr algn="ctr" fontAlgn="b"/>
+                      <a:r>
+                        <a:rPr lang="pt-BR" sz="1400" u="none" strike="noStrike">
+                          <a:solidFill>
+                            <a:schemeClr val="tx1">
+                              <a:lumMod val="75000"/>
+                              <a:lumOff val="25000"/>
+                            </a:schemeClr>
+                          </a:solidFill>
+                          <a:effectLst/>
+                        </a:rPr>
+                        <a:t>90,0%</a:t>
+                      </a:r>
+                      <a:endParaRPr lang="pt-BR" sz="1400" b="0" i="0" u="none" strike="noStrike">
+                        <a:solidFill>
+                          <a:schemeClr val="tx1">
+                            <a:lumMod val="75000"/>
+                            <a:lumOff val="25000"/>
+                          </a:schemeClr>
+                        </a:solidFill>
+                        <a:effectLst/>
+                        <a:latin typeface="Calibri" panose="020F0502020204030204" pitchFamily="34" charset="0"/>
+                      </a:endParaRPr>
+                    </a:p>
+                  </a:txBody>
+                  <a:tcPr marL="167721" marR="15913" marT="83860" marB="83860" anchor="b">
+                    <a:lnL w="9525" cap="flat" cmpd="sng" algn="ctr">
+                      <a:solidFill>
+                        <a:srgbClr val="D8DCDC"/>
+                      </a:solidFill>
+                      <a:prstDash val="solid"/>
+                    </a:lnL>
+                    <a:lnR w="9525" cap="flat" cmpd="sng" algn="ctr">
+                      <a:solidFill>
+                        <a:srgbClr val="D8DCDC"/>
+                      </a:solidFill>
+                      <a:prstDash val="solid"/>
+                    </a:lnR>
+                    <a:lnT w="9525" cap="flat" cmpd="sng" algn="ctr">
+                      <a:solidFill>
+                        <a:srgbClr val="D8DCDC"/>
+                      </a:solidFill>
+                      <a:prstDash val="solid"/>
+                    </a:lnT>
+                    <a:lnB w="9525" cap="flat" cmpd="sng" algn="ctr">
+                      <a:solidFill>
+                        <a:srgbClr val="D8DCDC"/>
+                      </a:solidFill>
+                      <a:prstDash val="solid"/>
+                    </a:lnB>
+                    <a:solidFill>
+                      <a:srgbClr val="D8DEDC">
+                        <a:alpha val="20000"/>
+                      </a:srgbClr>
+                    </a:solidFill>
+                  </a:tcPr>
+                </a:tc>
+                <a:tc>
+                  <a:txBody>
+                    <a:bodyPr/>
+                    <a:lstStyle/>
+                    <a:p>
+                      <a:pPr algn="ctr" fontAlgn="b"/>
+                      <a:r>
+                        <a:rPr lang="pt-BR" sz="1400" u="none" strike="noStrike" dirty="0">
+                          <a:solidFill>
+                            <a:schemeClr val="tx1">
+                              <a:lumMod val="75000"/>
+                              <a:lumOff val="25000"/>
+                            </a:schemeClr>
+                          </a:solidFill>
+                          <a:effectLst/>
+                        </a:rPr>
+                        <a:t>87,5%</a:t>
+                      </a:r>
+                      <a:endParaRPr lang="pt-BR" sz="1400" b="0" i="0" u="none" strike="noStrike" dirty="0">
+                        <a:solidFill>
+                          <a:schemeClr val="tx1">
+                            <a:lumMod val="75000"/>
+                            <a:lumOff val="25000"/>
+                          </a:schemeClr>
+                        </a:solidFill>
+                        <a:effectLst/>
+                        <a:latin typeface="Calibri" panose="020F0502020204030204" pitchFamily="34" charset="0"/>
+                      </a:endParaRPr>
+                    </a:p>
+                  </a:txBody>
+                  <a:tcPr marL="167721" marR="15913" marT="83860" marB="83860" anchor="b">
+                    <a:lnL w="9525" cap="flat" cmpd="sng" algn="ctr">
+                      <a:solidFill>
+                        <a:srgbClr val="D8DCDC"/>
+                      </a:solidFill>
+                      <a:prstDash val="solid"/>
+                    </a:lnL>
+                    <a:lnR w="9525" cap="flat" cmpd="sng" algn="ctr">
+                      <a:solidFill>
+                        <a:srgbClr val="D8DCDC"/>
+                      </a:solidFill>
+                      <a:prstDash val="solid"/>
+                    </a:lnR>
+                    <a:lnT w="9525" cap="flat" cmpd="sng" algn="ctr">
+                      <a:solidFill>
+                        <a:srgbClr val="D8DCDC"/>
+                      </a:solidFill>
+                      <a:prstDash val="solid"/>
+                    </a:lnT>
+                    <a:lnB w="9525" cap="flat" cmpd="sng" algn="ctr">
+                      <a:solidFill>
+                        <a:srgbClr val="D8DCDC"/>
+                      </a:solidFill>
+                      <a:prstDash val="solid"/>
+                    </a:lnB>
+                    <a:solidFill>
+                      <a:srgbClr val="D8DEDC">
+                        <a:alpha val="20000"/>
+                      </a:srgbClr>
+                    </a:solidFill>
+                  </a:tcPr>
+                </a:tc>
+                <a:extLst>
+                  <a:ext uri="{0D108BD9-81ED-4DB2-BD59-A6C34878D82A}">
+                    <a16:rowId xmlns:a16="http://schemas.microsoft.com/office/drawing/2014/main" val="2087482807"/>
+                  </a:ext>
+                </a:extLst>
+              </a:tr>
+            </a:tbl>
+          </a:graphicData>
+        </a:graphic>
+      </p:graphicFrame>
     </p:spTree>
     <p:extLst>
       <p:ext uri="{BB962C8B-B14F-4D97-AF65-F5344CB8AC3E}">
@@ -3738,10 +7455,10 @@
       </p:grpSpPr>
       <p:pic>
         <p:nvPicPr>
-          <p:cNvPr id="5" name="Imagem 4" descr="Tela de celular com publicação numa rede social&#10;&#10;Descrição gerada automaticamente">
+          <p:cNvPr id="4" name="Imagem 3" descr="Tela de celular com publicação numa rede social&#10;&#10;Descrição gerada automaticamente">
             <a:extLst>
               <a:ext uri="{FF2B5EF4-FFF2-40B4-BE49-F238E27FC236}">
-                <a16:creationId xmlns:a16="http://schemas.microsoft.com/office/drawing/2014/main" id="{23EF186C-2491-4194-A1FA-654153C165EF}"/>
+                <a16:creationId xmlns:a16="http://schemas.microsoft.com/office/drawing/2014/main" id="{C5B14919-43A7-407E-987A-C08539DEBCD0}"/>
               </a:ext>
             </a:extLst>
           </p:cNvPr>
@@ -3772,59 +7489,6 @@
           </a:prstGeom>
         </p:spPr>
       </p:pic>
-      <p:sp>
-        <p:nvSpPr>
-          <p:cNvPr id="2" name="Retângulo 1">
-            <a:extLst>
-              <a:ext uri="{FF2B5EF4-FFF2-40B4-BE49-F238E27FC236}">
-                <a16:creationId xmlns:a16="http://schemas.microsoft.com/office/drawing/2014/main" id="{5E2E2AFA-AA89-4C56-9DC7-E8C1C29CBC16}"/>
-              </a:ext>
-            </a:extLst>
-          </p:cNvPr>
-          <p:cNvSpPr/>
-          <p:nvPr/>
-        </p:nvSpPr>
-        <p:spPr>
-          <a:xfrm>
-            <a:off x="-1757363" y="1171575"/>
-            <a:ext cx="1643063" cy="2028825"/>
-          </a:xfrm>
-          <a:prstGeom prst="rect">
-            <a:avLst/>
-          </a:prstGeom>
-        </p:spPr>
-        <p:style>
-          <a:lnRef idx="2">
-            <a:schemeClr val="accent1">
-              <a:shade val="50000"/>
-            </a:schemeClr>
-          </a:lnRef>
-          <a:fillRef idx="1">
-            <a:schemeClr val="accent1"/>
-          </a:fillRef>
-          <a:effectRef idx="0">
-            <a:schemeClr val="accent1"/>
-          </a:effectRef>
-          <a:fontRef idx="minor">
-            <a:schemeClr val="lt1"/>
-          </a:fontRef>
-        </p:style>
-        <p:txBody>
-          <a:bodyPr rtlCol="0" anchor="ctr"/>
-          <a:lstStyle/>
-          <a:p>
-            <a:pPr algn="ctr"/>
-            <a:r>
-              <a:rPr lang="pt-BR" dirty="0" err="1"/>
-              <a:t>Icones</a:t>
-            </a:r>
-            <a:r>
-              <a:rPr lang="pt-BR" dirty="0"/>
-              <a:t> para professor e tecnologia</a:t>
-            </a:r>
-          </a:p>
-        </p:txBody>
-      </p:sp>
     </p:spTree>
     <p:extLst>
       <p:ext uri="{BB962C8B-B14F-4D97-AF65-F5344CB8AC3E}">
@@ -3907,42 +7571,6 @@
           </a:p>
         </p:txBody>
       </p:sp>
-      <p:pic>
-        <p:nvPicPr>
-          <p:cNvPr id="4" name="Imagem 3" descr="Tela de celular com texto preto sobre fundo branco&#10;&#10;Descrição gerada automaticamente">
-            <a:extLst>
-              <a:ext uri="{FF2B5EF4-FFF2-40B4-BE49-F238E27FC236}">
-                <a16:creationId xmlns:a16="http://schemas.microsoft.com/office/drawing/2014/main" id="{A258560F-FCF7-448E-B401-FD385AB542EF}"/>
-              </a:ext>
-            </a:extLst>
-          </p:cNvPr>
-          <p:cNvPicPr>
-            <a:picLocks noChangeAspect="1"/>
-          </p:cNvPicPr>
-          <p:nvPr/>
-        </p:nvPicPr>
-        <p:blipFill>
-          <a:blip r:embed="rId2">
-            <a:extLst>
-              <a:ext uri="{28A0092B-C50C-407E-A947-70E740481C1C}">
-                <a14:useLocalDpi xmlns:a14="http://schemas.microsoft.com/office/drawing/2010/main" val="0"/>
-              </a:ext>
-            </a:extLst>
-          </a:blip>
-          <a:stretch>
-            <a:fillRect/>
-          </a:stretch>
-        </p:blipFill>
-        <p:spPr>
-          <a:xfrm>
-            <a:off x="0" y="0"/>
-            <a:ext cx="12192000" cy="6858000"/>
-          </a:xfrm>
-          <a:prstGeom prst="rect">
-            <a:avLst/>
-          </a:prstGeom>
-        </p:spPr>
-      </p:pic>
       <p:sp>
         <p:nvSpPr>
           <p:cNvPr id="5" name="Retângulo 4">
@@ -3996,6 +7624,42 @@
           </a:p>
         </p:txBody>
       </p:sp>
+      <p:pic>
+        <p:nvPicPr>
+          <p:cNvPr id="6" name="Imagem 5" descr="Tela de celular com texto preto sobre fundo branco&#10;&#10;Descrição gerada automaticamente">
+            <a:extLst>
+              <a:ext uri="{FF2B5EF4-FFF2-40B4-BE49-F238E27FC236}">
+                <a16:creationId xmlns:a16="http://schemas.microsoft.com/office/drawing/2014/main" id="{FC601436-2BC5-4B02-ACE5-15516D53BB09}"/>
+              </a:ext>
+            </a:extLst>
+          </p:cNvPr>
+          <p:cNvPicPr>
+            <a:picLocks noChangeAspect="1"/>
+          </p:cNvPicPr>
+          <p:nvPr/>
+        </p:nvPicPr>
+        <p:blipFill>
+          <a:blip r:embed="rId2">
+            <a:extLst>
+              <a:ext uri="{28A0092B-C50C-407E-A947-70E740481C1C}">
+                <a14:useLocalDpi xmlns:a14="http://schemas.microsoft.com/office/drawing/2010/main" val="0"/>
+              </a:ext>
+            </a:extLst>
+          </a:blip>
+          <a:stretch>
+            <a:fillRect/>
+          </a:stretch>
+        </p:blipFill>
+        <p:spPr>
+          <a:xfrm>
+            <a:off x="0" y="0"/>
+            <a:ext cx="12192000" cy="6858000"/>
+          </a:xfrm>
+          <a:prstGeom prst="rect">
+            <a:avLst/>
+          </a:prstGeom>
+        </p:spPr>
+      </p:pic>
     </p:spTree>
     <p:extLst>
       <p:ext uri="{BB962C8B-B14F-4D97-AF65-F5344CB8AC3E}">
@@ -4491,6 +8155,14 @@
 <file path=ppt/slides/slide9.xml><?xml version="1.0" encoding="utf-8"?>
 <p:sld xmlns:a="http://schemas.openxmlformats.org/drawingml/2006/main" xmlns:r="http://schemas.openxmlformats.org/officeDocument/2006/relationships" xmlns:p="http://schemas.openxmlformats.org/presentationml/2006/main">
   <p:cSld>
+    <p:bg>
+      <p:bgPr>
+        <a:solidFill>
+          <a:schemeClr val="bg1"/>
+        </a:solidFill>
+        <a:effectLst/>
+      </p:bgPr>
+    </p:bg>
     <p:spTree>
       <p:nvGrpSpPr>
         <p:cNvPr id="1" name=""/>
@@ -4507,10 +8179,10 @@
       </p:grpSpPr>
       <p:pic>
         <p:nvPicPr>
-          <p:cNvPr id="5" name="Imagem 4" descr="Uma imagem contendo screenshot, texto, desenho&#10;&#10;Descrição gerada automaticamente">
+          <p:cNvPr id="4" name="Imagem 3" descr="Uma imagem contendo screenshot, texto&#10;&#10;Descrição gerada automaticamente">
             <a:extLst>
               <a:ext uri="{FF2B5EF4-FFF2-40B4-BE49-F238E27FC236}">
-                <a16:creationId xmlns:a16="http://schemas.microsoft.com/office/drawing/2014/main" id="{C90ADE1E-B4F6-474D-97C1-F7B2F287795F}"/>
+                <a16:creationId xmlns:a16="http://schemas.microsoft.com/office/drawing/2014/main" id="{551E6082-9058-4556-AFED-014175B76E98}"/>
               </a:ext>
             </a:extLst>
           </p:cNvPr>
@@ -4541,55 +8213,6 @@
           </a:prstGeom>
         </p:spPr>
       </p:pic>
-      <p:sp>
-        <p:nvSpPr>
-          <p:cNvPr id="2" name="Retângulo 1">
-            <a:extLst>
-              <a:ext uri="{FF2B5EF4-FFF2-40B4-BE49-F238E27FC236}">
-                <a16:creationId xmlns:a16="http://schemas.microsoft.com/office/drawing/2014/main" id="{382F366A-E39D-485C-83BB-7BD0E8FD75C4}"/>
-              </a:ext>
-            </a:extLst>
-          </p:cNvPr>
-          <p:cNvSpPr/>
-          <p:nvPr/>
-        </p:nvSpPr>
-        <p:spPr>
-          <a:xfrm>
-            <a:off x="9844086" y="414338"/>
-            <a:ext cx="3586163" cy="2871787"/>
-          </a:xfrm>
-          <a:prstGeom prst="rect">
-            <a:avLst/>
-          </a:prstGeom>
-        </p:spPr>
-        <p:style>
-          <a:lnRef idx="2">
-            <a:schemeClr val="accent1">
-              <a:shade val="50000"/>
-            </a:schemeClr>
-          </a:lnRef>
-          <a:fillRef idx="1">
-            <a:schemeClr val="accent1"/>
-          </a:fillRef>
-          <a:effectRef idx="0">
-            <a:schemeClr val="accent1"/>
-          </a:effectRef>
-          <a:fontRef idx="minor">
-            <a:schemeClr val="lt1"/>
-          </a:fontRef>
-        </p:style>
-        <p:txBody>
-          <a:bodyPr rtlCol="0" anchor="ctr"/>
-          <a:lstStyle/>
-          <a:p>
-            <a:pPr algn="ctr"/>
-            <a:r>
-              <a:rPr lang="pt-BR" sz="2800" dirty="0"/>
-              <a:t>Melhorar a apresentação. Não ficou claro como o sistema vai funcionar. Talvez contar uma história!</a:t>
-            </a:r>
-          </a:p>
-        </p:txBody>
-      </p:sp>
     </p:spTree>
     <p:extLst>
       <p:ext uri="{BB962C8B-B14F-4D97-AF65-F5344CB8AC3E}">

</xml_diff>

<commit_message>
Incluindo considerações do professor na apresentacao
</commit_message>
<xml_diff>
--- a/apresentacao/apresentacao.pptx
+++ b/apresentacao/apresentacao.pptx
@@ -17,6 +17,7 @@
     <p:sldId id="269" r:id="rId11"/>
     <p:sldId id="261" r:id="rId12"/>
     <p:sldId id="265" r:id="rId13"/>
+    <p:sldId id="270" r:id="rId14"/>
   </p:sldIdLst>
   <p:sldSz cx="12192000" cy="6858000"/>
   <p:notesSz cx="6858000" cy="9144000"/>
@@ -270,7 +271,7 @@
           <a:p>
             <a:fld id="{1F1FAA24-82E9-47BA-A53E-AEAD71F0EE56}" type="datetimeFigureOut">
               <a:rPr lang="pt-BR" smtClean="0"/>
-              <a:t>10/05/2020</a:t>
+              <a:t>11/05/2020</a:t>
             </a:fld>
             <a:endParaRPr lang="pt-BR"/>
           </a:p>
@@ -468,7 +469,7 @@
           <a:p>
             <a:fld id="{1F1FAA24-82E9-47BA-A53E-AEAD71F0EE56}" type="datetimeFigureOut">
               <a:rPr lang="pt-BR" smtClean="0"/>
-              <a:t>10/05/2020</a:t>
+              <a:t>11/05/2020</a:t>
             </a:fld>
             <a:endParaRPr lang="pt-BR"/>
           </a:p>
@@ -676,7 +677,7 @@
           <a:p>
             <a:fld id="{1F1FAA24-82E9-47BA-A53E-AEAD71F0EE56}" type="datetimeFigureOut">
               <a:rPr lang="pt-BR" smtClean="0"/>
-              <a:t>10/05/2020</a:t>
+              <a:t>11/05/2020</a:t>
             </a:fld>
             <a:endParaRPr lang="pt-BR"/>
           </a:p>
@@ -874,7 +875,7 @@
           <a:p>
             <a:fld id="{1F1FAA24-82E9-47BA-A53E-AEAD71F0EE56}" type="datetimeFigureOut">
               <a:rPr lang="pt-BR" smtClean="0"/>
-              <a:t>10/05/2020</a:t>
+              <a:t>11/05/2020</a:t>
             </a:fld>
             <a:endParaRPr lang="pt-BR"/>
           </a:p>
@@ -1149,7 +1150,7 @@
           <a:p>
             <a:fld id="{1F1FAA24-82E9-47BA-A53E-AEAD71F0EE56}" type="datetimeFigureOut">
               <a:rPr lang="pt-BR" smtClean="0"/>
-              <a:t>10/05/2020</a:t>
+              <a:t>11/05/2020</a:t>
             </a:fld>
             <a:endParaRPr lang="pt-BR"/>
           </a:p>
@@ -1414,7 +1415,7 @@
           <a:p>
             <a:fld id="{1F1FAA24-82E9-47BA-A53E-AEAD71F0EE56}" type="datetimeFigureOut">
               <a:rPr lang="pt-BR" smtClean="0"/>
-              <a:t>10/05/2020</a:t>
+              <a:t>11/05/2020</a:t>
             </a:fld>
             <a:endParaRPr lang="pt-BR"/>
           </a:p>
@@ -1826,7 +1827,7 @@
           <a:p>
             <a:fld id="{1F1FAA24-82E9-47BA-A53E-AEAD71F0EE56}" type="datetimeFigureOut">
               <a:rPr lang="pt-BR" smtClean="0"/>
-              <a:t>10/05/2020</a:t>
+              <a:t>11/05/2020</a:t>
             </a:fld>
             <a:endParaRPr lang="pt-BR"/>
           </a:p>
@@ -1967,7 +1968,7 @@
           <a:p>
             <a:fld id="{1F1FAA24-82E9-47BA-A53E-AEAD71F0EE56}" type="datetimeFigureOut">
               <a:rPr lang="pt-BR" smtClean="0"/>
-              <a:t>10/05/2020</a:t>
+              <a:t>11/05/2020</a:t>
             </a:fld>
             <a:endParaRPr lang="pt-BR"/>
           </a:p>
@@ -2080,7 +2081,7 @@
           <a:p>
             <a:fld id="{1F1FAA24-82E9-47BA-A53E-AEAD71F0EE56}" type="datetimeFigureOut">
               <a:rPr lang="pt-BR" smtClean="0"/>
-              <a:t>10/05/2020</a:t>
+              <a:t>11/05/2020</a:t>
             </a:fld>
             <a:endParaRPr lang="pt-BR"/>
           </a:p>
@@ -2391,7 +2392,7 @@
           <a:p>
             <a:fld id="{1F1FAA24-82E9-47BA-A53E-AEAD71F0EE56}" type="datetimeFigureOut">
               <a:rPr lang="pt-BR" smtClean="0"/>
-              <a:t>10/05/2020</a:t>
+              <a:t>11/05/2020</a:t>
             </a:fld>
             <a:endParaRPr lang="pt-BR"/>
           </a:p>
@@ -2679,7 +2680,7 @@
           <a:p>
             <a:fld id="{1F1FAA24-82E9-47BA-A53E-AEAD71F0EE56}" type="datetimeFigureOut">
               <a:rPr lang="pt-BR" smtClean="0"/>
-              <a:t>10/05/2020</a:t>
+              <a:t>11/05/2020</a:t>
             </a:fld>
             <a:endParaRPr lang="pt-BR"/>
           </a:p>
@@ -2920,7 +2921,7 @@
           <a:p>
             <a:fld id="{1F1FAA24-82E9-47BA-A53E-AEAD71F0EE56}" type="datetimeFigureOut">
               <a:rPr lang="pt-BR" smtClean="0"/>
-              <a:t>10/05/2020</a:t>
+              <a:t>11/05/2020</a:t>
             </a:fld>
             <a:endParaRPr lang="pt-BR"/>
           </a:p>
@@ -7173,6 +7174,58 @@
           </a:graphicData>
         </a:graphic>
       </p:graphicFrame>
+      <p:sp>
+        <p:nvSpPr>
+          <p:cNvPr id="5" name="Retângulo 4">
+            <a:extLst>
+              <a:ext uri="{FF2B5EF4-FFF2-40B4-BE49-F238E27FC236}">
+                <a16:creationId xmlns:a16="http://schemas.microsoft.com/office/drawing/2014/main" id="{D6E28982-DFFC-45D2-A04A-D3BA8D0F696E}"/>
+              </a:ext>
+            </a:extLst>
+          </p:cNvPr>
+          <p:cNvSpPr/>
+          <p:nvPr/>
+        </p:nvSpPr>
+        <p:spPr>
+          <a:xfrm>
+            <a:off x="12575636" y="0"/>
+            <a:ext cx="2812680" cy="3429000"/>
+          </a:xfrm>
+          <a:prstGeom prst="rect">
+            <a:avLst/>
+          </a:prstGeom>
+          <a:solidFill>
+            <a:srgbClr val="FF0000"/>
+          </a:solidFill>
+        </p:spPr>
+        <p:style>
+          <a:lnRef idx="2">
+            <a:schemeClr val="accent1">
+              <a:shade val="50000"/>
+            </a:schemeClr>
+          </a:lnRef>
+          <a:fillRef idx="1">
+            <a:schemeClr val="accent1"/>
+          </a:fillRef>
+          <a:effectRef idx="0">
+            <a:schemeClr val="accent1"/>
+          </a:effectRef>
+          <a:fontRef idx="minor">
+            <a:schemeClr val="lt1"/>
+          </a:fontRef>
+        </p:style>
+        <p:txBody>
+          <a:bodyPr rtlCol="0" anchor="ctr"/>
+          <a:lstStyle/>
+          <a:p>
+            <a:pPr algn="ctr"/>
+            <a:r>
+              <a:rPr lang="pt-BR" sz="2800" dirty="0"/>
+              <a:t>Substituir os slides de resultados. Colocar as informações relevantes em um gráfico.</a:t>
+            </a:r>
+          </a:p>
+        </p:txBody>
+      </p:sp>
     </p:spTree>
     <p:extLst>
       <p:ext uri="{BB962C8B-B14F-4D97-AF65-F5344CB8AC3E}">
@@ -7241,10 +7294,10 @@
       </p:pic>
       <p:sp>
         <p:nvSpPr>
-          <p:cNvPr id="2" name="Retângulo 1">
-            <a:extLst>
-              <a:ext uri="{FF2B5EF4-FFF2-40B4-BE49-F238E27FC236}">
-                <a16:creationId xmlns:a16="http://schemas.microsoft.com/office/drawing/2014/main" id="{BE83EBD0-0137-4666-99F8-CBAB2CB86E4D}"/>
+          <p:cNvPr id="5" name="Retângulo 4">
+            <a:extLst>
+              <a:ext uri="{FF2B5EF4-FFF2-40B4-BE49-F238E27FC236}">
+                <a16:creationId xmlns:a16="http://schemas.microsoft.com/office/drawing/2014/main" id="{DAEB77D9-3086-44AE-93D8-0B768ABF7F38}"/>
               </a:ext>
             </a:extLst>
           </p:cNvPr>
@@ -7253,14 +7306,14 @@
         </p:nvSpPr>
         <p:spPr>
           <a:xfrm>
-            <a:off x="12458700" y="-1"/>
-            <a:ext cx="2186448" cy="2993923"/>
+            <a:off x="12575636" y="0"/>
+            <a:ext cx="2812680" cy="5981700"/>
           </a:xfrm>
           <a:prstGeom prst="rect">
             <a:avLst/>
           </a:prstGeom>
           <a:solidFill>
-            <a:schemeClr val="accent2"/>
+            <a:srgbClr val="FF0000"/>
           </a:solidFill>
         </p:spPr>
         <p:style>
@@ -7285,8 +7338,19 @@
           <a:p>
             <a:pPr algn="ctr"/>
             <a:r>
-              <a:rPr lang="pt-BR" dirty="0"/>
-              <a:t>Deixar claro que os próximos passos são sugestões para que a comunidade cientifica realize pesquisas futuras. Não assumir a responsabilidade!</a:t>
+              <a:rPr lang="pt-BR" sz="2800" dirty="0"/>
+              <a:t>Ajustar o slide, não ficou claro. As palavras ficaram muito soltas e não conclui nada.</a:t>
+            </a:r>
+          </a:p>
+          <a:p>
+            <a:pPr algn="ctr"/>
+            <a:endParaRPr lang="pt-BR" sz="2800" dirty="0"/>
+          </a:p>
+          <a:p>
+            <a:pPr algn="ctr"/>
+            <a:r>
+              <a:rPr lang="pt-BR" sz="2800" dirty="0"/>
+              <a:t>Ter um número menor de considerações, talvez uma, e uma consideração mais forte.</a:t>
             </a:r>
           </a:p>
         </p:txBody>
@@ -7361,6 +7425,138 @@
     <p:extLst>
       <p:ext uri="{BB962C8B-B14F-4D97-AF65-F5344CB8AC3E}">
         <p14:creationId xmlns:p14="http://schemas.microsoft.com/office/powerpoint/2010/main" val="3120382947"/>
+      </p:ext>
+    </p:extLst>
+  </p:cSld>
+  <p:clrMapOvr>
+    <a:masterClrMapping/>
+  </p:clrMapOvr>
+</p:sld>
+</file>
+
+<file path=ppt/slides/slide13.xml><?xml version="1.0" encoding="utf-8"?>
+<p:sld xmlns:a="http://schemas.openxmlformats.org/drawingml/2006/main" xmlns:r="http://schemas.openxmlformats.org/officeDocument/2006/relationships" xmlns:p="http://schemas.openxmlformats.org/presentationml/2006/main">
+  <p:cSld>
+    <p:spTree>
+      <p:nvGrpSpPr>
+        <p:cNvPr id="1" name=""/>
+        <p:cNvGrpSpPr/>
+        <p:nvPr/>
+      </p:nvGrpSpPr>
+      <p:grpSpPr>
+        <a:xfrm>
+          <a:off x="0" y="0"/>
+          <a:ext cx="0" cy="0"/>
+          <a:chOff x="0" y="0"/>
+          <a:chExt cx="0" cy="0"/>
+        </a:xfrm>
+      </p:grpSpPr>
+      <p:sp>
+        <p:nvSpPr>
+          <p:cNvPr id="2" name="Título 1">
+            <a:extLst>
+              <a:ext uri="{FF2B5EF4-FFF2-40B4-BE49-F238E27FC236}">
+                <a16:creationId xmlns:a16="http://schemas.microsoft.com/office/drawing/2014/main" id="{E4D32EC1-7654-4E8F-944F-EE8BC1388653}"/>
+              </a:ext>
+            </a:extLst>
+          </p:cNvPr>
+          <p:cNvSpPr>
+            <a:spLocks noGrp="1"/>
+          </p:cNvSpPr>
+          <p:nvPr>
+            <p:ph type="title"/>
+          </p:nvPr>
+        </p:nvSpPr>
+        <p:spPr/>
+        <p:txBody>
+          <a:bodyPr/>
+          <a:lstStyle/>
+          <a:p>
+            <a:endParaRPr lang="pt-BR"/>
+          </a:p>
+        </p:txBody>
+      </p:sp>
+      <p:sp>
+        <p:nvSpPr>
+          <p:cNvPr id="3" name="Espaço Reservado para Conteúdo 2">
+            <a:extLst>
+              <a:ext uri="{FF2B5EF4-FFF2-40B4-BE49-F238E27FC236}">
+                <a16:creationId xmlns:a16="http://schemas.microsoft.com/office/drawing/2014/main" id="{3163D0C7-67D7-44FF-AB94-B16ED78706CD}"/>
+              </a:ext>
+            </a:extLst>
+          </p:cNvPr>
+          <p:cNvSpPr>
+            <a:spLocks noGrp="1"/>
+          </p:cNvSpPr>
+          <p:nvPr>
+            <p:ph idx="1"/>
+          </p:nvPr>
+        </p:nvSpPr>
+        <p:spPr/>
+        <p:txBody>
+          <a:bodyPr/>
+          <a:lstStyle/>
+          <a:p>
+            <a:endParaRPr lang="pt-BR"/>
+          </a:p>
+        </p:txBody>
+      </p:sp>
+      <p:sp>
+        <p:nvSpPr>
+          <p:cNvPr id="4" name="Retângulo 3">
+            <a:extLst>
+              <a:ext uri="{FF2B5EF4-FFF2-40B4-BE49-F238E27FC236}">
+                <a16:creationId xmlns:a16="http://schemas.microsoft.com/office/drawing/2014/main" id="{CA25946C-CE96-4DC0-942A-D59A28422D8C}"/>
+              </a:ext>
+            </a:extLst>
+          </p:cNvPr>
+          <p:cNvSpPr/>
+          <p:nvPr/>
+        </p:nvSpPr>
+        <p:spPr>
+          <a:xfrm>
+            <a:off x="12575636" y="0"/>
+            <a:ext cx="2892964" cy="2038350"/>
+          </a:xfrm>
+          <a:prstGeom prst="rect">
+            <a:avLst/>
+          </a:prstGeom>
+          <a:solidFill>
+            <a:srgbClr val="FF0000"/>
+          </a:solidFill>
+        </p:spPr>
+        <p:style>
+          <a:lnRef idx="2">
+            <a:schemeClr val="accent1">
+              <a:shade val="50000"/>
+            </a:schemeClr>
+          </a:lnRef>
+          <a:fillRef idx="1">
+            <a:schemeClr val="accent1"/>
+          </a:fillRef>
+          <a:effectRef idx="0">
+            <a:schemeClr val="accent1"/>
+          </a:effectRef>
+          <a:fontRef idx="minor">
+            <a:schemeClr val="lt1"/>
+          </a:fontRef>
+        </p:style>
+        <p:txBody>
+          <a:bodyPr rtlCol="0" anchor="ctr"/>
+          <a:lstStyle/>
+          <a:p>
+            <a:pPr algn="ctr"/>
+            <a:r>
+              <a:rPr lang="pt-BR" sz="2800" dirty="0"/>
+              <a:t>Incluir um slide de agradecimento.</a:t>
+            </a:r>
+          </a:p>
+        </p:txBody>
+      </p:sp>
+    </p:spTree>
+    <p:extLst>
+      <p:ext uri="{BB962C8B-B14F-4D97-AF65-F5344CB8AC3E}">
+        <p14:creationId xmlns:p14="http://schemas.microsoft.com/office/powerpoint/2010/main" val="3804690241"/>
       </p:ext>
     </p:extLst>
   </p:cSld>
@@ -7489,6 +7685,58 @@
           </a:prstGeom>
         </p:spPr>
       </p:pic>
+      <p:sp>
+        <p:nvSpPr>
+          <p:cNvPr id="3" name="Retângulo 2">
+            <a:extLst>
+              <a:ext uri="{FF2B5EF4-FFF2-40B4-BE49-F238E27FC236}">
+                <a16:creationId xmlns:a16="http://schemas.microsoft.com/office/drawing/2014/main" id="{8CABEAC5-7784-455D-9E6C-75FA9C3C1184}"/>
+              </a:ext>
+            </a:extLst>
+          </p:cNvPr>
+          <p:cNvSpPr/>
+          <p:nvPr/>
+        </p:nvSpPr>
+        <p:spPr>
+          <a:xfrm>
+            <a:off x="12592051" y="0"/>
+            <a:ext cx="2157412" cy="3028950"/>
+          </a:xfrm>
+          <a:prstGeom prst="rect">
+            <a:avLst/>
+          </a:prstGeom>
+          <a:solidFill>
+            <a:srgbClr val="FF0000"/>
+          </a:solidFill>
+        </p:spPr>
+        <p:style>
+          <a:lnRef idx="2">
+            <a:schemeClr val="accent1">
+              <a:shade val="50000"/>
+            </a:schemeClr>
+          </a:lnRef>
+          <a:fillRef idx="1">
+            <a:schemeClr val="accent1"/>
+          </a:fillRef>
+          <a:effectRef idx="0">
+            <a:schemeClr val="accent1"/>
+          </a:effectRef>
+          <a:fontRef idx="minor">
+            <a:schemeClr val="lt1"/>
+          </a:fontRef>
+        </p:style>
+        <p:txBody>
+          <a:bodyPr rtlCol="0" anchor="ctr"/>
+          <a:lstStyle/>
+          <a:p>
+            <a:pPr algn="ctr"/>
+            <a:r>
+              <a:rPr lang="pt-BR" sz="2800" dirty="0"/>
+              <a:t>Falar brevemente, passando pelas fazes sem descrever.</a:t>
+            </a:r>
+          </a:p>
+        </p:txBody>
+      </p:sp>
     </p:spTree>
     <p:extLst>
       <p:ext uri="{BB962C8B-B14F-4D97-AF65-F5344CB8AC3E}">
@@ -7660,6 +7908,58 @@
           </a:prstGeom>
         </p:spPr>
       </p:pic>
+      <p:sp>
+        <p:nvSpPr>
+          <p:cNvPr id="7" name="Retângulo 6">
+            <a:extLst>
+              <a:ext uri="{FF2B5EF4-FFF2-40B4-BE49-F238E27FC236}">
+                <a16:creationId xmlns:a16="http://schemas.microsoft.com/office/drawing/2014/main" id="{E7D25EFF-232E-4B17-BBB0-A676237723DE}"/>
+              </a:ext>
+            </a:extLst>
+          </p:cNvPr>
+          <p:cNvSpPr/>
+          <p:nvPr/>
+        </p:nvSpPr>
+        <p:spPr>
+          <a:xfrm>
+            <a:off x="12515851" y="5636422"/>
+            <a:ext cx="2157412" cy="1328738"/>
+          </a:xfrm>
+          <a:prstGeom prst="rect">
+            <a:avLst/>
+          </a:prstGeom>
+          <a:solidFill>
+            <a:srgbClr val="FF0000"/>
+          </a:solidFill>
+        </p:spPr>
+        <p:style>
+          <a:lnRef idx="2">
+            <a:schemeClr val="accent1">
+              <a:shade val="50000"/>
+            </a:schemeClr>
+          </a:lnRef>
+          <a:fillRef idx="1">
+            <a:schemeClr val="accent1"/>
+          </a:fillRef>
+          <a:effectRef idx="0">
+            <a:schemeClr val="accent1"/>
+          </a:effectRef>
+          <a:fontRef idx="minor">
+            <a:schemeClr val="lt1"/>
+          </a:fontRef>
+        </p:style>
+        <p:txBody>
+          <a:bodyPr rtlCol="0" anchor="ctr"/>
+          <a:lstStyle/>
+          <a:p>
+            <a:pPr algn="ctr"/>
+            <a:r>
+              <a:rPr lang="pt-BR" sz="2800" dirty="0"/>
+              <a:t>Morre o slide</a:t>
+            </a:r>
+          </a:p>
+        </p:txBody>
+      </p:sp>
     </p:spTree>
     <p:extLst>
       <p:ext uri="{BB962C8B-B14F-4D97-AF65-F5344CB8AC3E}">
@@ -7903,6 +8203,58 @@
           </a:p>
         </p:txBody>
       </p:sp>
+      <p:sp>
+        <p:nvSpPr>
+          <p:cNvPr id="4" name="Retângulo 3">
+            <a:extLst>
+              <a:ext uri="{FF2B5EF4-FFF2-40B4-BE49-F238E27FC236}">
+                <a16:creationId xmlns:a16="http://schemas.microsoft.com/office/drawing/2014/main" id="{7E42F943-9EB5-4D01-BACB-F35373BC3A78}"/>
+              </a:ext>
+            </a:extLst>
+          </p:cNvPr>
+          <p:cNvSpPr/>
+          <p:nvPr/>
+        </p:nvSpPr>
+        <p:spPr>
+          <a:xfrm>
+            <a:off x="12749211" y="3249560"/>
+            <a:ext cx="3061059" cy="1735395"/>
+          </a:xfrm>
+          <a:prstGeom prst="rect">
+            <a:avLst/>
+          </a:prstGeom>
+          <a:solidFill>
+            <a:srgbClr val="FF0000"/>
+          </a:solidFill>
+        </p:spPr>
+        <p:style>
+          <a:lnRef idx="2">
+            <a:schemeClr val="accent1">
+              <a:shade val="50000"/>
+            </a:schemeClr>
+          </a:lnRef>
+          <a:fillRef idx="1">
+            <a:schemeClr val="accent1"/>
+          </a:fillRef>
+          <a:effectRef idx="0">
+            <a:schemeClr val="accent1"/>
+          </a:effectRef>
+          <a:fontRef idx="minor">
+            <a:schemeClr val="lt1"/>
+          </a:fontRef>
+        </p:style>
+        <p:txBody>
+          <a:bodyPr rtlCol="0" anchor="ctr"/>
+          <a:lstStyle/>
+          <a:p>
+            <a:pPr algn="ctr"/>
+            <a:r>
+              <a:rPr lang="pt-BR" sz="2400" dirty="0"/>
+              <a:t>Colocar verbo nos objetivos específicos como no último.</a:t>
+            </a:r>
+          </a:p>
+        </p:txBody>
+      </p:sp>
     </p:spTree>
     <p:extLst>
       <p:ext uri="{BB962C8B-B14F-4D97-AF65-F5344CB8AC3E}">
@@ -8065,7 +8417,7 @@
         </p:nvSpPr>
         <p:spPr>
           <a:xfrm>
-            <a:off x="12415837" y="942975"/>
+            <a:off x="12625387" y="0"/>
             <a:ext cx="3514725" cy="2200275"/>
           </a:xfrm>
           <a:prstGeom prst="rect">
@@ -8139,6 +8491,115 @@
           </a:prstGeom>
         </p:spPr>
       </p:pic>
+      <p:sp>
+        <p:nvSpPr>
+          <p:cNvPr id="4" name="Retângulo 3">
+            <a:extLst>
+              <a:ext uri="{FF2B5EF4-FFF2-40B4-BE49-F238E27FC236}">
+                <a16:creationId xmlns:a16="http://schemas.microsoft.com/office/drawing/2014/main" id="{38C7E7C1-86A9-4365-BCDD-25708441CE96}"/>
+              </a:ext>
+            </a:extLst>
+          </p:cNvPr>
+          <p:cNvSpPr/>
+          <p:nvPr/>
+        </p:nvSpPr>
+        <p:spPr>
+          <a:xfrm>
+            <a:off x="12625387" y="2626595"/>
+            <a:ext cx="3514725" cy="1604809"/>
+          </a:xfrm>
+          <a:prstGeom prst="rect">
+            <a:avLst/>
+          </a:prstGeom>
+          <a:solidFill>
+            <a:srgbClr val="FF0000"/>
+          </a:solidFill>
+        </p:spPr>
+        <p:style>
+          <a:lnRef idx="2">
+            <a:schemeClr val="accent1">
+              <a:shade val="50000"/>
+            </a:schemeClr>
+          </a:lnRef>
+          <a:fillRef idx="1">
+            <a:schemeClr val="accent1"/>
+          </a:fillRef>
+          <a:effectRef idx="0">
+            <a:schemeClr val="accent1"/>
+          </a:effectRef>
+          <a:fontRef idx="minor">
+            <a:schemeClr val="lt1"/>
+          </a:fontRef>
+        </p:style>
+        <p:txBody>
+          <a:bodyPr rtlCol="0" anchor="ctr"/>
+          <a:lstStyle/>
+          <a:p>
+            <a:pPr algn="ctr"/>
+            <a:r>
+              <a:rPr lang="pt-BR" sz="2800" dirty="0"/>
+              <a:t>Deixar claro a sequência das coisas. Talvez incluir números.</a:t>
+            </a:r>
+          </a:p>
+        </p:txBody>
+      </p:sp>
+      <p:sp>
+        <p:nvSpPr>
+          <p:cNvPr id="5" name="Retângulo 4">
+            <a:extLst>
+              <a:ext uri="{FF2B5EF4-FFF2-40B4-BE49-F238E27FC236}">
+                <a16:creationId xmlns:a16="http://schemas.microsoft.com/office/drawing/2014/main" id="{08898A2A-7EA9-44ED-BEFD-00F7AB25AC36}"/>
+              </a:ext>
+            </a:extLst>
+          </p:cNvPr>
+          <p:cNvSpPr/>
+          <p:nvPr/>
+        </p:nvSpPr>
+        <p:spPr>
+          <a:xfrm>
+            <a:off x="12620624" y="4657724"/>
+            <a:ext cx="3514725" cy="2029129"/>
+          </a:xfrm>
+          <a:prstGeom prst="rect">
+            <a:avLst/>
+          </a:prstGeom>
+          <a:solidFill>
+            <a:srgbClr val="FF0000"/>
+          </a:solidFill>
+        </p:spPr>
+        <p:style>
+          <a:lnRef idx="2">
+            <a:schemeClr val="accent1">
+              <a:shade val="50000"/>
+            </a:schemeClr>
+          </a:lnRef>
+          <a:fillRef idx="1">
+            <a:schemeClr val="accent1"/>
+          </a:fillRef>
+          <a:effectRef idx="0">
+            <a:schemeClr val="accent1"/>
+          </a:effectRef>
+          <a:fontRef idx="minor">
+            <a:schemeClr val="lt1"/>
+          </a:fontRef>
+        </p:style>
+        <p:txBody>
+          <a:bodyPr rtlCol="0" anchor="ctr"/>
+          <a:lstStyle/>
+          <a:p>
+            <a:pPr algn="ctr"/>
+            <a:r>
+              <a:rPr lang="pt-BR" sz="2800" dirty="0"/>
+              <a:t>Incluir um slide detalhando a metodologia (minha sugestão) </a:t>
+            </a:r>
+            <a:r>
+              <a:rPr lang="pt-BR" sz="2800" dirty="0" err="1"/>
+              <a:t>kkk</a:t>
+            </a:r>
+            <a:endParaRPr lang="pt-BR" sz="2800" dirty="0"/>
+          </a:p>
+        </p:txBody>
+      </p:sp>
     </p:spTree>
     <p:extLst>
       <p:ext uri="{BB962C8B-B14F-4D97-AF65-F5344CB8AC3E}">
@@ -8213,6 +8674,110 @@
           </a:prstGeom>
         </p:spPr>
       </p:pic>
+      <p:sp>
+        <p:nvSpPr>
+          <p:cNvPr id="3" name="Retângulo 2">
+            <a:extLst>
+              <a:ext uri="{FF2B5EF4-FFF2-40B4-BE49-F238E27FC236}">
+                <a16:creationId xmlns:a16="http://schemas.microsoft.com/office/drawing/2014/main" id="{D1DE7770-E496-4469-85A5-BC6359FFDD48}"/>
+              </a:ext>
+            </a:extLst>
+          </p:cNvPr>
+          <p:cNvSpPr/>
+          <p:nvPr/>
+        </p:nvSpPr>
+        <p:spPr>
+          <a:xfrm>
+            <a:off x="12698361" y="0"/>
+            <a:ext cx="2812680" cy="1257300"/>
+          </a:xfrm>
+          <a:prstGeom prst="rect">
+            <a:avLst/>
+          </a:prstGeom>
+          <a:solidFill>
+            <a:schemeClr val="accent6"/>
+          </a:solidFill>
+        </p:spPr>
+        <p:style>
+          <a:lnRef idx="2">
+            <a:schemeClr val="accent1">
+              <a:shade val="50000"/>
+            </a:schemeClr>
+          </a:lnRef>
+          <a:fillRef idx="1">
+            <a:schemeClr val="accent1"/>
+          </a:fillRef>
+          <a:effectRef idx="0">
+            <a:schemeClr val="accent1"/>
+          </a:effectRef>
+          <a:fontRef idx="minor">
+            <a:schemeClr val="lt1"/>
+          </a:fontRef>
+        </p:style>
+        <p:txBody>
+          <a:bodyPr rtlCol="0" anchor="ctr"/>
+          <a:lstStyle/>
+          <a:p>
+            <a:pPr algn="ctr"/>
+            <a:r>
+              <a:rPr lang="pt-BR" sz="2800" dirty="0"/>
+              <a:t>Processo</a:t>
+            </a:r>
+          </a:p>
+        </p:txBody>
+      </p:sp>
+      <p:sp>
+        <p:nvSpPr>
+          <p:cNvPr id="5" name="Retângulo 4">
+            <a:extLst>
+              <a:ext uri="{FF2B5EF4-FFF2-40B4-BE49-F238E27FC236}">
+                <a16:creationId xmlns:a16="http://schemas.microsoft.com/office/drawing/2014/main" id="{89F7D3A0-2F19-4570-9DAB-15899FE301A7}"/>
+              </a:ext>
+            </a:extLst>
+          </p:cNvPr>
+          <p:cNvSpPr/>
+          <p:nvPr/>
+        </p:nvSpPr>
+        <p:spPr>
+          <a:xfrm>
+            <a:off x="12698361" y="1714500"/>
+            <a:ext cx="2812680" cy="3695700"/>
+          </a:xfrm>
+          <a:prstGeom prst="rect">
+            <a:avLst/>
+          </a:prstGeom>
+          <a:solidFill>
+            <a:srgbClr val="FF0000"/>
+          </a:solidFill>
+        </p:spPr>
+        <p:style>
+          <a:lnRef idx="2">
+            <a:schemeClr val="accent1">
+              <a:shade val="50000"/>
+            </a:schemeClr>
+          </a:lnRef>
+          <a:fillRef idx="1">
+            <a:schemeClr val="accent1"/>
+          </a:fillRef>
+          <a:effectRef idx="0">
+            <a:schemeClr val="accent1"/>
+          </a:effectRef>
+          <a:fontRef idx="minor">
+            <a:schemeClr val="lt1"/>
+          </a:fontRef>
+        </p:style>
+        <p:txBody>
+          <a:bodyPr rtlCol="0" anchor="ctr"/>
+          <a:lstStyle/>
+          <a:p>
+            <a:pPr algn="ctr"/>
+            <a:r>
+              <a:rPr lang="pt-BR" sz="2800" dirty="0"/>
+              <a:t>Deixar claro a sequência dos passos. Talvez com números ou escondendo o mostrando os pedaços do fluxo.</a:t>
+            </a:r>
+          </a:p>
+        </p:txBody>
+      </p:sp>
     </p:spTree>
     <p:extLst>
       <p:ext uri="{BB962C8B-B14F-4D97-AF65-F5344CB8AC3E}">

</xml_diff>